<commit_message>
Initial commit of protein nutrition labels and food tracker percentages
</commit_message>
<xml_diff>
--- a/Images/NutritionLabels/FoodTrackerPercentages.pptx
+++ b/Images/NutritionLabels/FoodTrackerPercentages.pptx
@@ -2,7 +2,7 @@
 <file path=ppt/presentation.xml><?xml version="1.0" encoding="utf-8"?>
 <p:presentation xmlns:a="http://schemas.openxmlformats.org/drawingml/2006/main" xmlns:r="http://schemas.openxmlformats.org/officeDocument/2006/relationships" xmlns:p="http://schemas.openxmlformats.org/presentationml/2006/main" saveSubsetFonts="1">
   <p:sldMasterIdLst>
-    <p:sldMasterId id="2147483648" r:id="rId1"/>
+    <p:sldMasterId id="2147483660" r:id="rId1"/>
   </p:sldMasterIdLst>
   <p:sldIdLst>
     <p:sldId id="256" r:id="rId2"/>
@@ -10,14 +10,16 @@
     <p:sldId id="258" r:id="rId4"/>
     <p:sldId id="259" r:id="rId5"/>
     <p:sldId id="260" r:id="rId6"/>
+    <p:sldId id="261" r:id="rId7"/>
+    <p:sldId id="262" r:id="rId8"/>
   </p:sldIdLst>
-  <p:sldSz cx="12192000" cy="6858000"/>
+  <p:sldSz cx="9144000" cy="6858000" type="screen4x3"/>
   <p:notesSz cx="6858000" cy="9144000"/>
   <p:defaultTextStyle>
     <a:defPPr>
       <a:defRPr lang="en-US"/>
     </a:defPPr>
-    <a:lvl1pPr marL="0" algn="l" defTabSz="914400" rtl="0" eaLnBrk="1" latinLnBrk="0" hangingPunct="1">
+    <a:lvl1pPr marL="0" algn="l" defTabSz="457200" rtl="0" eaLnBrk="1" latinLnBrk="0" hangingPunct="1">
       <a:defRPr sz="1800" kern="1200">
         <a:solidFill>
           <a:schemeClr val="tx1"/>
@@ -27,7 +29,7 @@
         <a:cs typeface="+mn-cs"/>
       </a:defRPr>
     </a:lvl1pPr>
-    <a:lvl2pPr marL="457200" algn="l" defTabSz="914400" rtl="0" eaLnBrk="1" latinLnBrk="0" hangingPunct="1">
+    <a:lvl2pPr marL="457200" algn="l" defTabSz="457200" rtl="0" eaLnBrk="1" latinLnBrk="0" hangingPunct="1">
       <a:defRPr sz="1800" kern="1200">
         <a:solidFill>
           <a:schemeClr val="tx1"/>
@@ -37,7 +39,7 @@
         <a:cs typeface="+mn-cs"/>
       </a:defRPr>
     </a:lvl2pPr>
-    <a:lvl3pPr marL="914400" algn="l" defTabSz="914400" rtl="0" eaLnBrk="1" latinLnBrk="0" hangingPunct="1">
+    <a:lvl3pPr marL="914400" algn="l" defTabSz="457200" rtl="0" eaLnBrk="1" latinLnBrk="0" hangingPunct="1">
       <a:defRPr sz="1800" kern="1200">
         <a:solidFill>
           <a:schemeClr val="tx1"/>
@@ -47,7 +49,7 @@
         <a:cs typeface="+mn-cs"/>
       </a:defRPr>
     </a:lvl3pPr>
-    <a:lvl4pPr marL="1371600" algn="l" defTabSz="914400" rtl="0" eaLnBrk="1" latinLnBrk="0" hangingPunct="1">
+    <a:lvl4pPr marL="1371600" algn="l" defTabSz="457200" rtl="0" eaLnBrk="1" latinLnBrk="0" hangingPunct="1">
       <a:defRPr sz="1800" kern="1200">
         <a:solidFill>
           <a:schemeClr val="tx1"/>
@@ -57,7 +59,7 @@
         <a:cs typeface="+mn-cs"/>
       </a:defRPr>
     </a:lvl4pPr>
-    <a:lvl5pPr marL="1828800" algn="l" defTabSz="914400" rtl="0" eaLnBrk="1" latinLnBrk="0" hangingPunct="1">
+    <a:lvl5pPr marL="1828800" algn="l" defTabSz="457200" rtl="0" eaLnBrk="1" latinLnBrk="0" hangingPunct="1">
       <a:defRPr sz="1800" kern="1200">
         <a:solidFill>
           <a:schemeClr val="tx1"/>
@@ -67,7 +69,7 @@
         <a:cs typeface="+mn-cs"/>
       </a:defRPr>
     </a:lvl5pPr>
-    <a:lvl6pPr marL="2286000" algn="l" defTabSz="914400" rtl="0" eaLnBrk="1" latinLnBrk="0" hangingPunct="1">
+    <a:lvl6pPr marL="2286000" algn="l" defTabSz="457200" rtl="0" eaLnBrk="1" latinLnBrk="0" hangingPunct="1">
       <a:defRPr sz="1800" kern="1200">
         <a:solidFill>
           <a:schemeClr val="tx1"/>
@@ -77,7 +79,7 @@
         <a:cs typeface="+mn-cs"/>
       </a:defRPr>
     </a:lvl6pPr>
-    <a:lvl7pPr marL="2743200" algn="l" defTabSz="914400" rtl="0" eaLnBrk="1" latinLnBrk="0" hangingPunct="1">
+    <a:lvl7pPr marL="2743200" algn="l" defTabSz="457200" rtl="0" eaLnBrk="1" latinLnBrk="0" hangingPunct="1">
       <a:defRPr sz="1800" kern="1200">
         <a:solidFill>
           <a:schemeClr val="tx1"/>
@@ -87,7 +89,7 @@
         <a:cs typeface="+mn-cs"/>
       </a:defRPr>
     </a:lvl7pPr>
-    <a:lvl8pPr marL="3200400" algn="l" defTabSz="914400" rtl="0" eaLnBrk="1" latinLnBrk="0" hangingPunct="1">
+    <a:lvl8pPr marL="3200400" algn="l" defTabSz="457200" rtl="0" eaLnBrk="1" latinLnBrk="0" hangingPunct="1">
       <a:defRPr sz="1800" kern="1200">
         <a:solidFill>
           <a:schemeClr val="tx1"/>
@@ -97,7 +99,7 @@
         <a:cs typeface="+mn-cs"/>
       </a:defRPr>
     </a:lvl8pPr>
-    <a:lvl9pPr marL="3657600" algn="l" defTabSz="914400" rtl="0" eaLnBrk="1" latinLnBrk="0" hangingPunct="1">
+    <a:lvl9pPr marL="3657600" algn="l" defTabSz="457200" rtl="0" eaLnBrk="1" latinLnBrk="0" hangingPunct="1">
       <a:defRPr sz="1800" kern="1200">
         <a:solidFill>
           <a:schemeClr val="tx1"/>
@@ -118,9 +120,14 @@
             <p14:sldId id="258"/>
             <p14:sldId id="259"/>
             <p14:sldId id="260"/>
+            <p14:sldId id="261"/>
+            <p14:sldId id="262"/>
           </p14:sldIdLst>
         </p14:section>
       </p14:sectionLst>
+    </p:ext>
+    <p:ext uri="{EFAFB233-063F-42B5-8137-9DF3F51BA10A}">
+      <p15:sldGuideLst xmlns:p15="http://schemas.microsoft.com/office/powerpoint/2012/main"/>
     </p:ext>
   </p:extLst>
 </p:presentation>
@@ -3171,6 +3178,1224 @@
 </c:chartSpace>
 </file>
 
+<file path=ppt/charts/chart6.xml><?xml version="1.0" encoding="utf-8"?>
+<c:chartSpace xmlns:c="http://schemas.openxmlformats.org/drawingml/2006/chart" xmlns:a="http://schemas.openxmlformats.org/drawingml/2006/main" xmlns:r="http://schemas.openxmlformats.org/officeDocument/2006/relationships" xmlns:c16r2="http://schemas.microsoft.com/office/drawing/2015/06/chart">
+  <c:date1904 val="0"/>
+  <c:lang val="en-US"/>
+  <c:roundedCorners val="0"/>
+  <mc:AlternateContent xmlns:mc="http://schemas.openxmlformats.org/markup-compatibility/2006">
+    <mc:Choice xmlns:c14="http://schemas.microsoft.com/office/drawing/2007/8/2/chart" Requires="c14">
+      <c14:style val="102"/>
+    </mc:Choice>
+    <mc:Fallback>
+      <c:style val="2"/>
+    </mc:Fallback>
+  </mc:AlternateContent>
+  <c:chart>
+    <c:autoTitleDeleted val="1"/>
+    <c:plotArea>
+      <c:layout/>
+      <c:doughnutChart>
+        <c:varyColors val="1"/>
+        <c:ser>
+          <c:idx val="0"/>
+          <c:order val="0"/>
+          <c:tx>
+            <c:strRef>
+              <c:f>Sheet1!$B$1</c:f>
+              <c:strCache>
+                <c:ptCount val="1"/>
+                <c:pt idx="0">
+                  <c:v>Macros</c:v>
+                </c:pt>
+              </c:strCache>
+            </c:strRef>
+          </c:tx>
+          <c:dPt>
+            <c:idx val="0"/>
+            <c:bubble3D val="0"/>
+            <c:spPr>
+              <a:solidFill>
+                <a:srgbClr val="FDDD6E"/>
+              </a:solidFill>
+              <a:ln w="19050">
+                <a:solidFill>
+                  <a:schemeClr val="lt1"/>
+                </a:solidFill>
+              </a:ln>
+              <a:effectLst/>
+            </c:spPr>
+            <c:extLst>
+              <c:ext xmlns:c16="http://schemas.microsoft.com/office/drawing/2014/chart" uri="{C3380CC4-5D6E-409C-BE32-E72D297353CC}">
+                <c16:uniqueId val="{00000001-3D9D-4014-8236-1091F416613A}"/>
+              </c:ext>
+            </c:extLst>
+          </c:dPt>
+          <c:dPt>
+            <c:idx val="1"/>
+            <c:bubble3D val="0"/>
+            <c:spPr>
+              <a:solidFill>
+                <a:srgbClr val="FBA1C1"/>
+              </a:solidFill>
+              <a:ln w="19050">
+                <a:solidFill>
+                  <a:schemeClr val="lt1"/>
+                </a:solidFill>
+              </a:ln>
+              <a:effectLst/>
+            </c:spPr>
+            <c:extLst>
+              <c:ext xmlns:c16="http://schemas.microsoft.com/office/drawing/2014/chart" uri="{C3380CC4-5D6E-409C-BE32-E72D297353CC}">
+                <c16:uniqueId val="{00000003-3D9D-4014-8236-1091F416613A}"/>
+              </c:ext>
+            </c:extLst>
+          </c:dPt>
+          <c:dPt>
+            <c:idx val="2"/>
+            <c:bubble3D val="0"/>
+            <c:spPr>
+              <a:solidFill>
+                <a:srgbClr val="81E5E0"/>
+              </a:solidFill>
+              <a:ln w="19050">
+                <a:solidFill>
+                  <a:schemeClr val="lt1"/>
+                </a:solidFill>
+              </a:ln>
+              <a:effectLst/>
+            </c:spPr>
+            <c:extLst>
+              <c:ext xmlns:c16="http://schemas.microsoft.com/office/drawing/2014/chart" uri="{C3380CC4-5D6E-409C-BE32-E72D297353CC}">
+                <c16:uniqueId val="{00000005-3D9D-4014-8236-1091F416613A}"/>
+              </c:ext>
+            </c:extLst>
+          </c:dPt>
+          <c:dLbls>
+            <c:dLbl>
+              <c:idx val="0"/>
+              <c:layout>
+                <c:manualLayout>
+                  <c:x val="1.5000150510413163E-2"/>
+                  <c:y val="-5.6024205307669876E-2"/>
+                </c:manualLayout>
+              </c:layout>
+              <c:tx>
+                <c:rich>
+                  <a:bodyPr rot="0" spcFirstLastPara="1" vertOverflow="ellipsis" vert="horz" wrap="square" lIns="38100" tIns="19050" rIns="38100" bIns="19050" anchor="ctr" anchorCtr="1">
+                    <a:spAutoFit/>
+                  </a:bodyPr>
+                  <a:lstStyle/>
+                  <a:p>
+                    <a:pPr>
+                      <a:defRPr sz="1600" b="0" i="0" u="none" strike="noStrike" kern="1200" baseline="0">
+                        <a:solidFill>
+                          <a:schemeClr val="tx1"/>
+                        </a:solidFill>
+                        <a:latin typeface="Peace Sans" panose="02000505040000020004" pitchFamily="50" charset="0"/>
+                        <a:ea typeface="+mn-ea"/>
+                        <a:cs typeface="+mn-cs"/>
+                      </a:defRPr>
+                    </a:pPr>
+                    <a:fld id="{DFB7144D-D253-41F7-862E-E39CD9AF34AC}" type="CATEGORYNAME">
+                      <a:rPr lang="en-US" sz="1600" smtClean="0">
+                        <a:solidFill>
+                          <a:schemeClr val="tx1"/>
+                        </a:solidFill>
+                        <a:latin typeface="Peace Sans" panose="02000505040000020004" pitchFamily="50" charset="0"/>
+                      </a:rPr>
+                      <a:pPr>
+                        <a:defRPr sz="1600">
+                          <a:solidFill>
+                            <a:schemeClr val="tx1"/>
+                          </a:solidFill>
+                          <a:latin typeface="Peace Sans" panose="02000505040000020004" pitchFamily="50" charset="0"/>
+                        </a:defRPr>
+                      </a:pPr>
+                      <a:t>[CATEGORY NAME]</a:t>
+                    </a:fld>
+                    <a:r>
+                      <a:rPr lang="en-US" sz="1600" baseline="0" dirty="0">
+                        <a:solidFill>
+                          <a:schemeClr val="tx1"/>
+                        </a:solidFill>
+                        <a:latin typeface="Peace Sans" panose="02000505040000020004" pitchFamily="50" charset="0"/>
+                      </a:rPr>
+                      <a:t> </a:t>
+                    </a:r>
+                  </a:p>
+                  <a:p>
+                    <a:pPr>
+                      <a:defRPr sz="1600">
+                        <a:solidFill>
+                          <a:schemeClr val="tx1"/>
+                        </a:solidFill>
+                        <a:latin typeface="Peace Sans" panose="02000505040000020004" pitchFamily="50" charset="0"/>
+                      </a:defRPr>
+                    </a:pPr>
+                    <a:fld id="{FB06E928-E1F7-4E74-8978-720C2A0D22B6}" type="VALUE">
+                      <a:rPr lang="en-US" sz="1600" baseline="0" smtClean="0">
+                        <a:solidFill>
+                          <a:schemeClr val="tx1"/>
+                        </a:solidFill>
+                        <a:latin typeface="Peace Sans" panose="02000505040000020004" pitchFamily="50" charset="0"/>
+                      </a:rPr>
+                      <a:pPr>
+                        <a:defRPr sz="1600">
+                          <a:solidFill>
+                            <a:schemeClr val="tx1"/>
+                          </a:solidFill>
+                          <a:latin typeface="Peace Sans" panose="02000505040000020004" pitchFamily="50" charset="0"/>
+                        </a:defRPr>
+                      </a:pPr>
+                      <a:t>[VALUE]</a:t>
+                    </a:fld>
+                    <a:endParaRPr lang="en-US"/>
+                  </a:p>
+                </c:rich>
+              </c:tx>
+              <c:spPr>
+                <a:noFill/>
+                <a:ln>
+                  <a:noFill/>
+                </a:ln>
+                <a:effectLst/>
+              </c:spPr>
+              <c:txPr>
+                <a:bodyPr rot="0" spcFirstLastPara="1" vertOverflow="ellipsis" vert="horz" wrap="square" lIns="38100" tIns="19050" rIns="38100" bIns="19050" anchor="ctr" anchorCtr="1">
+                  <a:spAutoFit/>
+                </a:bodyPr>
+                <a:lstStyle/>
+                <a:p>
+                  <a:pPr>
+                    <a:defRPr sz="1600" b="0" i="0" u="none" strike="noStrike" kern="1200" baseline="0">
+                      <a:solidFill>
+                        <a:schemeClr val="tx1"/>
+                      </a:solidFill>
+                      <a:latin typeface="Peace Sans" panose="02000505040000020004" pitchFamily="50" charset="0"/>
+                      <a:ea typeface="+mn-ea"/>
+                      <a:cs typeface="+mn-cs"/>
+                    </a:defRPr>
+                  </a:pPr>
+                  <a:endParaRPr lang="en-US"/>
+                </a:p>
+              </c:txPr>
+              <c:showLegendKey val="0"/>
+              <c:showVal val="1"/>
+              <c:showCatName val="1"/>
+              <c:showSerName val="0"/>
+              <c:showPercent val="0"/>
+              <c:showBubbleSize val="0"/>
+              <c:extLst>
+                <c:ext xmlns:c15="http://schemas.microsoft.com/office/drawing/2012/chart" uri="{CE6537A1-D6FC-4f65-9D91-7224C49458BB}">
+                  <c15:dlblFieldTable/>
+                  <c15:showDataLabelsRange val="0"/>
+                </c:ext>
+                <c:ext xmlns:c16="http://schemas.microsoft.com/office/drawing/2014/chart" uri="{C3380CC4-5D6E-409C-BE32-E72D297353CC}">
+                  <c16:uniqueId val="{00000001-3D9D-4014-8236-1091F416613A}"/>
+                </c:ext>
+              </c:extLst>
+            </c:dLbl>
+            <c:dLbl>
+              <c:idx val="1"/>
+              <c:layout>
+                <c:manualLayout>
+                  <c:x val="-8.8846047471815882E-3"/>
+                  <c:y val="-1.0902887139107611E-2"/>
+                </c:manualLayout>
+              </c:layout>
+              <c:tx>
+                <c:rich>
+                  <a:bodyPr rot="0" spcFirstLastPara="1" vertOverflow="ellipsis" vert="horz" wrap="square" lIns="38100" tIns="19050" rIns="38100" bIns="19050" anchor="ctr" anchorCtr="1">
+                    <a:spAutoFit/>
+                  </a:bodyPr>
+                  <a:lstStyle/>
+                  <a:p>
+                    <a:pPr>
+                      <a:defRPr sz="1600" b="0" i="0" u="none" strike="noStrike" kern="1200" baseline="0">
+                        <a:solidFill>
+                          <a:schemeClr val="tx1"/>
+                        </a:solidFill>
+                        <a:latin typeface="Peace Sans" panose="02000505040000020004" pitchFamily="50" charset="0"/>
+                        <a:ea typeface="+mn-ea"/>
+                        <a:cs typeface="+mn-cs"/>
+                      </a:defRPr>
+                    </a:pPr>
+                    <a:fld id="{B779D77C-2615-45A8-BDAA-FDF2BF81641D}" type="CATEGORYNAME">
+                      <a:rPr lang="en-US" sz="1600" smtClean="0">
+                        <a:solidFill>
+                          <a:schemeClr val="tx1"/>
+                        </a:solidFill>
+                        <a:latin typeface="Peace Sans" panose="02000505040000020004" pitchFamily="50" charset="0"/>
+                      </a:rPr>
+                      <a:pPr>
+                        <a:defRPr sz="1600">
+                          <a:solidFill>
+                            <a:schemeClr val="tx1"/>
+                          </a:solidFill>
+                          <a:latin typeface="Peace Sans" panose="02000505040000020004" pitchFamily="50" charset="0"/>
+                        </a:defRPr>
+                      </a:pPr>
+                      <a:t>[CATEGORY NAME]</a:t>
+                    </a:fld>
+                    <a:endParaRPr lang="en-US" sz="1600" dirty="0">
+                      <a:solidFill>
+                        <a:schemeClr val="tx1"/>
+                      </a:solidFill>
+                      <a:latin typeface="Peace Sans" panose="02000505040000020004" pitchFamily="50" charset="0"/>
+                    </a:endParaRPr>
+                  </a:p>
+                  <a:p>
+                    <a:pPr>
+                      <a:defRPr sz="1600">
+                        <a:solidFill>
+                          <a:schemeClr val="tx1"/>
+                        </a:solidFill>
+                        <a:latin typeface="Peace Sans" panose="02000505040000020004" pitchFamily="50" charset="0"/>
+                      </a:defRPr>
+                    </a:pPr>
+                    <a:r>
+                      <a:rPr lang="en-US" sz="1600" baseline="0" dirty="0">
+                        <a:solidFill>
+                          <a:schemeClr val="tx1"/>
+                        </a:solidFill>
+                        <a:latin typeface="Peace Sans" panose="02000505040000020004" pitchFamily="50" charset="0"/>
+                      </a:rPr>
+                      <a:t> </a:t>
+                    </a:r>
+                    <a:fld id="{69FDA7E2-B396-4F80-8BCF-ED09DB61E887}" type="VALUE">
+                      <a:rPr lang="en-US" sz="1600" baseline="0">
+                        <a:solidFill>
+                          <a:schemeClr val="tx1"/>
+                        </a:solidFill>
+                        <a:latin typeface="Peace Sans" panose="02000505040000020004" pitchFamily="50" charset="0"/>
+                      </a:rPr>
+                      <a:pPr>
+                        <a:defRPr sz="1600">
+                          <a:solidFill>
+                            <a:schemeClr val="tx1"/>
+                          </a:solidFill>
+                          <a:latin typeface="Peace Sans" panose="02000505040000020004" pitchFamily="50" charset="0"/>
+                        </a:defRPr>
+                      </a:pPr>
+                      <a:t>[VALUE]</a:t>
+                    </a:fld>
+                    <a:endParaRPr lang="en-US" sz="1600" baseline="0" dirty="0">
+                      <a:solidFill>
+                        <a:schemeClr val="tx1"/>
+                      </a:solidFill>
+                      <a:latin typeface="Peace Sans" panose="02000505040000020004" pitchFamily="50" charset="0"/>
+                    </a:endParaRPr>
+                  </a:p>
+                </c:rich>
+              </c:tx>
+              <c:spPr>
+                <a:noFill/>
+                <a:ln>
+                  <a:noFill/>
+                </a:ln>
+                <a:effectLst/>
+              </c:spPr>
+              <c:txPr>
+                <a:bodyPr rot="0" spcFirstLastPara="1" vertOverflow="ellipsis" vert="horz" wrap="square" lIns="38100" tIns="19050" rIns="38100" bIns="19050" anchor="ctr" anchorCtr="1">
+                  <a:spAutoFit/>
+                </a:bodyPr>
+                <a:lstStyle/>
+                <a:p>
+                  <a:pPr>
+                    <a:defRPr sz="1600" b="0" i="0" u="none" strike="noStrike" kern="1200" baseline="0">
+                      <a:solidFill>
+                        <a:schemeClr val="tx1"/>
+                      </a:solidFill>
+                      <a:latin typeface="Peace Sans" panose="02000505040000020004" pitchFamily="50" charset="0"/>
+                      <a:ea typeface="+mn-ea"/>
+                      <a:cs typeface="+mn-cs"/>
+                    </a:defRPr>
+                  </a:pPr>
+                  <a:endParaRPr lang="en-US"/>
+                </a:p>
+              </c:txPr>
+              <c:showLegendKey val="0"/>
+              <c:showVal val="1"/>
+              <c:showCatName val="1"/>
+              <c:showSerName val="0"/>
+              <c:showPercent val="0"/>
+              <c:showBubbleSize val="0"/>
+              <c:extLst>
+                <c:ext xmlns:c15="http://schemas.microsoft.com/office/drawing/2012/chart" uri="{CE6537A1-D6FC-4f65-9D91-7224C49458BB}">
+                  <c15:dlblFieldTable/>
+                  <c15:showDataLabelsRange val="0"/>
+                </c:ext>
+                <c:ext xmlns:c16="http://schemas.microsoft.com/office/drawing/2014/chart" uri="{C3380CC4-5D6E-409C-BE32-E72D297353CC}">
+                  <c16:uniqueId val="{00000003-3D9D-4014-8236-1091F416613A}"/>
+                </c:ext>
+              </c:extLst>
+            </c:dLbl>
+            <c:dLbl>
+              <c:idx val="2"/>
+              <c:layout>
+                <c:manualLayout>
+                  <c:x val="2.1754991332762611E-3"/>
+                  <c:y val="9.4240303295421409E-4"/>
+                </c:manualLayout>
+              </c:layout>
+              <c:tx>
+                <c:rich>
+                  <a:bodyPr rot="0" spcFirstLastPara="1" vertOverflow="ellipsis" vert="horz" wrap="square" lIns="38100" tIns="19050" rIns="38100" bIns="19050" anchor="ctr" anchorCtr="0">
+                    <a:spAutoFit/>
+                  </a:bodyPr>
+                  <a:lstStyle/>
+                  <a:p>
+                    <a:pPr algn="ctr">
+                      <a:defRPr sz="1600" b="0" i="0" u="none" strike="noStrike" kern="1200" baseline="0">
+                        <a:solidFill>
+                          <a:schemeClr val="tx1"/>
+                        </a:solidFill>
+                        <a:latin typeface="Peace Sans" panose="02000505040000020004" pitchFamily="50" charset="0"/>
+                        <a:ea typeface="+mn-ea"/>
+                        <a:cs typeface="+mn-cs"/>
+                      </a:defRPr>
+                    </a:pPr>
+                    <a:fld id="{E4B69AE3-C9A2-4052-8EDD-03F50E3DFF5B}" type="CATEGORYNAME">
+                      <a:rPr lang="en-US" sz="1600" smtClean="0">
+                        <a:solidFill>
+                          <a:schemeClr val="tx1"/>
+                        </a:solidFill>
+                        <a:latin typeface="Peace Sans" panose="02000505040000020004" pitchFamily="50" charset="0"/>
+                      </a:rPr>
+                      <a:pPr algn="ctr">
+                        <a:defRPr sz="1600">
+                          <a:solidFill>
+                            <a:schemeClr val="tx1"/>
+                          </a:solidFill>
+                          <a:latin typeface="Peace Sans" panose="02000505040000020004" pitchFamily="50" charset="0"/>
+                        </a:defRPr>
+                      </a:pPr>
+                      <a:t>[CATEGORY NAME]</a:t>
+                    </a:fld>
+                    <a:r>
+                      <a:rPr lang="en-US" sz="1600" baseline="0" dirty="0">
+                        <a:solidFill>
+                          <a:schemeClr val="tx1"/>
+                        </a:solidFill>
+                        <a:latin typeface="Peace Sans" panose="02000505040000020004" pitchFamily="50" charset="0"/>
+                      </a:rPr>
+                      <a:t> </a:t>
+                    </a:r>
+                  </a:p>
+                  <a:p>
+                    <a:pPr algn="ctr">
+                      <a:defRPr sz="1600">
+                        <a:solidFill>
+                          <a:schemeClr val="tx1"/>
+                        </a:solidFill>
+                        <a:latin typeface="Peace Sans" panose="02000505040000020004" pitchFamily="50" charset="0"/>
+                      </a:defRPr>
+                    </a:pPr>
+                    <a:fld id="{422174A9-A5E6-4050-9BD4-6F61863C336D}" type="VALUE">
+                      <a:rPr lang="en-US" sz="1600" baseline="0" smtClean="0">
+                        <a:solidFill>
+                          <a:schemeClr val="tx1"/>
+                        </a:solidFill>
+                        <a:latin typeface="Peace Sans" panose="02000505040000020004" pitchFamily="50" charset="0"/>
+                      </a:rPr>
+                      <a:pPr algn="ctr">
+                        <a:defRPr sz="1600">
+                          <a:solidFill>
+                            <a:schemeClr val="tx1"/>
+                          </a:solidFill>
+                          <a:latin typeface="Peace Sans" panose="02000505040000020004" pitchFamily="50" charset="0"/>
+                        </a:defRPr>
+                      </a:pPr>
+                      <a:t>[VALUE]</a:t>
+                    </a:fld>
+                    <a:endParaRPr lang="en-US"/>
+                  </a:p>
+                </c:rich>
+              </c:tx>
+              <c:spPr>
+                <a:noFill/>
+                <a:ln>
+                  <a:noFill/>
+                </a:ln>
+                <a:effectLst/>
+              </c:spPr>
+              <c:txPr>
+                <a:bodyPr rot="0" spcFirstLastPara="1" vertOverflow="ellipsis" vert="horz" wrap="square" lIns="38100" tIns="19050" rIns="38100" bIns="19050" anchor="ctr" anchorCtr="0">
+                  <a:spAutoFit/>
+                </a:bodyPr>
+                <a:lstStyle/>
+                <a:p>
+                  <a:pPr algn="ctr">
+                    <a:defRPr sz="1600" b="0" i="0" u="none" strike="noStrike" kern="1200" baseline="0">
+                      <a:solidFill>
+                        <a:schemeClr val="tx1"/>
+                      </a:solidFill>
+                      <a:latin typeface="Peace Sans" panose="02000505040000020004" pitchFamily="50" charset="0"/>
+                      <a:ea typeface="+mn-ea"/>
+                      <a:cs typeface="+mn-cs"/>
+                    </a:defRPr>
+                  </a:pPr>
+                  <a:endParaRPr lang="en-US"/>
+                </a:p>
+              </c:txPr>
+              <c:showLegendKey val="0"/>
+              <c:showVal val="1"/>
+              <c:showCatName val="1"/>
+              <c:showSerName val="0"/>
+              <c:showPercent val="0"/>
+              <c:showBubbleSize val="0"/>
+              <c:extLst>
+                <c:ext xmlns:c15="http://schemas.microsoft.com/office/drawing/2012/chart" uri="{CE6537A1-D6FC-4f65-9D91-7224C49458BB}">
+                  <c15:dlblFieldTable/>
+                  <c15:showDataLabelsRange val="0"/>
+                </c:ext>
+                <c:ext xmlns:c16="http://schemas.microsoft.com/office/drawing/2014/chart" uri="{C3380CC4-5D6E-409C-BE32-E72D297353CC}">
+                  <c16:uniqueId val="{00000005-3D9D-4014-8236-1091F416613A}"/>
+                </c:ext>
+              </c:extLst>
+            </c:dLbl>
+            <c:spPr>
+              <a:noFill/>
+              <a:ln>
+                <a:noFill/>
+              </a:ln>
+              <a:effectLst/>
+            </c:spPr>
+            <c:txPr>
+              <a:bodyPr rot="0" spcFirstLastPara="1" vertOverflow="ellipsis" vert="horz" wrap="square" lIns="38100" tIns="19050" rIns="38100" bIns="19050" anchor="ctr" anchorCtr="1">
+                <a:spAutoFit/>
+              </a:bodyPr>
+              <a:lstStyle/>
+              <a:p>
+                <a:pPr>
+                  <a:defRPr sz="1197" b="0" i="0" u="none" strike="noStrike" kern="1200" baseline="0">
+                    <a:solidFill>
+                      <a:schemeClr val="tx1"/>
+                    </a:solidFill>
+                    <a:latin typeface="+mn-lt"/>
+                    <a:ea typeface="+mn-ea"/>
+                    <a:cs typeface="+mn-cs"/>
+                  </a:defRPr>
+                </a:pPr>
+                <a:endParaRPr lang="en-US"/>
+              </a:p>
+            </c:txPr>
+            <c:showLegendKey val="0"/>
+            <c:showVal val="1"/>
+            <c:showCatName val="1"/>
+            <c:showSerName val="0"/>
+            <c:showPercent val="0"/>
+            <c:showBubbleSize val="0"/>
+            <c:showLeaderLines val="0"/>
+            <c:extLst>
+              <c:ext xmlns:c15="http://schemas.microsoft.com/office/drawing/2012/chart" uri="{CE6537A1-D6FC-4f65-9D91-7224C49458BB}"/>
+            </c:extLst>
+          </c:dLbls>
+          <c:cat>
+            <c:strRef>
+              <c:f>Sheet1!$A$2:$A$4</c:f>
+              <c:strCache>
+                <c:ptCount val="3"/>
+                <c:pt idx="0">
+                  <c:v>Carbs</c:v>
+                </c:pt>
+                <c:pt idx="1">
+                  <c:v>Protein</c:v>
+                </c:pt>
+                <c:pt idx="2">
+                  <c:v>Fats</c:v>
+                </c:pt>
+              </c:strCache>
+            </c:strRef>
+          </c:cat>
+          <c:val>
+            <c:numRef>
+              <c:f>Sheet1!$B$2:$B$4</c:f>
+              <c:numCache>
+                <c:formatCode>0%</c:formatCode>
+                <c:ptCount val="3"/>
+                <c:pt idx="0">
+                  <c:v>0</c:v>
+                </c:pt>
+                <c:pt idx="1">
+                  <c:v>0.95</c:v>
+                </c:pt>
+                <c:pt idx="2">
+                  <c:v>0.05</c:v>
+                </c:pt>
+              </c:numCache>
+            </c:numRef>
+          </c:val>
+          <c:extLst>
+            <c:ext xmlns:c16="http://schemas.microsoft.com/office/drawing/2014/chart" uri="{C3380CC4-5D6E-409C-BE32-E72D297353CC}">
+              <c16:uniqueId val="{00000006-3D9D-4014-8236-1091F416613A}"/>
+            </c:ext>
+          </c:extLst>
+        </c:ser>
+        <c:dLbls>
+          <c:showLegendKey val="0"/>
+          <c:showVal val="0"/>
+          <c:showCatName val="0"/>
+          <c:showSerName val="0"/>
+          <c:showPercent val="0"/>
+          <c:showBubbleSize val="0"/>
+          <c:showLeaderLines val="0"/>
+        </c:dLbls>
+        <c:firstSliceAng val="0"/>
+        <c:holeSize val="50"/>
+      </c:doughnutChart>
+      <c:spPr>
+        <a:noFill/>
+        <a:ln>
+          <a:noFill/>
+        </a:ln>
+        <a:effectLst/>
+      </c:spPr>
+    </c:plotArea>
+    <c:plotVisOnly val="1"/>
+    <c:dispBlanksAs val="gap"/>
+    <c:extLst>
+      <c:ext xmlns:c16r3="http://schemas.microsoft.com/office/drawing/2017/03/chart" uri="{56B9EC1D-385E-4148-901F-78D8002777C0}">
+        <c16r3:dataDisplayOptions16>
+          <c16r3:dispNaAsBlank val="1"/>
+        </c16r3:dataDisplayOptions16>
+      </c:ext>
+    </c:extLst>
+    <c:showDLblsOverMax val="0"/>
+  </c:chart>
+  <c:spPr>
+    <a:noFill/>
+    <a:ln>
+      <a:noFill/>
+    </a:ln>
+    <a:effectLst/>
+  </c:spPr>
+  <c:txPr>
+    <a:bodyPr/>
+    <a:lstStyle/>
+    <a:p>
+      <a:pPr>
+        <a:defRPr/>
+      </a:pPr>
+      <a:endParaRPr lang="en-US"/>
+    </a:p>
+  </c:txPr>
+  <c:externalData r:id="rId3">
+    <c:autoUpdate val="0"/>
+  </c:externalData>
+</c:chartSpace>
+</file>
+
+<file path=ppt/charts/chart7.xml><?xml version="1.0" encoding="utf-8"?>
+<c:chartSpace xmlns:c="http://schemas.openxmlformats.org/drawingml/2006/chart" xmlns:a="http://schemas.openxmlformats.org/drawingml/2006/main" xmlns:r="http://schemas.openxmlformats.org/officeDocument/2006/relationships" xmlns:c16r2="http://schemas.microsoft.com/office/drawing/2015/06/chart">
+  <c:date1904 val="0"/>
+  <c:lang val="en-US"/>
+  <c:roundedCorners val="0"/>
+  <mc:AlternateContent xmlns:mc="http://schemas.openxmlformats.org/markup-compatibility/2006">
+    <mc:Choice xmlns:c14="http://schemas.microsoft.com/office/drawing/2007/8/2/chart" Requires="c14">
+      <c14:style val="102"/>
+    </mc:Choice>
+    <mc:Fallback>
+      <c:style val="2"/>
+    </mc:Fallback>
+  </mc:AlternateContent>
+  <c:chart>
+    <c:autoTitleDeleted val="1"/>
+    <c:plotArea>
+      <c:layout/>
+      <c:doughnutChart>
+        <c:varyColors val="1"/>
+        <c:ser>
+          <c:idx val="0"/>
+          <c:order val="0"/>
+          <c:tx>
+            <c:strRef>
+              <c:f>Sheet1!$B$1</c:f>
+              <c:strCache>
+                <c:ptCount val="1"/>
+                <c:pt idx="0">
+                  <c:v>Macros</c:v>
+                </c:pt>
+              </c:strCache>
+            </c:strRef>
+          </c:tx>
+          <c:dPt>
+            <c:idx val="0"/>
+            <c:bubble3D val="0"/>
+            <c:spPr>
+              <a:solidFill>
+                <a:srgbClr val="FDDD6E"/>
+              </a:solidFill>
+              <a:ln w="19050">
+                <a:solidFill>
+                  <a:schemeClr val="lt1"/>
+                </a:solidFill>
+              </a:ln>
+              <a:effectLst/>
+            </c:spPr>
+            <c:extLst>
+              <c:ext xmlns:c16="http://schemas.microsoft.com/office/drawing/2014/chart" uri="{C3380CC4-5D6E-409C-BE32-E72D297353CC}">
+                <c16:uniqueId val="{00000001-3D9D-4014-8236-1091F416613A}"/>
+              </c:ext>
+            </c:extLst>
+          </c:dPt>
+          <c:dPt>
+            <c:idx val="1"/>
+            <c:bubble3D val="0"/>
+            <c:spPr>
+              <a:solidFill>
+                <a:srgbClr val="FBA1C1"/>
+              </a:solidFill>
+              <a:ln w="19050">
+                <a:solidFill>
+                  <a:schemeClr val="lt1"/>
+                </a:solidFill>
+              </a:ln>
+              <a:effectLst/>
+            </c:spPr>
+            <c:extLst>
+              <c:ext xmlns:c16="http://schemas.microsoft.com/office/drawing/2014/chart" uri="{C3380CC4-5D6E-409C-BE32-E72D297353CC}">
+                <c16:uniqueId val="{00000003-3D9D-4014-8236-1091F416613A}"/>
+              </c:ext>
+            </c:extLst>
+          </c:dPt>
+          <c:dPt>
+            <c:idx val="2"/>
+            <c:bubble3D val="0"/>
+            <c:spPr>
+              <a:solidFill>
+                <a:srgbClr val="81E5E0"/>
+              </a:solidFill>
+              <a:ln w="19050">
+                <a:solidFill>
+                  <a:schemeClr val="lt1"/>
+                </a:solidFill>
+              </a:ln>
+              <a:effectLst/>
+            </c:spPr>
+            <c:extLst>
+              <c:ext xmlns:c16="http://schemas.microsoft.com/office/drawing/2014/chart" uri="{C3380CC4-5D6E-409C-BE32-E72D297353CC}">
+                <c16:uniqueId val="{00000005-3D9D-4014-8236-1091F416613A}"/>
+              </c:ext>
+            </c:extLst>
+          </c:dPt>
+          <c:dLbls>
+            <c:dLbl>
+              <c:idx val="0"/>
+              <c:layout>
+                <c:manualLayout>
+                  <c:x val="1.2888015429562385E-2"/>
+                  <c:y val="-9.727909011373612E-3"/>
+                </c:manualLayout>
+              </c:layout>
+              <c:tx>
+                <c:rich>
+                  <a:bodyPr rot="0" spcFirstLastPara="1" vertOverflow="ellipsis" vert="horz" wrap="square" lIns="38100" tIns="19050" rIns="38100" bIns="19050" anchor="ctr" anchorCtr="1">
+                    <a:spAutoFit/>
+                  </a:bodyPr>
+                  <a:lstStyle/>
+                  <a:p>
+                    <a:pPr>
+                      <a:defRPr sz="1600" b="0" i="0" u="none" strike="noStrike" kern="1200" baseline="0">
+                        <a:solidFill>
+                          <a:schemeClr val="tx1"/>
+                        </a:solidFill>
+                        <a:latin typeface="Peace Sans" panose="02000505040000020004" pitchFamily="50" charset="0"/>
+                        <a:ea typeface="+mn-ea"/>
+                        <a:cs typeface="+mn-cs"/>
+                      </a:defRPr>
+                    </a:pPr>
+                    <a:fld id="{DFB7144D-D253-41F7-862E-E39CD9AF34AC}" type="CATEGORYNAME">
+                      <a:rPr lang="en-US" sz="1600" smtClean="0">
+                        <a:solidFill>
+                          <a:schemeClr val="tx1"/>
+                        </a:solidFill>
+                        <a:latin typeface="Peace Sans" panose="02000505040000020004" pitchFamily="50" charset="0"/>
+                      </a:rPr>
+                      <a:pPr>
+                        <a:defRPr sz="1600">
+                          <a:solidFill>
+                            <a:schemeClr val="tx1"/>
+                          </a:solidFill>
+                          <a:latin typeface="Peace Sans" panose="02000505040000020004" pitchFamily="50" charset="0"/>
+                        </a:defRPr>
+                      </a:pPr>
+                      <a:t>[CATEGORY NAME]</a:t>
+                    </a:fld>
+                    <a:r>
+                      <a:rPr lang="en-US" sz="1600" baseline="0" dirty="0">
+                        <a:solidFill>
+                          <a:schemeClr val="tx1"/>
+                        </a:solidFill>
+                        <a:latin typeface="Peace Sans" panose="02000505040000020004" pitchFamily="50" charset="0"/>
+                      </a:rPr>
+                      <a:t> </a:t>
+                    </a:r>
+                  </a:p>
+                  <a:p>
+                    <a:pPr>
+                      <a:defRPr sz="1600">
+                        <a:solidFill>
+                          <a:schemeClr val="tx1"/>
+                        </a:solidFill>
+                        <a:latin typeface="Peace Sans" panose="02000505040000020004" pitchFamily="50" charset="0"/>
+                      </a:defRPr>
+                    </a:pPr>
+                    <a:fld id="{FB06E928-E1F7-4E74-8978-720C2A0D22B6}" type="VALUE">
+                      <a:rPr lang="en-US" sz="1600" baseline="0" smtClean="0">
+                        <a:solidFill>
+                          <a:schemeClr val="tx1"/>
+                        </a:solidFill>
+                        <a:latin typeface="Peace Sans" panose="02000505040000020004" pitchFamily="50" charset="0"/>
+                      </a:rPr>
+                      <a:pPr>
+                        <a:defRPr sz="1600">
+                          <a:solidFill>
+                            <a:schemeClr val="tx1"/>
+                          </a:solidFill>
+                          <a:latin typeface="Peace Sans" panose="02000505040000020004" pitchFamily="50" charset="0"/>
+                        </a:defRPr>
+                      </a:pPr>
+                      <a:t>[VALUE]</a:t>
+                    </a:fld>
+                    <a:endParaRPr lang="en-US"/>
+                  </a:p>
+                </c:rich>
+              </c:tx>
+              <c:spPr>
+                <a:noFill/>
+                <a:ln>
+                  <a:noFill/>
+                </a:ln>
+                <a:effectLst/>
+              </c:spPr>
+              <c:txPr>
+                <a:bodyPr rot="0" spcFirstLastPara="1" vertOverflow="ellipsis" vert="horz" wrap="square" lIns="38100" tIns="19050" rIns="38100" bIns="19050" anchor="ctr" anchorCtr="1">
+                  <a:spAutoFit/>
+                </a:bodyPr>
+                <a:lstStyle/>
+                <a:p>
+                  <a:pPr>
+                    <a:defRPr sz="1600" b="0" i="0" u="none" strike="noStrike" kern="1200" baseline="0">
+                      <a:solidFill>
+                        <a:schemeClr val="tx1"/>
+                      </a:solidFill>
+                      <a:latin typeface="Peace Sans" panose="02000505040000020004" pitchFamily="50" charset="0"/>
+                      <a:ea typeface="+mn-ea"/>
+                      <a:cs typeface="+mn-cs"/>
+                    </a:defRPr>
+                  </a:pPr>
+                  <a:endParaRPr lang="en-US"/>
+                </a:p>
+              </c:txPr>
+              <c:showLegendKey val="0"/>
+              <c:showVal val="1"/>
+              <c:showCatName val="1"/>
+              <c:showSerName val="0"/>
+              <c:showPercent val="0"/>
+              <c:showBubbleSize val="0"/>
+              <c:extLst>
+                <c:ext xmlns:c15="http://schemas.microsoft.com/office/drawing/2012/chart" uri="{CE6537A1-D6FC-4f65-9D91-7224C49458BB}">
+                  <c15:dlblFieldTable/>
+                  <c15:showDataLabelsRange val="0"/>
+                </c:ext>
+                <c:ext xmlns:c16="http://schemas.microsoft.com/office/drawing/2014/chart" uri="{C3380CC4-5D6E-409C-BE32-E72D297353CC}">
+                  <c16:uniqueId val="{00000001-3D9D-4014-8236-1091F416613A}"/>
+                </c:ext>
+              </c:extLst>
+            </c:dLbl>
+            <c:dLbl>
+              <c:idx val="1"/>
+              <c:layout>
+                <c:manualLayout>
+                  <c:x val="-8.8846047471815882E-3"/>
+                  <c:y val="-1.0902887139107611E-2"/>
+                </c:manualLayout>
+              </c:layout>
+              <c:tx>
+                <c:rich>
+                  <a:bodyPr rot="0" spcFirstLastPara="1" vertOverflow="ellipsis" vert="horz" wrap="square" lIns="38100" tIns="19050" rIns="38100" bIns="19050" anchor="ctr" anchorCtr="1">
+                    <a:spAutoFit/>
+                  </a:bodyPr>
+                  <a:lstStyle/>
+                  <a:p>
+                    <a:pPr>
+                      <a:defRPr sz="1600" b="0" i="0" u="none" strike="noStrike" kern="1200" baseline="0">
+                        <a:solidFill>
+                          <a:schemeClr val="tx1"/>
+                        </a:solidFill>
+                        <a:latin typeface="Peace Sans" panose="02000505040000020004" pitchFamily="50" charset="0"/>
+                        <a:ea typeface="+mn-ea"/>
+                        <a:cs typeface="+mn-cs"/>
+                      </a:defRPr>
+                    </a:pPr>
+                    <a:fld id="{B779D77C-2615-45A8-BDAA-FDF2BF81641D}" type="CATEGORYNAME">
+                      <a:rPr lang="en-US" sz="1600" smtClean="0">
+                        <a:solidFill>
+                          <a:schemeClr val="tx1"/>
+                        </a:solidFill>
+                        <a:latin typeface="Peace Sans" panose="02000505040000020004" pitchFamily="50" charset="0"/>
+                      </a:rPr>
+                      <a:pPr>
+                        <a:defRPr sz="1600">
+                          <a:solidFill>
+                            <a:schemeClr val="tx1"/>
+                          </a:solidFill>
+                          <a:latin typeface="Peace Sans" panose="02000505040000020004" pitchFamily="50" charset="0"/>
+                        </a:defRPr>
+                      </a:pPr>
+                      <a:t>[CATEGORY NAME]</a:t>
+                    </a:fld>
+                    <a:endParaRPr lang="en-US" sz="1600" dirty="0">
+                      <a:solidFill>
+                        <a:schemeClr val="tx1"/>
+                      </a:solidFill>
+                      <a:latin typeface="Peace Sans" panose="02000505040000020004" pitchFamily="50" charset="0"/>
+                    </a:endParaRPr>
+                  </a:p>
+                  <a:p>
+                    <a:pPr>
+                      <a:defRPr sz="1600">
+                        <a:solidFill>
+                          <a:schemeClr val="tx1"/>
+                        </a:solidFill>
+                        <a:latin typeface="Peace Sans" panose="02000505040000020004" pitchFamily="50" charset="0"/>
+                      </a:defRPr>
+                    </a:pPr>
+                    <a:r>
+                      <a:rPr lang="en-US" sz="1600" baseline="0" dirty="0">
+                        <a:solidFill>
+                          <a:schemeClr val="tx1"/>
+                        </a:solidFill>
+                        <a:latin typeface="Peace Sans" panose="02000505040000020004" pitchFamily="50" charset="0"/>
+                      </a:rPr>
+                      <a:t> </a:t>
+                    </a:r>
+                    <a:fld id="{69FDA7E2-B396-4F80-8BCF-ED09DB61E887}" type="VALUE">
+                      <a:rPr lang="en-US" sz="1600" baseline="0">
+                        <a:solidFill>
+                          <a:schemeClr val="tx1"/>
+                        </a:solidFill>
+                        <a:latin typeface="Peace Sans" panose="02000505040000020004" pitchFamily="50" charset="0"/>
+                      </a:rPr>
+                      <a:pPr>
+                        <a:defRPr sz="1600">
+                          <a:solidFill>
+                            <a:schemeClr val="tx1"/>
+                          </a:solidFill>
+                          <a:latin typeface="Peace Sans" panose="02000505040000020004" pitchFamily="50" charset="0"/>
+                        </a:defRPr>
+                      </a:pPr>
+                      <a:t>[VALUE]</a:t>
+                    </a:fld>
+                    <a:endParaRPr lang="en-US" sz="1600" baseline="0" dirty="0">
+                      <a:solidFill>
+                        <a:schemeClr val="tx1"/>
+                      </a:solidFill>
+                      <a:latin typeface="Peace Sans" panose="02000505040000020004" pitchFamily="50" charset="0"/>
+                    </a:endParaRPr>
+                  </a:p>
+                </c:rich>
+              </c:tx>
+              <c:spPr>
+                <a:noFill/>
+                <a:ln>
+                  <a:noFill/>
+                </a:ln>
+                <a:effectLst/>
+              </c:spPr>
+              <c:txPr>
+                <a:bodyPr rot="0" spcFirstLastPara="1" vertOverflow="ellipsis" vert="horz" wrap="square" lIns="38100" tIns="19050" rIns="38100" bIns="19050" anchor="ctr" anchorCtr="1">
+                  <a:spAutoFit/>
+                </a:bodyPr>
+                <a:lstStyle/>
+                <a:p>
+                  <a:pPr>
+                    <a:defRPr sz="1600" b="0" i="0" u="none" strike="noStrike" kern="1200" baseline="0">
+                      <a:solidFill>
+                        <a:schemeClr val="tx1"/>
+                      </a:solidFill>
+                      <a:latin typeface="Peace Sans" panose="02000505040000020004" pitchFamily="50" charset="0"/>
+                      <a:ea typeface="+mn-ea"/>
+                      <a:cs typeface="+mn-cs"/>
+                    </a:defRPr>
+                  </a:pPr>
+                  <a:endParaRPr lang="en-US"/>
+                </a:p>
+              </c:txPr>
+              <c:showLegendKey val="0"/>
+              <c:showVal val="1"/>
+              <c:showCatName val="1"/>
+              <c:showSerName val="0"/>
+              <c:showPercent val="0"/>
+              <c:showBubbleSize val="0"/>
+              <c:extLst>
+                <c:ext xmlns:c15="http://schemas.microsoft.com/office/drawing/2012/chart" uri="{CE6537A1-D6FC-4f65-9D91-7224C49458BB}">
+                  <c15:dlblFieldTable/>
+                  <c15:showDataLabelsRange val="0"/>
+                </c:ext>
+                <c:ext xmlns:c16="http://schemas.microsoft.com/office/drawing/2014/chart" uri="{C3380CC4-5D6E-409C-BE32-E72D297353CC}">
+                  <c16:uniqueId val="{00000003-3D9D-4014-8236-1091F416613A}"/>
+                </c:ext>
+              </c:extLst>
+            </c:dLbl>
+            <c:dLbl>
+              <c:idx val="2"/>
+              <c:layout>
+                <c:manualLayout>
+                  <c:x val="2.1754991332762611E-3"/>
+                  <c:y val="9.4240303295421409E-4"/>
+                </c:manualLayout>
+              </c:layout>
+              <c:tx>
+                <c:rich>
+                  <a:bodyPr rot="0" spcFirstLastPara="1" vertOverflow="ellipsis" vert="horz" wrap="square" lIns="38100" tIns="19050" rIns="38100" bIns="19050" anchor="ctr" anchorCtr="0">
+                    <a:spAutoFit/>
+                  </a:bodyPr>
+                  <a:lstStyle/>
+                  <a:p>
+                    <a:pPr algn="ctr">
+                      <a:defRPr sz="1600" b="0" i="0" u="none" strike="noStrike" kern="1200" baseline="0">
+                        <a:solidFill>
+                          <a:schemeClr val="tx1"/>
+                        </a:solidFill>
+                        <a:latin typeface="Peace Sans" panose="02000505040000020004" pitchFamily="50" charset="0"/>
+                        <a:ea typeface="+mn-ea"/>
+                        <a:cs typeface="+mn-cs"/>
+                      </a:defRPr>
+                    </a:pPr>
+                    <a:fld id="{E4B69AE3-C9A2-4052-8EDD-03F50E3DFF5B}" type="CATEGORYNAME">
+                      <a:rPr lang="en-US" sz="1600" smtClean="0">
+                        <a:solidFill>
+                          <a:schemeClr val="tx1"/>
+                        </a:solidFill>
+                        <a:latin typeface="Peace Sans" panose="02000505040000020004" pitchFamily="50" charset="0"/>
+                      </a:rPr>
+                      <a:pPr algn="ctr">
+                        <a:defRPr sz="1600">
+                          <a:solidFill>
+                            <a:schemeClr val="tx1"/>
+                          </a:solidFill>
+                          <a:latin typeface="Peace Sans" panose="02000505040000020004" pitchFamily="50" charset="0"/>
+                        </a:defRPr>
+                      </a:pPr>
+                      <a:t>[CATEGORY NAME]</a:t>
+                    </a:fld>
+                    <a:r>
+                      <a:rPr lang="en-US" sz="1600" baseline="0" dirty="0">
+                        <a:solidFill>
+                          <a:schemeClr val="tx1"/>
+                        </a:solidFill>
+                        <a:latin typeface="Peace Sans" panose="02000505040000020004" pitchFamily="50" charset="0"/>
+                      </a:rPr>
+                      <a:t> </a:t>
+                    </a:r>
+                  </a:p>
+                  <a:p>
+                    <a:pPr algn="ctr">
+                      <a:defRPr sz="1600">
+                        <a:solidFill>
+                          <a:schemeClr val="tx1"/>
+                        </a:solidFill>
+                        <a:latin typeface="Peace Sans" panose="02000505040000020004" pitchFamily="50" charset="0"/>
+                      </a:defRPr>
+                    </a:pPr>
+                    <a:fld id="{422174A9-A5E6-4050-9BD4-6F61863C336D}" type="VALUE">
+                      <a:rPr lang="en-US" sz="1600" baseline="0" smtClean="0">
+                        <a:solidFill>
+                          <a:schemeClr val="tx1"/>
+                        </a:solidFill>
+                        <a:latin typeface="Peace Sans" panose="02000505040000020004" pitchFamily="50" charset="0"/>
+                      </a:rPr>
+                      <a:pPr algn="ctr">
+                        <a:defRPr sz="1600">
+                          <a:solidFill>
+                            <a:schemeClr val="tx1"/>
+                          </a:solidFill>
+                          <a:latin typeface="Peace Sans" panose="02000505040000020004" pitchFamily="50" charset="0"/>
+                        </a:defRPr>
+                      </a:pPr>
+                      <a:t>[VALUE]</a:t>
+                    </a:fld>
+                    <a:endParaRPr lang="en-US"/>
+                  </a:p>
+                </c:rich>
+              </c:tx>
+              <c:spPr>
+                <a:noFill/>
+                <a:ln>
+                  <a:noFill/>
+                </a:ln>
+                <a:effectLst/>
+              </c:spPr>
+              <c:txPr>
+                <a:bodyPr rot="0" spcFirstLastPara="1" vertOverflow="ellipsis" vert="horz" wrap="square" lIns="38100" tIns="19050" rIns="38100" bIns="19050" anchor="ctr" anchorCtr="0">
+                  <a:spAutoFit/>
+                </a:bodyPr>
+                <a:lstStyle/>
+                <a:p>
+                  <a:pPr algn="ctr">
+                    <a:defRPr sz="1600" b="0" i="0" u="none" strike="noStrike" kern="1200" baseline="0">
+                      <a:solidFill>
+                        <a:schemeClr val="tx1"/>
+                      </a:solidFill>
+                      <a:latin typeface="Peace Sans" panose="02000505040000020004" pitchFamily="50" charset="0"/>
+                      <a:ea typeface="+mn-ea"/>
+                      <a:cs typeface="+mn-cs"/>
+                    </a:defRPr>
+                  </a:pPr>
+                  <a:endParaRPr lang="en-US"/>
+                </a:p>
+              </c:txPr>
+              <c:showLegendKey val="0"/>
+              <c:showVal val="1"/>
+              <c:showCatName val="1"/>
+              <c:showSerName val="0"/>
+              <c:showPercent val="0"/>
+              <c:showBubbleSize val="0"/>
+              <c:extLst>
+                <c:ext xmlns:c15="http://schemas.microsoft.com/office/drawing/2012/chart" uri="{CE6537A1-D6FC-4f65-9D91-7224C49458BB}">
+                  <c15:dlblFieldTable/>
+                  <c15:showDataLabelsRange val="0"/>
+                </c:ext>
+                <c:ext xmlns:c16="http://schemas.microsoft.com/office/drawing/2014/chart" uri="{C3380CC4-5D6E-409C-BE32-E72D297353CC}">
+                  <c16:uniqueId val="{00000005-3D9D-4014-8236-1091F416613A}"/>
+                </c:ext>
+              </c:extLst>
+            </c:dLbl>
+            <c:spPr>
+              <a:noFill/>
+              <a:ln>
+                <a:noFill/>
+              </a:ln>
+              <a:effectLst/>
+            </c:spPr>
+            <c:txPr>
+              <a:bodyPr rot="0" spcFirstLastPara="1" vertOverflow="ellipsis" vert="horz" wrap="square" lIns="38100" tIns="19050" rIns="38100" bIns="19050" anchor="ctr" anchorCtr="1">
+                <a:spAutoFit/>
+              </a:bodyPr>
+              <a:lstStyle/>
+              <a:p>
+                <a:pPr>
+                  <a:defRPr sz="1197" b="0" i="0" u="none" strike="noStrike" kern="1200" baseline="0">
+                    <a:solidFill>
+                      <a:schemeClr val="tx1"/>
+                    </a:solidFill>
+                    <a:latin typeface="+mn-lt"/>
+                    <a:ea typeface="+mn-ea"/>
+                    <a:cs typeface="+mn-cs"/>
+                  </a:defRPr>
+                </a:pPr>
+                <a:endParaRPr lang="en-US"/>
+              </a:p>
+            </c:txPr>
+            <c:showLegendKey val="0"/>
+            <c:showVal val="1"/>
+            <c:showCatName val="1"/>
+            <c:showSerName val="0"/>
+            <c:showPercent val="0"/>
+            <c:showBubbleSize val="0"/>
+            <c:showLeaderLines val="0"/>
+            <c:extLst>
+              <c:ext xmlns:c15="http://schemas.microsoft.com/office/drawing/2012/chart" uri="{CE6537A1-D6FC-4f65-9D91-7224C49458BB}"/>
+            </c:extLst>
+          </c:dLbls>
+          <c:cat>
+            <c:strRef>
+              <c:f>Sheet1!$A$2:$A$4</c:f>
+              <c:strCache>
+                <c:ptCount val="3"/>
+                <c:pt idx="0">
+                  <c:v>Carbs</c:v>
+                </c:pt>
+                <c:pt idx="1">
+                  <c:v>Protein</c:v>
+                </c:pt>
+                <c:pt idx="2">
+                  <c:v>Fats</c:v>
+                </c:pt>
+              </c:strCache>
+            </c:strRef>
+          </c:cat>
+          <c:val>
+            <c:numRef>
+              <c:f>Sheet1!$B$2:$B$4</c:f>
+              <c:numCache>
+                <c:formatCode>0%</c:formatCode>
+                <c:ptCount val="3"/>
+                <c:pt idx="0">
+                  <c:v>0.17</c:v>
+                </c:pt>
+                <c:pt idx="1">
+                  <c:v>0.64</c:v>
+                </c:pt>
+                <c:pt idx="2">
+                  <c:v>0.19</c:v>
+                </c:pt>
+              </c:numCache>
+            </c:numRef>
+          </c:val>
+          <c:extLst>
+            <c:ext xmlns:c16="http://schemas.microsoft.com/office/drawing/2014/chart" uri="{C3380CC4-5D6E-409C-BE32-E72D297353CC}">
+              <c16:uniqueId val="{00000006-3D9D-4014-8236-1091F416613A}"/>
+            </c:ext>
+          </c:extLst>
+        </c:ser>
+        <c:dLbls>
+          <c:showLegendKey val="0"/>
+          <c:showVal val="0"/>
+          <c:showCatName val="0"/>
+          <c:showSerName val="0"/>
+          <c:showPercent val="0"/>
+          <c:showBubbleSize val="0"/>
+          <c:showLeaderLines val="0"/>
+        </c:dLbls>
+        <c:firstSliceAng val="0"/>
+        <c:holeSize val="50"/>
+      </c:doughnutChart>
+      <c:spPr>
+        <a:noFill/>
+        <a:ln>
+          <a:noFill/>
+        </a:ln>
+        <a:effectLst/>
+      </c:spPr>
+    </c:plotArea>
+    <c:plotVisOnly val="1"/>
+    <c:dispBlanksAs val="gap"/>
+    <c:extLst>
+      <c:ext xmlns:c16r3="http://schemas.microsoft.com/office/drawing/2017/03/chart" uri="{56B9EC1D-385E-4148-901F-78D8002777C0}">
+        <c16r3:dataDisplayOptions16>
+          <c16r3:dispNaAsBlank val="1"/>
+        </c16r3:dataDisplayOptions16>
+      </c:ext>
+    </c:extLst>
+    <c:showDLblsOverMax val="0"/>
+  </c:chart>
+  <c:spPr>
+    <a:noFill/>
+    <a:ln>
+      <a:noFill/>
+    </a:ln>
+    <a:effectLst/>
+  </c:spPr>
+  <c:txPr>
+    <a:bodyPr/>
+    <a:lstStyle/>
+    <a:p>
+      <a:pPr>
+        <a:defRPr/>
+      </a:pPr>
+      <a:endParaRPr lang="en-US"/>
+    </a:p>
+  </c:txPr>
+  <c:externalData r:id="rId3">
+    <c:autoUpdate val="0"/>
+  </c:externalData>
+</c:chartSpace>
+</file>
+
 <file path=ppt/charts/colors1.xml><?xml version="1.0" encoding="utf-8"?>
 <cs:colorStyle xmlns:cs="http://schemas.microsoft.com/office/drawing/2012/chartStyle" xmlns:a="http://schemas.openxmlformats.org/drawingml/2006/main" meth="cycle" id="10">
   <a:schemeClr val="accent1"/>
@@ -3371,6 +4596,86 @@
 </cs:colorStyle>
 </file>
 
+<file path=ppt/charts/colors6.xml><?xml version="1.0" encoding="utf-8"?>
+<cs:colorStyle xmlns:cs="http://schemas.microsoft.com/office/drawing/2012/chartStyle" xmlns:a="http://schemas.openxmlformats.org/drawingml/2006/main" meth="cycle" id="10">
+  <a:schemeClr val="accent1"/>
+  <a:schemeClr val="accent2"/>
+  <a:schemeClr val="accent3"/>
+  <a:schemeClr val="accent4"/>
+  <a:schemeClr val="accent5"/>
+  <a:schemeClr val="accent6"/>
+  <cs:variation/>
+  <cs:variation>
+    <a:lumMod val="60000"/>
+  </cs:variation>
+  <cs:variation>
+    <a:lumMod val="80000"/>
+    <a:lumOff val="20000"/>
+  </cs:variation>
+  <cs:variation>
+    <a:lumMod val="80000"/>
+  </cs:variation>
+  <cs:variation>
+    <a:lumMod val="60000"/>
+    <a:lumOff val="40000"/>
+  </cs:variation>
+  <cs:variation>
+    <a:lumMod val="50000"/>
+  </cs:variation>
+  <cs:variation>
+    <a:lumMod val="70000"/>
+    <a:lumOff val="30000"/>
+  </cs:variation>
+  <cs:variation>
+    <a:lumMod val="70000"/>
+  </cs:variation>
+  <cs:variation>
+    <a:lumMod val="50000"/>
+    <a:lumOff val="50000"/>
+  </cs:variation>
+</cs:colorStyle>
+</file>
+
+<file path=ppt/charts/colors7.xml><?xml version="1.0" encoding="utf-8"?>
+<cs:colorStyle xmlns:cs="http://schemas.microsoft.com/office/drawing/2012/chartStyle" xmlns:a="http://schemas.openxmlformats.org/drawingml/2006/main" meth="cycle" id="10">
+  <a:schemeClr val="accent1"/>
+  <a:schemeClr val="accent2"/>
+  <a:schemeClr val="accent3"/>
+  <a:schemeClr val="accent4"/>
+  <a:schemeClr val="accent5"/>
+  <a:schemeClr val="accent6"/>
+  <cs:variation/>
+  <cs:variation>
+    <a:lumMod val="60000"/>
+  </cs:variation>
+  <cs:variation>
+    <a:lumMod val="80000"/>
+    <a:lumOff val="20000"/>
+  </cs:variation>
+  <cs:variation>
+    <a:lumMod val="80000"/>
+  </cs:variation>
+  <cs:variation>
+    <a:lumMod val="60000"/>
+    <a:lumOff val="40000"/>
+  </cs:variation>
+  <cs:variation>
+    <a:lumMod val="50000"/>
+  </cs:variation>
+  <cs:variation>
+    <a:lumMod val="70000"/>
+    <a:lumOff val="30000"/>
+  </cs:variation>
+  <cs:variation>
+    <a:lumMod val="70000"/>
+  </cs:variation>
+  <cs:variation>
+    <a:lumMod val="50000"/>
+    <a:lumOff val="50000"/>
+  </cs:variation>
+</cs:colorStyle>
+</file>
+
 <file path=ppt/charts/style1.xml><?xml version="1.0" encoding="utf-8"?>
 <cs:chartStyle xmlns:cs="http://schemas.microsoft.com/office/drawing/2012/chartStyle" xmlns:a="http://schemas.openxmlformats.org/drawingml/2006/main" id="251">
   <cs:axisTitle>
@@ -5448,6 +6753,1044 @@
 </file>
 
 <file path=ppt/charts/style5.xml><?xml version="1.0" encoding="utf-8"?>
+<cs:chartStyle xmlns:cs="http://schemas.microsoft.com/office/drawing/2012/chartStyle" xmlns:a="http://schemas.openxmlformats.org/drawingml/2006/main" id="251">
+  <cs:axisTitle>
+    <cs:lnRef idx="0"/>
+    <cs:fillRef idx="0"/>
+    <cs:effectRef idx="0"/>
+    <cs:fontRef idx="minor">
+      <a:schemeClr val="tx1">
+        <a:lumMod val="65000"/>
+        <a:lumOff val="35000"/>
+      </a:schemeClr>
+    </cs:fontRef>
+    <cs:defRPr sz="1330" kern="1200"/>
+  </cs:axisTitle>
+  <cs:categoryAxis>
+    <cs:lnRef idx="0"/>
+    <cs:fillRef idx="0"/>
+    <cs:effectRef idx="0"/>
+    <cs:fontRef idx="minor">
+      <a:schemeClr val="tx1">
+        <a:lumMod val="65000"/>
+        <a:lumOff val="35000"/>
+      </a:schemeClr>
+    </cs:fontRef>
+    <cs:spPr>
+      <a:ln w="9525" cap="flat" cmpd="sng" algn="ctr">
+        <a:solidFill>
+          <a:schemeClr val="tx1">
+            <a:lumMod val="15000"/>
+            <a:lumOff val="85000"/>
+          </a:schemeClr>
+        </a:solidFill>
+        <a:round/>
+      </a:ln>
+    </cs:spPr>
+    <cs:defRPr sz="1197" kern="1200"/>
+  </cs:categoryAxis>
+  <cs:chartArea mods="allowNoFillOverride allowNoLineOverride">
+    <cs:lnRef idx="0"/>
+    <cs:fillRef idx="0"/>
+    <cs:effectRef idx="0"/>
+    <cs:fontRef idx="minor">
+      <a:schemeClr val="tx1"/>
+    </cs:fontRef>
+    <cs:spPr>
+      <a:solidFill>
+        <a:schemeClr val="bg1"/>
+      </a:solidFill>
+      <a:ln w="9525" cap="flat" cmpd="sng" algn="ctr">
+        <a:solidFill>
+          <a:schemeClr val="tx1">
+            <a:lumMod val="15000"/>
+            <a:lumOff val="85000"/>
+          </a:schemeClr>
+        </a:solidFill>
+        <a:round/>
+      </a:ln>
+    </cs:spPr>
+    <cs:defRPr sz="1197" kern="1200"/>
+  </cs:chartArea>
+  <cs:dataLabel>
+    <cs:lnRef idx="0"/>
+    <cs:fillRef idx="0"/>
+    <cs:effectRef idx="0"/>
+    <cs:fontRef idx="minor">
+      <a:schemeClr val="tx1">
+        <a:lumMod val="75000"/>
+        <a:lumOff val="25000"/>
+      </a:schemeClr>
+    </cs:fontRef>
+    <cs:defRPr sz="1197" kern="1200"/>
+  </cs:dataLabel>
+  <cs:dataLabelCallout>
+    <cs:lnRef idx="0"/>
+    <cs:fillRef idx="0"/>
+    <cs:effectRef idx="0"/>
+    <cs:fontRef idx="minor">
+      <a:schemeClr val="dk1">
+        <a:lumMod val="65000"/>
+        <a:lumOff val="35000"/>
+      </a:schemeClr>
+    </cs:fontRef>
+    <cs:spPr>
+      <a:solidFill>
+        <a:schemeClr val="lt1"/>
+      </a:solidFill>
+      <a:ln>
+        <a:solidFill>
+          <a:schemeClr val="dk1">
+            <a:lumMod val="25000"/>
+            <a:lumOff val="75000"/>
+          </a:schemeClr>
+        </a:solidFill>
+      </a:ln>
+    </cs:spPr>
+    <cs:defRPr sz="1197" kern="1200"/>
+    <cs:bodyPr rot="0" spcFirstLastPara="1" vertOverflow="clip" horzOverflow="clip" vert="horz" wrap="square" lIns="36576" tIns="18288" rIns="36576" bIns="18288" anchor="ctr" anchorCtr="1">
+      <a:spAutoFit/>
+    </cs:bodyPr>
+  </cs:dataLabelCallout>
+  <cs:dataPoint>
+    <cs:lnRef idx="0"/>
+    <cs:fillRef idx="1">
+      <cs:styleClr val="auto"/>
+    </cs:fillRef>
+    <cs:effectRef idx="0"/>
+    <cs:fontRef idx="minor">
+      <a:schemeClr val="tx1"/>
+    </cs:fontRef>
+    <cs:spPr>
+      <a:ln w="19050">
+        <a:solidFill>
+          <a:schemeClr val="lt1"/>
+        </a:solidFill>
+      </a:ln>
+    </cs:spPr>
+  </cs:dataPoint>
+  <cs:dataPoint3D>
+    <cs:lnRef idx="0"/>
+    <cs:fillRef idx="1">
+      <cs:styleClr val="auto"/>
+    </cs:fillRef>
+    <cs:effectRef idx="0"/>
+    <cs:fontRef idx="minor">
+      <a:schemeClr val="tx1"/>
+    </cs:fontRef>
+    <cs:spPr>
+      <a:ln w="25400">
+        <a:solidFill>
+          <a:schemeClr val="lt1"/>
+        </a:solidFill>
+      </a:ln>
+    </cs:spPr>
+  </cs:dataPoint3D>
+  <cs:dataPointLine>
+    <cs:lnRef idx="0">
+      <cs:styleClr val="auto"/>
+    </cs:lnRef>
+    <cs:fillRef idx="0"/>
+    <cs:effectRef idx="0"/>
+    <cs:fontRef idx="minor">
+      <a:schemeClr val="tx1"/>
+    </cs:fontRef>
+    <cs:spPr>
+      <a:ln w="28575" cap="rnd">
+        <a:solidFill>
+          <a:schemeClr val="phClr"/>
+        </a:solidFill>
+        <a:round/>
+      </a:ln>
+    </cs:spPr>
+  </cs:dataPointLine>
+  <cs:dataPointMarker>
+    <cs:lnRef idx="0">
+      <cs:styleClr val="auto"/>
+    </cs:lnRef>
+    <cs:fillRef idx="1">
+      <cs:styleClr val="auto"/>
+    </cs:fillRef>
+    <cs:effectRef idx="0"/>
+    <cs:fontRef idx="minor">
+      <a:schemeClr val="tx1"/>
+    </cs:fontRef>
+    <cs:spPr>
+      <a:ln w="9525">
+        <a:solidFill>
+          <a:schemeClr val="phClr"/>
+        </a:solidFill>
+      </a:ln>
+    </cs:spPr>
+  </cs:dataPointMarker>
+  <cs:dataPointMarkerLayout symbol="circle" size="5"/>
+  <cs:dataPointWireframe>
+    <cs:lnRef idx="0">
+      <cs:styleClr val="auto"/>
+    </cs:lnRef>
+    <cs:fillRef idx="0"/>
+    <cs:effectRef idx="0"/>
+    <cs:fontRef idx="minor">
+      <a:schemeClr val="tx1"/>
+    </cs:fontRef>
+    <cs:spPr>
+      <a:ln w="9525" cap="rnd">
+        <a:solidFill>
+          <a:schemeClr val="phClr"/>
+        </a:solidFill>
+        <a:round/>
+      </a:ln>
+    </cs:spPr>
+  </cs:dataPointWireframe>
+  <cs:dataTable>
+    <cs:lnRef idx="0"/>
+    <cs:fillRef idx="0"/>
+    <cs:effectRef idx="0"/>
+    <cs:fontRef idx="minor">
+      <a:schemeClr val="tx1">
+        <a:lumMod val="65000"/>
+        <a:lumOff val="35000"/>
+      </a:schemeClr>
+    </cs:fontRef>
+    <cs:spPr>
+      <a:noFill/>
+      <a:ln w="9525" cap="flat" cmpd="sng" algn="ctr">
+        <a:solidFill>
+          <a:schemeClr val="tx1">
+            <a:lumMod val="15000"/>
+            <a:lumOff val="85000"/>
+          </a:schemeClr>
+        </a:solidFill>
+        <a:round/>
+      </a:ln>
+    </cs:spPr>
+    <cs:defRPr sz="1197" kern="1200"/>
+  </cs:dataTable>
+  <cs:downBar>
+    <cs:lnRef idx="0"/>
+    <cs:fillRef idx="0"/>
+    <cs:effectRef idx="0"/>
+    <cs:fontRef idx="minor">
+      <a:schemeClr val="tx1"/>
+    </cs:fontRef>
+    <cs:spPr>
+      <a:solidFill>
+        <a:schemeClr val="dk1">
+          <a:lumMod val="75000"/>
+          <a:lumOff val="25000"/>
+        </a:schemeClr>
+      </a:solidFill>
+      <a:ln w="9525" cap="flat" cmpd="sng" algn="ctr">
+        <a:solidFill>
+          <a:schemeClr val="tx1">
+            <a:lumMod val="65000"/>
+            <a:lumOff val="35000"/>
+          </a:schemeClr>
+        </a:solidFill>
+        <a:round/>
+      </a:ln>
+    </cs:spPr>
+  </cs:downBar>
+  <cs:dropLine>
+    <cs:lnRef idx="0"/>
+    <cs:fillRef idx="0"/>
+    <cs:effectRef idx="0"/>
+    <cs:fontRef idx="minor">
+      <a:schemeClr val="tx1"/>
+    </cs:fontRef>
+    <cs:spPr>
+      <a:ln w="9525" cap="flat" cmpd="sng" algn="ctr">
+        <a:solidFill>
+          <a:schemeClr val="tx1">
+            <a:lumMod val="35000"/>
+            <a:lumOff val="65000"/>
+          </a:schemeClr>
+        </a:solidFill>
+        <a:round/>
+      </a:ln>
+    </cs:spPr>
+  </cs:dropLine>
+  <cs:errorBar>
+    <cs:lnRef idx="0"/>
+    <cs:fillRef idx="0"/>
+    <cs:effectRef idx="0"/>
+    <cs:fontRef idx="minor">
+      <a:schemeClr val="tx1"/>
+    </cs:fontRef>
+    <cs:spPr>
+      <a:ln w="9525" cap="flat" cmpd="sng" algn="ctr">
+        <a:solidFill>
+          <a:schemeClr val="tx1">
+            <a:lumMod val="65000"/>
+            <a:lumOff val="35000"/>
+          </a:schemeClr>
+        </a:solidFill>
+        <a:round/>
+      </a:ln>
+    </cs:spPr>
+  </cs:errorBar>
+  <cs:floor>
+    <cs:lnRef idx="0"/>
+    <cs:fillRef idx="0"/>
+    <cs:effectRef idx="0"/>
+    <cs:fontRef idx="minor">
+      <a:schemeClr val="tx1"/>
+    </cs:fontRef>
+    <cs:spPr>
+      <a:noFill/>
+      <a:ln>
+        <a:noFill/>
+      </a:ln>
+    </cs:spPr>
+  </cs:floor>
+  <cs:gridlineMajor>
+    <cs:lnRef idx="0"/>
+    <cs:fillRef idx="0"/>
+    <cs:effectRef idx="0"/>
+    <cs:fontRef idx="minor">
+      <a:schemeClr val="tx1"/>
+    </cs:fontRef>
+    <cs:spPr>
+      <a:ln w="9525" cap="flat" cmpd="sng" algn="ctr">
+        <a:solidFill>
+          <a:schemeClr val="tx1">
+            <a:lumMod val="15000"/>
+            <a:lumOff val="85000"/>
+          </a:schemeClr>
+        </a:solidFill>
+        <a:round/>
+      </a:ln>
+    </cs:spPr>
+  </cs:gridlineMajor>
+  <cs:gridlineMinor>
+    <cs:lnRef idx="0"/>
+    <cs:fillRef idx="0"/>
+    <cs:effectRef idx="0"/>
+    <cs:fontRef idx="minor">
+      <a:schemeClr val="tx1"/>
+    </cs:fontRef>
+    <cs:spPr>
+      <a:ln w="9525" cap="flat" cmpd="sng" algn="ctr">
+        <a:solidFill>
+          <a:schemeClr val="tx1">
+            <a:lumMod val="5000"/>
+            <a:lumOff val="95000"/>
+          </a:schemeClr>
+        </a:solidFill>
+        <a:round/>
+      </a:ln>
+    </cs:spPr>
+  </cs:gridlineMinor>
+  <cs:hiLoLine>
+    <cs:lnRef idx="0"/>
+    <cs:fillRef idx="0"/>
+    <cs:effectRef idx="0"/>
+    <cs:fontRef idx="minor">
+      <a:schemeClr val="tx1"/>
+    </cs:fontRef>
+    <cs:spPr>
+      <a:ln w="9525" cap="flat" cmpd="sng" algn="ctr">
+        <a:solidFill>
+          <a:schemeClr val="tx1">
+            <a:lumMod val="50000"/>
+            <a:lumOff val="50000"/>
+          </a:schemeClr>
+        </a:solidFill>
+        <a:round/>
+      </a:ln>
+    </cs:spPr>
+  </cs:hiLoLine>
+  <cs:leaderLine>
+    <cs:lnRef idx="0"/>
+    <cs:fillRef idx="0"/>
+    <cs:effectRef idx="0"/>
+    <cs:fontRef idx="minor">
+      <a:schemeClr val="tx1"/>
+    </cs:fontRef>
+    <cs:spPr>
+      <a:ln w="9525" cap="flat" cmpd="sng" algn="ctr">
+        <a:solidFill>
+          <a:schemeClr val="tx1">
+            <a:lumMod val="35000"/>
+            <a:lumOff val="65000"/>
+          </a:schemeClr>
+        </a:solidFill>
+        <a:round/>
+      </a:ln>
+    </cs:spPr>
+  </cs:leaderLine>
+  <cs:legend>
+    <cs:lnRef idx="0"/>
+    <cs:fillRef idx="0"/>
+    <cs:effectRef idx="0"/>
+    <cs:fontRef idx="minor">
+      <a:schemeClr val="tx1">
+        <a:lumMod val="65000"/>
+        <a:lumOff val="35000"/>
+      </a:schemeClr>
+    </cs:fontRef>
+    <cs:defRPr sz="1197" kern="1200"/>
+  </cs:legend>
+  <cs:plotArea mods="allowNoFillOverride allowNoLineOverride">
+    <cs:lnRef idx="0"/>
+    <cs:fillRef idx="0"/>
+    <cs:effectRef idx="0"/>
+    <cs:fontRef idx="minor">
+      <a:schemeClr val="tx1"/>
+    </cs:fontRef>
+  </cs:plotArea>
+  <cs:plotArea3D mods="allowNoFillOverride allowNoLineOverride">
+    <cs:lnRef idx="0"/>
+    <cs:fillRef idx="0"/>
+    <cs:effectRef idx="0"/>
+    <cs:fontRef idx="minor">
+      <a:schemeClr val="tx1"/>
+    </cs:fontRef>
+  </cs:plotArea3D>
+  <cs:seriesAxis>
+    <cs:lnRef idx="0"/>
+    <cs:fillRef idx="0"/>
+    <cs:effectRef idx="0"/>
+    <cs:fontRef idx="minor">
+      <a:schemeClr val="tx1">
+        <a:lumMod val="65000"/>
+        <a:lumOff val="35000"/>
+      </a:schemeClr>
+    </cs:fontRef>
+    <cs:defRPr sz="1197" kern="1200"/>
+  </cs:seriesAxis>
+  <cs:seriesLine>
+    <cs:lnRef idx="0"/>
+    <cs:fillRef idx="0"/>
+    <cs:effectRef idx="0"/>
+    <cs:fontRef idx="minor">
+      <a:schemeClr val="tx1"/>
+    </cs:fontRef>
+    <cs:spPr>
+      <a:ln w="9525" cap="flat" cmpd="sng" algn="ctr">
+        <a:solidFill>
+          <a:schemeClr val="tx1">
+            <a:lumMod val="35000"/>
+            <a:lumOff val="65000"/>
+          </a:schemeClr>
+        </a:solidFill>
+        <a:round/>
+      </a:ln>
+    </cs:spPr>
+  </cs:seriesLine>
+  <cs:title>
+    <cs:lnRef idx="0"/>
+    <cs:fillRef idx="0"/>
+    <cs:effectRef idx="0"/>
+    <cs:fontRef idx="minor">
+      <a:schemeClr val="tx1">
+        <a:lumMod val="65000"/>
+        <a:lumOff val="35000"/>
+      </a:schemeClr>
+    </cs:fontRef>
+    <cs:defRPr sz="1862" b="0" kern="1200" spc="0" baseline="0"/>
+  </cs:title>
+  <cs:trendline>
+    <cs:lnRef idx="0">
+      <cs:styleClr val="auto"/>
+    </cs:lnRef>
+    <cs:fillRef idx="0"/>
+    <cs:effectRef idx="0"/>
+    <cs:fontRef idx="minor">
+      <a:schemeClr val="tx1"/>
+    </cs:fontRef>
+    <cs:spPr>
+      <a:ln w="19050" cap="rnd">
+        <a:solidFill>
+          <a:schemeClr val="phClr"/>
+        </a:solidFill>
+        <a:prstDash val="sysDot"/>
+      </a:ln>
+    </cs:spPr>
+  </cs:trendline>
+  <cs:trendlineLabel>
+    <cs:lnRef idx="0"/>
+    <cs:fillRef idx="0"/>
+    <cs:effectRef idx="0"/>
+    <cs:fontRef idx="minor">
+      <a:schemeClr val="tx1">
+        <a:lumMod val="65000"/>
+        <a:lumOff val="35000"/>
+      </a:schemeClr>
+    </cs:fontRef>
+    <cs:defRPr sz="1197" kern="1200"/>
+  </cs:trendlineLabel>
+  <cs:upBar>
+    <cs:lnRef idx="0"/>
+    <cs:fillRef idx="0"/>
+    <cs:effectRef idx="0"/>
+    <cs:fontRef idx="minor">
+      <a:schemeClr val="tx1"/>
+    </cs:fontRef>
+    <cs:spPr>
+      <a:solidFill>
+        <a:schemeClr val="lt1"/>
+      </a:solidFill>
+      <a:ln w="9525" cap="flat" cmpd="sng" algn="ctr">
+        <a:solidFill>
+          <a:schemeClr val="tx1">
+            <a:lumMod val="65000"/>
+            <a:lumOff val="35000"/>
+          </a:schemeClr>
+        </a:solidFill>
+        <a:round/>
+      </a:ln>
+    </cs:spPr>
+  </cs:upBar>
+  <cs:valueAxis>
+    <cs:lnRef idx="0"/>
+    <cs:fillRef idx="0"/>
+    <cs:effectRef idx="0"/>
+    <cs:fontRef idx="minor">
+      <a:schemeClr val="tx1">
+        <a:lumMod val="65000"/>
+        <a:lumOff val="35000"/>
+      </a:schemeClr>
+    </cs:fontRef>
+    <cs:defRPr sz="1197" kern="1200"/>
+  </cs:valueAxis>
+  <cs:wall>
+    <cs:lnRef idx="0"/>
+    <cs:fillRef idx="0"/>
+    <cs:effectRef idx="0"/>
+    <cs:fontRef idx="minor">
+      <a:schemeClr val="tx1"/>
+    </cs:fontRef>
+    <cs:spPr>
+      <a:noFill/>
+      <a:ln>
+        <a:noFill/>
+      </a:ln>
+    </cs:spPr>
+  </cs:wall>
+</cs:chartStyle>
+</file>
+
+<file path=ppt/charts/style6.xml><?xml version="1.0" encoding="utf-8"?>
+<cs:chartStyle xmlns:cs="http://schemas.microsoft.com/office/drawing/2012/chartStyle" xmlns:a="http://schemas.openxmlformats.org/drawingml/2006/main" id="251">
+  <cs:axisTitle>
+    <cs:lnRef idx="0"/>
+    <cs:fillRef idx="0"/>
+    <cs:effectRef idx="0"/>
+    <cs:fontRef idx="minor">
+      <a:schemeClr val="tx1">
+        <a:lumMod val="65000"/>
+        <a:lumOff val="35000"/>
+      </a:schemeClr>
+    </cs:fontRef>
+    <cs:defRPr sz="1330" kern="1200"/>
+  </cs:axisTitle>
+  <cs:categoryAxis>
+    <cs:lnRef idx="0"/>
+    <cs:fillRef idx="0"/>
+    <cs:effectRef idx="0"/>
+    <cs:fontRef idx="minor">
+      <a:schemeClr val="tx1">
+        <a:lumMod val="65000"/>
+        <a:lumOff val="35000"/>
+      </a:schemeClr>
+    </cs:fontRef>
+    <cs:spPr>
+      <a:ln w="9525" cap="flat" cmpd="sng" algn="ctr">
+        <a:solidFill>
+          <a:schemeClr val="tx1">
+            <a:lumMod val="15000"/>
+            <a:lumOff val="85000"/>
+          </a:schemeClr>
+        </a:solidFill>
+        <a:round/>
+      </a:ln>
+    </cs:spPr>
+    <cs:defRPr sz="1197" kern="1200"/>
+  </cs:categoryAxis>
+  <cs:chartArea mods="allowNoFillOverride allowNoLineOverride">
+    <cs:lnRef idx="0"/>
+    <cs:fillRef idx="0"/>
+    <cs:effectRef idx="0"/>
+    <cs:fontRef idx="minor">
+      <a:schemeClr val="tx1"/>
+    </cs:fontRef>
+    <cs:spPr>
+      <a:solidFill>
+        <a:schemeClr val="bg1"/>
+      </a:solidFill>
+      <a:ln w="9525" cap="flat" cmpd="sng" algn="ctr">
+        <a:solidFill>
+          <a:schemeClr val="tx1">
+            <a:lumMod val="15000"/>
+            <a:lumOff val="85000"/>
+          </a:schemeClr>
+        </a:solidFill>
+        <a:round/>
+      </a:ln>
+    </cs:spPr>
+    <cs:defRPr sz="1197" kern="1200"/>
+  </cs:chartArea>
+  <cs:dataLabel>
+    <cs:lnRef idx="0"/>
+    <cs:fillRef idx="0"/>
+    <cs:effectRef idx="0"/>
+    <cs:fontRef idx="minor">
+      <a:schemeClr val="tx1">
+        <a:lumMod val="75000"/>
+        <a:lumOff val="25000"/>
+      </a:schemeClr>
+    </cs:fontRef>
+    <cs:defRPr sz="1197" kern="1200"/>
+  </cs:dataLabel>
+  <cs:dataLabelCallout>
+    <cs:lnRef idx="0"/>
+    <cs:fillRef idx="0"/>
+    <cs:effectRef idx="0"/>
+    <cs:fontRef idx="minor">
+      <a:schemeClr val="dk1">
+        <a:lumMod val="65000"/>
+        <a:lumOff val="35000"/>
+      </a:schemeClr>
+    </cs:fontRef>
+    <cs:spPr>
+      <a:solidFill>
+        <a:schemeClr val="lt1"/>
+      </a:solidFill>
+      <a:ln>
+        <a:solidFill>
+          <a:schemeClr val="dk1">
+            <a:lumMod val="25000"/>
+            <a:lumOff val="75000"/>
+          </a:schemeClr>
+        </a:solidFill>
+      </a:ln>
+    </cs:spPr>
+    <cs:defRPr sz="1197" kern="1200"/>
+    <cs:bodyPr rot="0" spcFirstLastPara="1" vertOverflow="clip" horzOverflow="clip" vert="horz" wrap="square" lIns="36576" tIns="18288" rIns="36576" bIns="18288" anchor="ctr" anchorCtr="1">
+      <a:spAutoFit/>
+    </cs:bodyPr>
+  </cs:dataLabelCallout>
+  <cs:dataPoint>
+    <cs:lnRef idx="0"/>
+    <cs:fillRef idx="1">
+      <cs:styleClr val="auto"/>
+    </cs:fillRef>
+    <cs:effectRef idx="0"/>
+    <cs:fontRef idx="minor">
+      <a:schemeClr val="tx1"/>
+    </cs:fontRef>
+    <cs:spPr>
+      <a:ln w="19050">
+        <a:solidFill>
+          <a:schemeClr val="lt1"/>
+        </a:solidFill>
+      </a:ln>
+    </cs:spPr>
+  </cs:dataPoint>
+  <cs:dataPoint3D>
+    <cs:lnRef idx="0"/>
+    <cs:fillRef idx="1">
+      <cs:styleClr val="auto"/>
+    </cs:fillRef>
+    <cs:effectRef idx="0"/>
+    <cs:fontRef idx="minor">
+      <a:schemeClr val="tx1"/>
+    </cs:fontRef>
+    <cs:spPr>
+      <a:ln w="25400">
+        <a:solidFill>
+          <a:schemeClr val="lt1"/>
+        </a:solidFill>
+      </a:ln>
+    </cs:spPr>
+  </cs:dataPoint3D>
+  <cs:dataPointLine>
+    <cs:lnRef idx="0">
+      <cs:styleClr val="auto"/>
+    </cs:lnRef>
+    <cs:fillRef idx="0"/>
+    <cs:effectRef idx="0"/>
+    <cs:fontRef idx="minor">
+      <a:schemeClr val="tx1"/>
+    </cs:fontRef>
+    <cs:spPr>
+      <a:ln w="28575" cap="rnd">
+        <a:solidFill>
+          <a:schemeClr val="phClr"/>
+        </a:solidFill>
+        <a:round/>
+      </a:ln>
+    </cs:spPr>
+  </cs:dataPointLine>
+  <cs:dataPointMarker>
+    <cs:lnRef idx="0">
+      <cs:styleClr val="auto"/>
+    </cs:lnRef>
+    <cs:fillRef idx="1">
+      <cs:styleClr val="auto"/>
+    </cs:fillRef>
+    <cs:effectRef idx="0"/>
+    <cs:fontRef idx="minor">
+      <a:schemeClr val="tx1"/>
+    </cs:fontRef>
+    <cs:spPr>
+      <a:ln w="9525">
+        <a:solidFill>
+          <a:schemeClr val="phClr"/>
+        </a:solidFill>
+      </a:ln>
+    </cs:spPr>
+  </cs:dataPointMarker>
+  <cs:dataPointMarkerLayout symbol="circle" size="5"/>
+  <cs:dataPointWireframe>
+    <cs:lnRef idx="0">
+      <cs:styleClr val="auto"/>
+    </cs:lnRef>
+    <cs:fillRef idx="0"/>
+    <cs:effectRef idx="0"/>
+    <cs:fontRef idx="minor">
+      <a:schemeClr val="tx1"/>
+    </cs:fontRef>
+    <cs:spPr>
+      <a:ln w="9525" cap="rnd">
+        <a:solidFill>
+          <a:schemeClr val="phClr"/>
+        </a:solidFill>
+        <a:round/>
+      </a:ln>
+    </cs:spPr>
+  </cs:dataPointWireframe>
+  <cs:dataTable>
+    <cs:lnRef idx="0"/>
+    <cs:fillRef idx="0"/>
+    <cs:effectRef idx="0"/>
+    <cs:fontRef idx="minor">
+      <a:schemeClr val="tx1">
+        <a:lumMod val="65000"/>
+        <a:lumOff val="35000"/>
+      </a:schemeClr>
+    </cs:fontRef>
+    <cs:spPr>
+      <a:noFill/>
+      <a:ln w="9525" cap="flat" cmpd="sng" algn="ctr">
+        <a:solidFill>
+          <a:schemeClr val="tx1">
+            <a:lumMod val="15000"/>
+            <a:lumOff val="85000"/>
+          </a:schemeClr>
+        </a:solidFill>
+        <a:round/>
+      </a:ln>
+    </cs:spPr>
+    <cs:defRPr sz="1197" kern="1200"/>
+  </cs:dataTable>
+  <cs:downBar>
+    <cs:lnRef idx="0"/>
+    <cs:fillRef idx="0"/>
+    <cs:effectRef idx="0"/>
+    <cs:fontRef idx="minor">
+      <a:schemeClr val="tx1"/>
+    </cs:fontRef>
+    <cs:spPr>
+      <a:solidFill>
+        <a:schemeClr val="dk1">
+          <a:lumMod val="75000"/>
+          <a:lumOff val="25000"/>
+        </a:schemeClr>
+      </a:solidFill>
+      <a:ln w="9525" cap="flat" cmpd="sng" algn="ctr">
+        <a:solidFill>
+          <a:schemeClr val="tx1">
+            <a:lumMod val="65000"/>
+            <a:lumOff val="35000"/>
+          </a:schemeClr>
+        </a:solidFill>
+        <a:round/>
+      </a:ln>
+    </cs:spPr>
+  </cs:downBar>
+  <cs:dropLine>
+    <cs:lnRef idx="0"/>
+    <cs:fillRef idx="0"/>
+    <cs:effectRef idx="0"/>
+    <cs:fontRef idx="minor">
+      <a:schemeClr val="tx1"/>
+    </cs:fontRef>
+    <cs:spPr>
+      <a:ln w="9525" cap="flat" cmpd="sng" algn="ctr">
+        <a:solidFill>
+          <a:schemeClr val="tx1">
+            <a:lumMod val="35000"/>
+            <a:lumOff val="65000"/>
+          </a:schemeClr>
+        </a:solidFill>
+        <a:round/>
+      </a:ln>
+    </cs:spPr>
+  </cs:dropLine>
+  <cs:errorBar>
+    <cs:lnRef idx="0"/>
+    <cs:fillRef idx="0"/>
+    <cs:effectRef idx="0"/>
+    <cs:fontRef idx="minor">
+      <a:schemeClr val="tx1"/>
+    </cs:fontRef>
+    <cs:spPr>
+      <a:ln w="9525" cap="flat" cmpd="sng" algn="ctr">
+        <a:solidFill>
+          <a:schemeClr val="tx1">
+            <a:lumMod val="65000"/>
+            <a:lumOff val="35000"/>
+          </a:schemeClr>
+        </a:solidFill>
+        <a:round/>
+      </a:ln>
+    </cs:spPr>
+  </cs:errorBar>
+  <cs:floor>
+    <cs:lnRef idx="0"/>
+    <cs:fillRef idx="0"/>
+    <cs:effectRef idx="0"/>
+    <cs:fontRef idx="minor">
+      <a:schemeClr val="tx1"/>
+    </cs:fontRef>
+    <cs:spPr>
+      <a:noFill/>
+      <a:ln>
+        <a:noFill/>
+      </a:ln>
+    </cs:spPr>
+  </cs:floor>
+  <cs:gridlineMajor>
+    <cs:lnRef idx="0"/>
+    <cs:fillRef idx="0"/>
+    <cs:effectRef idx="0"/>
+    <cs:fontRef idx="minor">
+      <a:schemeClr val="tx1"/>
+    </cs:fontRef>
+    <cs:spPr>
+      <a:ln w="9525" cap="flat" cmpd="sng" algn="ctr">
+        <a:solidFill>
+          <a:schemeClr val="tx1">
+            <a:lumMod val="15000"/>
+            <a:lumOff val="85000"/>
+          </a:schemeClr>
+        </a:solidFill>
+        <a:round/>
+      </a:ln>
+    </cs:spPr>
+  </cs:gridlineMajor>
+  <cs:gridlineMinor>
+    <cs:lnRef idx="0"/>
+    <cs:fillRef idx="0"/>
+    <cs:effectRef idx="0"/>
+    <cs:fontRef idx="minor">
+      <a:schemeClr val="tx1"/>
+    </cs:fontRef>
+    <cs:spPr>
+      <a:ln w="9525" cap="flat" cmpd="sng" algn="ctr">
+        <a:solidFill>
+          <a:schemeClr val="tx1">
+            <a:lumMod val="5000"/>
+            <a:lumOff val="95000"/>
+          </a:schemeClr>
+        </a:solidFill>
+        <a:round/>
+      </a:ln>
+    </cs:spPr>
+  </cs:gridlineMinor>
+  <cs:hiLoLine>
+    <cs:lnRef idx="0"/>
+    <cs:fillRef idx="0"/>
+    <cs:effectRef idx="0"/>
+    <cs:fontRef idx="minor">
+      <a:schemeClr val="tx1"/>
+    </cs:fontRef>
+    <cs:spPr>
+      <a:ln w="9525" cap="flat" cmpd="sng" algn="ctr">
+        <a:solidFill>
+          <a:schemeClr val="tx1">
+            <a:lumMod val="50000"/>
+            <a:lumOff val="50000"/>
+          </a:schemeClr>
+        </a:solidFill>
+        <a:round/>
+      </a:ln>
+    </cs:spPr>
+  </cs:hiLoLine>
+  <cs:leaderLine>
+    <cs:lnRef idx="0"/>
+    <cs:fillRef idx="0"/>
+    <cs:effectRef idx="0"/>
+    <cs:fontRef idx="minor">
+      <a:schemeClr val="tx1"/>
+    </cs:fontRef>
+    <cs:spPr>
+      <a:ln w="9525" cap="flat" cmpd="sng" algn="ctr">
+        <a:solidFill>
+          <a:schemeClr val="tx1">
+            <a:lumMod val="35000"/>
+            <a:lumOff val="65000"/>
+          </a:schemeClr>
+        </a:solidFill>
+        <a:round/>
+      </a:ln>
+    </cs:spPr>
+  </cs:leaderLine>
+  <cs:legend>
+    <cs:lnRef idx="0"/>
+    <cs:fillRef idx="0"/>
+    <cs:effectRef idx="0"/>
+    <cs:fontRef idx="minor">
+      <a:schemeClr val="tx1">
+        <a:lumMod val="65000"/>
+        <a:lumOff val="35000"/>
+      </a:schemeClr>
+    </cs:fontRef>
+    <cs:defRPr sz="1197" kern="1200"/>
+  </cs:legend>
+  <cs:plotArea mods="allowNoFillOverride allowNoLineOverride">
+    <cs:lnRef idx="0"/>
+    <cs:fillRef idx="0"/>
+    <cs:effectRef idx="0"/>
+    <cs:fontRef idx="minor">
+      <a:schemeClr val="tx1"/>
+    </cs:fontRef>
+  </cs:plotArea>
+  <cs:plotArea3D mods="allowNoFillOverride allowNoLineOverride">
+    <cs:lnRef idx="0"/>
+    <cs:fillRef idx="0"/>
+    <cs:effectRef idx="0"/>
+    <cs:fontRef idx="minor">
+      <a:schemeClr val="tx1"/>
+    </cs:fontRef>
+  </cs:plotArea3D>
+  <cs:seriesAxis>
+    <cs:lnRef idx="0"/>
+    <cs:fillRef idx="0"/>
+    <cs:effectRef idx="0"/>
+    <cs:fontRef idx="minor">
+      <a:schemeClr val="tx1">
+        <a:lumMod val="65000"/>
+        <a:lumOff val="35000"/>
+      </a:schemeClr>
+    </cs:fontRef>
+    <cs:defRPr sz="1197" kern="1200"/>
+  </cs:seriesAxis>
+  <cs:seriesLine>
+    <cs:lnRef idx="0"/>
+    <cs:fillRef idx="0"/>
+    <cs:effectRef idx="0"/>
+    <cs:fontRef idx="minor">
+      <a:schemeClr val="tx1"/>
+    </cs:fontRef>
+    <cs:spPr>
+      <a:ln w="9525" cap="flat" cmpd="sng" algn="ctr">
+        <a:solidFill>
+          <a:schemeClr val="tx1">
+            <a:lumMod val="35000"/>
+            <a:lumOff val="65000"/>
+          </a:schemeClr>
+        </a:solidFill>
+        <a:round/>
+      </a:ln>
+    </cs:spPr>
+  </cs:seriesLine>
+  <cs:title>
+    <cs:lnRef idx="0"/>
+    <cs:fillRef idx="0"/>
+    <cs:effectRef idx="0"/>
+    <cs:fontRef idx="minor">
+      <a:schemeClr val="tx1">
+        <a:lumMod val="65000"/>
+        <a:lumOff val="35000"/>
+      </a:schemeClr>
+    </cs:fontRef>
+    <cs:defRPr sz="1862" b="0" kern="1200" spc="0" baseline="0"/>
+  </cs:title>
+  <cs:trendline>
+    <cs:lnRef idx="0">
+      <cs:styleClr val="auto"/>
+    </cs:lnRef>
+    <cs:fillRef idx="0"/>
+    <cs:effectRef idx="0"/>
+    <cs:fontRef idx="minor">
+      <a:schemeClr val="tx1"/>
+    </cs:fontRef>
+    <cs:spPr>
+      <a:ln w="19050" cap="rnd">
+        <a:solidFill>
+          <a:schemeClr val="phClr"/>
+        </a:solidFill>
+        <a:prstDash val="sysDot"/>
+      </a:ln>
+    </cs:spPr>
+  </cs:trendline>
+  <cs:trendlineLabel>
+    <cs:lnRef idx="0"/>
+    <cs:fillRef idx="0"/>
+    <cs:effectRef idx="0"/>
+    <cs:fontRef idx="minor">
+      <a:schemeClr val="tx1">
+        <a:lumMod val="65000"/>
+        <a:lumOff val="35000"/>
+      </a:schemeClr>
+    </cs:fontRef>
+    <cs:defRPr sz="1197" kern="1200"/>
+  </cs:trendlineLabel>
+  <cs:upBar>
+    <cs:lnRef idx="0"/>
+    <cs:fillRef idx="0"/>
+    <cs:effectRef idx="0"/>
+    <cs:fontRef idx="minor">
+      <a:schemeClr val="tx1"/>
+    </cs:fontRef>
+    <cs:spPr>
+      <a:solidFill>
+        <a:schemeClr val="lt1"/>
+      </a:solidFill>
+      <a:ln w="9525" cap="flat" cmpd="sng" algn="ctr">
+        <a:solidFill>
+          <a:schemeClr val="tx1">
+            <a:lumMod val="65000"/>
+            <a:lumOff val="35000"/>
+          </a:schemeClr>
+        </a:solidFill>
+        <a:round/>
+      </a:ln>
+    </cs:spPr>
+  </cs:upBar>
+  <cs:valueAxis>
+    <cs:lnRef idx="0"/>
+    <cs:fillRef idx="0"/>
+    <cs:effectRef idx="0"/>
+    <cs:fontRef idx="minor">
+      <a:schemeClr val="tx1">
+        <a:lumMod val="65000"/>
+        <a:lumOff val="35000"/>
+      </a:schemeClr>
+    </cs:fontRef>
+    <cs:defRPr sz="1197" kern="1200"/>
+  </cs:valueAxis>
+  <cs:wall>
+    <cs:lnRef idx="0"/>
+    <cs:fillRef idx="0"/>
+    <cs:effectRef idx="0"/>
+    <cs:fontRef idx="minor">
+      <a:schemeClr val="tx1"/>
+    </cs:fontRef>
+    <cs:spPr>
+      <a:noFill/>
+      <a:ln>
+        <a:noFill/>
+      </a:ln>
+    </cs:spPr>
+  </cs:wall>
+</cs:chartStyle>
+</file>
+
+<file path=ppt/charts/style7.xml><?xml version="1.0" encoding="utf-8"?>
 <cs:chartStyle xmlns:cs="http://schemas.microsoft.com/office/drawing/2012/chartStyle" xmlns:a="http://schemas.openxmlformats.org/drawingml/2006/main" id="251">
   <cs:axisTitle>
     <cs:lnRef idx="0"/>
@@ -5985,13 +8328,7 @@
       </p:grpSpPr>
       <p:sp>
         <p:nvSpPr>
-          <p:cNvPr id="2" name="Title 1">
-            <a:extLst>
-              <a:ext uri="{FF2B5EF4-FFF2-40B4-BE49-F238E27FC236}">
-                <a16:creationId xmlns:a16="http://schemas.microsoft.com/office/drawing/2014/main" id="{C4EC6AA2-B3EB-4296-9560-7026B3615BE1}"/>
-              </a:ext>
-            </a:extLst>
-          </p:cNvPr>
+          <p:cNvPr id="2" name="Title 1"/>
           <p:cNvSpPr>
             <a:spLocks noGrp="1"/>
           </p:cNvSpPr>
@@ -6001,8 +8338,8 @@
         </p:nvSpPr>
         <p:spPr>
           <a:xfrm>
-            <a:off x="1524000" y="1122363"/>
-            <a:ext cx="9144000" cy="2387600"/>
+            <a:off x="685800" y="1122363"/>
+            <a:ext cx="7772400" cy="2387600"/>
           </a:xfrm>
         </p:spPr>
         <p:txBody>
@@ -6017,18 +8354,13 @@
               <a:rPr lang="en-US"/>
               <a:t>Click to edit Master title style</a:t>
             </a:r>
+            <a:endParaRPr lang="en-US" dirty="0"/>
           </a:p>
         </p:txBody>
       </p:sp>
       <p:sp>
         <p:nvSpPr>
-          <p:cNvPr id="3" name="Subtitle 2">
-            <a:extLst>
-              <a:ext uri="{FF2B5EF4-FFF2-40B4-BE49-F238E27FC236}">
-                <a16:creationId xmlns:a16="http://schemas.microsoft.com/office/drawing/2014/main" id="{58386B8D-07F6-4285-9559-ECF80C7FFC41}"/>
-              </a:ext>
-            </a:extLst>
-          </p:cNvPr>
+          <p:cNvPr id="3" name="Subtitle 2"/>
           <p:cNvSpPr>
             <a:spLocks noGrp="1"/>
           </p:cNvSpPr>
@@ -6038,8 +8370,8 @@
         </p:nvSpPr>
         <p:spPr>
           <a:xfrm>
-            <a:off x="1524000" y="3602038"/>
-            <a:ext cx="9144000" cy="1655762"/>
+            <a:off x="1143000" y="3602038"/>
+            <a:ext cx="6858000" cy="1655762"/>
           </a:xfrm>
         </p:spPr>
         <p:txBody>
@@ -6087,18 +8419,13 @@
               <a:rPr lang="en-US"/>
               <a:t>Click to edit Master subtitle style</a:t>
             </a:r>
+            <a:endParaRPr lang="en-US" dirty="0"/>
           </a:p>
         </p:txBody>
       </p:sp>
       <p:sp>
         <p:nvSpPr>
-          <p:cNvPr id="4" name="Date Placeholder 3">
-            <a:extLst>
-              <a:ext uri="{FF2B5EF4-FFF2-40B4-BE49-F238E27FC236}">
-                <a16:creationId xmlns:a16="http://schemas.microsoft.com/office/drawing/2014/main" id="{B6E8BFA8-7692-4EB9-BCE2-43E7AC945A5B}"/>
-              </a:ext>
-            </a:extLst>
-          </p:cNvPr>
+          <p:cNvPr id="4" name="Date Placeholder 3"/>
           <p:cNvSpPr>
             <a:spLocks noGrp="1"/>
           </p:cNvSpPr>
@@ -6113,7 +8440,7 @@
           <a:p>
             <a:fld id="{E9BF1F2D-2AEF-4074-BE6D-430396F80950}" type="datetimeFigureOut">
               <a:rPr lang="en-US" smtClean="0"/>
-              <a:t>3/27/2020</a:t>
+              <a:t>3/28/2020</a:t>
             </a:fld>
             <a:endParaRPr lang="en-US"/>
           </a:p>
@@ -6121,13 +8448,7 @@
       </p:sp>
       <p:sp>
         <p:nvSpPr>
-          <p:cNvPr id="5" name="Footer Placeholder 4">
-            <a:extLst>
-              <a:ext uri="{FF2B5EF4-FFF2-40B4-BE49-F238E27FC236}">
-                <a16:creationId xmlns:a16="http://schemas.microsoft.com/office/drawing/2014/main" id="{8B823DCD-9765-4190-8C9C-A91E8C3D7620}"/>
-              </a:ext>
-            </a:extLst>
-          </p:cNvPr>
+          <p:cNvPr id="5" name="Footer Placeholder 4"/>
           <p:cNvSpPr>
             <a:spLocks noGrp="1"/>
           </p:cNvSpPr>
@@ -6146,13 +8467,7 @@
       </p:sp>
       <p:sp>
         <p:nvSpPr>
-          <p:cNvPr id="6" name="Slide Number Placeholder 5">
-            <a:extLst>
-              <a:ext uri="{FF2B5EF4-FFF2-40B4-BE49-F238E27FC236}">
-                <a16:creationId xmlns:a16="http://schemas.microsoft.com/office/drawing/2014/main" id="{99116376-5A76-4A77-ABEA-35311F788D69}"/>
-              </a:ext>
-            </a:extLst>
-          </p:cNvPr>
+          <p:cNvPr id="6" name="Slide Number Placeholder 5"/>
           <p:cNvSpPr>
             <a:spLocks noGrp="1"/>
           </p:cNvSpPr>
@@ -6176,7 +8491,7 @@
     </p:spTree>
     <p:extLst>
       <p:ext uri="{BB962C8B-B14F-4D97-AF65-F5344CB8AC3E}">
-        <p14:creationId xmlns:p14="http://schemas.microsoft.com/office/powerpoint/2010/main" val="2705897151"/>
+        <p14:creationId xmlns:p14="http://schemas.microsoft.com/office/powerpoint/2010/main" val="515528961"/>
       </p:ext>
     </p:extLst>
   </p:cSld>
@@ -6205,13 +8520,7 @@
       </p:grpSpPr>
       <p:sp>
         <p:nvSpPr>
-          <p:cNvPr id="2" name="Title 1">
-            <a:extLst>
-              <a:ext uri="{FF2B5EF4-FFF2-40B4-BE49-F238E27FC236}">
-                <a16:creationId xmlns:a16="http://schemas.microsoft.com/office/drawing/2014/main" id="{3F14FE28-9C26-4B36-A5AA-42A024EC98F6}"/>
-              </a:ext>
-            </a:extLst>
-          </p:cNvPr>
+          <p:cNvPr id="2" name="Title 1"/>
           <p:cNvSpPr>
             <a:spLocks noGrp="1"/>
           </p:cNvSpPr>
@@ -6228,18 +8537,13 @@
               <a:rPr lang="en-US"/>
               <a:t>Click to edit Master title style</a:t>
             </a:r>
+            <a:endParaRPr lang="en-US" dirty="0"/>
           </a:p>
         </p:txBody>
       </p:sp>
       <p:sp>
         <p:nvSpPr>
-          <p:cNvPr id="3" name="Vertical Text Placeholder 2">
-            <a:extLst>
-              <a:ext uri="{FF2B5EF4-FFF2-40B4-BE49-F238E27FC236}">
-                <a16:creationId xmlns:a16="http://schemas.microsoft.com/office/drawing/2014/main" id="{B43886D2-3A7A-4EC5-A323-3D52BAB73897}"/>
-              </a:ext>
-            </a:extLst>
-          </p:cNvPr>
+          <p:cNvPr id="3" name="Vertical Text Placeholder 2"/>
           <p:cNvSpPr>
             <a:spLocks noGrp="1"/>
           </p:cNvSpPr>
@@ -6285,18 +8589,13 @@
               <a:rPr lang="en-US"/>
               <a:t>Fifth level</a:t>
             </a:r>
+            <a:endParaRPr lang="en-US" dirty="0"/>
           </a:p>
         </p:txBody>
       </p:sp>
       <p:sp>
         <p:nvSpPr>
-          <p:cNvPr id="4" name="Date Placeholder 3">
-            <a:extLst>
-              <a:ext uri="{FF2B5EF4-FFF2-40B4-BE49-F238E27FC236}">
-                <a16:creationId xmlns:a16="http://schemas.microsoft.com/office/drawing/2014/main" id="{FEEE458C-1865-4E6F-8217-E58D9A94B2C2}"/>
-              </a:ext>
-            </a:extLst>
-          </p:cNvPr>
+          <p:cNvPr id="4" name="Date Placeholder 3"/>
           <p:cNvSpPr>
             <a:spLocks noGrp="1"/>
           </p:cNvSpPr>
@@ -6311,7 +8610,7 @@
           <a:p>
             <a:fld id="{E9BF1F2D-2AEF-4074-BE6D-430396F80950}" type="datetimeFigureOut">
               <a:rPr lang="en-US" smtClean="0"/>
-              <a:t>3/27/2020</a:t>
+              <a:t>3/28/2020</a:t>
             </a:fld>
             <a:endParaRPr lang="en-US"/>
           </a:p>
@@ -6319,13 +8618,7 @@
       </p:sp>
       <p:sp>
         <p:nvSpPr>
-          <p:cNvPr id="5" name="Footer Placeholder 4">
-            <a:extLst>
-              <a:ext uri="{FF2B5EF4-FFF2-40B4-BE49-F238E27FC236}">
-                <a16:creationId xmlns:a16="http://schemas.microsoft.com/office/drawing/2014/main" id="{AAA57693-0DE5-4928-ACFA-797C7715D577}"/>
-              </a:ext>
-            </a:extLst>
-          </p:cNvPr>
+          <p:cNvPr id="5" name="Footer Placeholder 4"/>
           <p:cNvSpPr>
             <a:spLocks noGrp="1"/>
           </p:cNvSpPr>
@@ -6344,13 +8637,7 @@
       </p:sp>
       <p:sp>
         <p:nvSpPr>
-          <p:cNvPr id="6" name="Slide Number Placeholder 5">
-            <a:extLst>
-              <a:ext uri="{FF2B5EF4-FFF2-40B4-BE49-F238E27FC236}">
-                <a16:creationId xmlns:a16="http://schemas.microsoft.com/office/drawing/2014/main" id="{5A1776D8-1472-437B-9A5C-6688964B202D}"/>
-              </a:ext>
-            </a:extLst>
-          </p:cNvPr>
+          <p:cNvPr id="6" name="Slide Number Placeholder 5"/>
           <p:cNvSpPr>
             <a:spLocks noGrp="1"/>
           </p:cNvSpPr>
@@ -6374,7 +8661,7 @@
     </p:spTree>
     <p:extLst>
       <p:ext uri="{BB962C8B-B14F-4D97-AF65-F5344CB8AC3E}">
-        <p14:creationId xmlns:p14="http://schemas.microsoft.com/office/powerpoint/2010/main" val="2855820025"/>
+        <p14:creationId xmlns:p14="http://schemas.microsoft.com/office/powerpoint/2010/main" val="1568172651"/>
       </p:ext>
     </p:extLst>
   </p:cSld>
@@ -6403,13 +8690,7 @@
       </p:grpSpPr>
       <p:sp>
         <p:nvSpPr>
-          <p:cNvPr id="2" name="Vertical Title 1">
-            <a:extLst>
-              <a:ext uri="{FF2B5EF4-FFF2-40B4-BE49-F238E27FC236}">
-                <a16:creationId xmlns:a16="http://schemas.microsoft.com/office/drawing/2014/main" id="{3055DCDE-5E4C-4892-998B-7DDE8E859020}"/>
-              </a:ext>
-            </a:extLst>
-          </p:cNvPr>
+          <p:cNvPr id="2" name="Vertical Title 1"/>
           <p:cNvSpPr>
             <a:spLocks noGrp="1"/>
           </p:cNvSpPr>
@@ -6419,8 +8700,8 @@
         </p:nvSpPr>
         <p:spPr>
           <a:xfrm>
-            <a:off x="8724900" y="365125"/>
-            <a:ext cx="2628900" cy="5811838"/>
+            <a:off x="6543675" y="365125"/>
+            <a:ext cx="1971675" cy="5811838"/>
           </a:xfrm>
         </p:spPr>
         <p:txBody>
@@ -6431,18 +8712,13 @@
               <a:rPr lang="en-US"/>
               <a:t>Click to edit Master title style</a:t>
             </a:r>
+            <a:endParaRPr lang="en-US" dirty="0"/>
           </a:p>
         </p:txBody>
       </p:sp>
       <p:sp>
         <p:nvSpPr>
-          <p:cNvPr id="3" name="Vertical Text Placeholder 2">
-            <a:extLst>
-              <a:ext uri="{FF2B5EF4-FFF2-40B4-BE49-F238E27FC236}">
-                <a16:creationId xmlns:a16="http://schemas.microsoft.com/office/drawing/2014/main" id="{B5518004-E7EA-442A-BE08-5F30E9D817B3}"/>
-              </a:ext>
-            </a:extLst>
-          </p:cNvPr>
+          <p:cNvPr id="3" name="Vertical Text Placeholder 2"/>
           <p:cNvSpPr>
             <a:spLocks noGrp="1"/>
           </p:cNvSpPr>
@@ -6452,8 +8728,8 @@
         </p:nvSpPr>
         <p:spPr>
           <a:xfrm>
-            <a:off x="838200" y="365125"/>
-            <a:ext cx="7734300" cy="5811838"/>
+            <a:off x="628650" y="365125"/>
+            <a:ext cx="5800725" cy="5811838"/>
           </a:xfrm>
         </p:spPr>
         <p:txBody>
@@ -6493,18 +8769,13 @@
               <a:rPr lang="en-US"/>
               <a:t>Fifth level</a:t>
             </a:r>
+            <a:endParaRPr lang="en-US" dirty="0"/>
           </a:p>
         </p:txBody>
       </p:sp>
       <p:sp>
         <p:nvSpPr>
-          <p:cNvPr id="4" name="Date Placeholder 3">
-            <a:extLst>
-              <a:ext uri="{FF2B5EF4-FFF2-40B4-BE49-F238E27FC236}">
-                <a16:creationId xmlns:a16="http://schemas.microsoft.com/office/drawing/2014/main" id="{4EAA5E17-8AFE-447F-9FFE-E2F0BDC5D75E}"/>
-              </a:ext>
-            </a:extLst>
-          </p:cNvPr>
+          <p:cNvPr id="4" name="Date Placeholder 3"/>
           <p:cNvSpPr>
             <a:spLocks noGrp="1"/>
           </p:cNvSpPr>
@@ -6519,7 +8790,7 @@
           <a:p>
             <a:fld id="{E9BF1F2D-2AEF-4074-BE6D-430396F80950}" type="datetimeFigureOut">
               <a:rPr lang="en-US" smtClean="0"/>
-              <a:t>3/27/2020</a:t>
+              <a:t>3/28/2020</a:t>
             </a:fld>
             <a:endParaRPr lang="en-US"/>
           </a:p>
@@ -6527,13 +8798,7 @@
       </p:sp>
       <p:sp>
         <p:nvSpPr>
-          <p:cNvPr id="5" name="Footer Placeholder 4">
-            <a:extLst>
-              <a:ext uri="{FF2B5EF4-FFF2-40B4-BE49-F238E27FC236}">
-                <a16:creationId xmlns:a16="http://schemas.microsoft.com/office/drawing/2014/main" id="{CE7DFFCB-1182-4DB5-BE6D-451F4483D29D}"/>
-              </a:ext>
-            </a:extLst>
-          </p:cNvPr>
+          <p:cNvPr id="5" name="Footer Placeholder 4"/>
           <p:cNvSpPr>
             <a:spLocks noGrp="1"/>
           </p:cNvSpPr>
@@ -6552,13 +8817,7 @@
       </p:sp>
       <p:sp>
         <p:nvSpPr>
-          <p:cNvPr id="6" name="Slide Number Placeholder 5">
-            <a:extLst>
-              <a:ext uri="{FF2B5EF4-FFF2-40B4-BE49-F238E27FC236}">
-                <a16:creationId xmlns:a16="http://schemas.microsoft.com/office/drawing/2014/main" id="{EF1C6D9E-2FBC-4EE2-9A2D-44D310168068}"/>
-              </a:ext>
-            </a:extLst>
-          </p:cNvPr>
+          <p:cNvPr id="6" name="Slide Number Placeholder 5"/>
           <p:cNvSpPr>
             <a:spLocks noGrp="1"/>
           </p:cNvSpPr>
@@ -6582,7 +8841,7 @@
     </p:spTree>
     <p:extLst>
       <p:ext uri="{BB962C8B-B14F-4D97-AF65-F5344CB8AC3E}">
-        <p14:creationId xmlns:p14="http://schemas.microsoft.com/office/powerpoint/2010/main" val="1653511448"/>
+        <p14:creationId xmlns:p14="http://schemas.microsoft.com/office/powerpoint/2010/main" val="2099181568"/>
       </p:ext>
     </p:extLst>
   </p:cSld>
@@ -6611,13 +8870,7 @@
       </p:grpSpPr>
       <p:sp>
         <p:nvSpPr>
-          <p:cNvPr id="2" name="Title 1">
-            <a:extLst>
-              <a:ext uri="{FF2B5EF4-FFF2-40B4-BE49-F238E27FC236}">
-                <a16:creationId xmlns:a16="http://schemas.microsoft.com/office/drawing/2014/main" id="{8E7491C6-D8F5-441D-9917-B8F535653180}"/>
-              </a:ext>
-            </a:extLst>
-          </p:cNvPr>
+          <p:cNvPr id="2" name="Title 1"/>
           <p:cNvSpPr>
             <a:spLocks noGrp="1"/>
           </p:cNvSpPr>
@@ -6634,18 +8887,13 @@
               <a:rPr lang="en-US"/>
               <a:t>Click to edit Master title style</a:t>
             </a:r>
+            <a:endParaRPr lang="en-US" dirty="0"/>
           </a:p>
         </p:txBody>
       </p:sp>
       <p:sp>
         <p:nvSpPr>
-          <p:cNvPr id="3" name="Content Placeholder 2">
-            <a:extLst>
-              <a:ext uri="{FF2B5EF4-FFF2-40B4-BE49-F238E27FC236}">
-                <a16:creationId xmlns:a16="http://schemas.microsoft.com/office/drawing/2014/main" id="{2B6C595F-E61E-42CD-9568-1585F6E8CC1B}"/>
-              </a:ext>
-            </a:extLst>
-          </p:cNvPr>
+          <p:cNvPr id="3" name="Content Placeholder 2"/>
           <p:cNvSpPr>
             <a:spLocks noGrp="1"/>
           </p:cNvSpPr>
@@ -6691,18 +8939,13 @@
               <a:rPr lang="en-US"/>
               <a:t>Fifth level</a:t>
             </a:r>
+            <a:endParaRPr lang="en-US" dirty="0"/>
           </a:p>
         </p:txBody>
       </p:sp>
       <p:sp>
         <p:nvSpPr>
-          <p:cNvPr id="4" name="Date Placeholder 3">
-            <a:extLst>
-              <a:ext uri="{FF2B5EF4-FFF2-40B4-BE49-F238E27FC236}">
-                <a16:creationId xmlns:a16="http://schemas.microsoft.com/office/drawing/2014/main" id="{91B9519D-7648-4324-A287-8B4E50559001}"/>
-              </a:ext>
-            </a:extLst>
-          </p:cNvPr>
+          <p:cNvPr id="4" name="Date Placeholder 3"/>
           <p:cNvSpPr>
             <a:spLocks noGrp="1"/>
           </p:cNvSpPr>
@@ -6717,7 +8960,7 @@
           <a:p>
             <a:fld id="{E9BF1F2D-2AEF-4074-BE6D-430396F80950}" type="datetimeFigureOut">
               <a:rPr lang="en-US" smtClean="0"/>
-              <a:t>3/27/2020</a:t>
+              <a:t>3/28/2020</a:t>
             </a:fld>
             <a:endParaRPr lang="en-US"/>
           </a:p>
@@ -6725,13 +8968,7 @@
       </p:sp>
       <p:sp>
         <p:nvSpPr>
-          <p:cNvPr id="5" name="Footer Placeholder 4">
-            <a:extLst>
-              <a:ext uri="{FF2B5EF4-FFF2-40B4-BE49-F238E27FC236}">
-                <a16:creationId xmlns:a16="http://schemas.microsoft.com/office/drawing/2014/main" id="{940F215F-987A-4741-8578-68DAC7514B80}"/>
-              </a:ext>
-            </a:extLst>
-          </p:cNvPr>
+          <p:cNvPr id="5" name="Footer Placeholder 4"/>
           <p:cNvSpPr>
             <a:spLocks noGrp="1"/>
           </p:cNvSpPr>
@@ -6750,13 +8987,7 @@
       </p:sp>
       <p:sp>
         <p:nvSpPr>
-          <p:cNvPr id="6" name="Slide Number Placeholder 5">
-            <a:extLst>
-              <a:ext uri="{FF2B5EF4-FFF2-40B4-BE49-F238E27FC236}">
-                <a16:creationId xmlns:a16="http://schemas.microsoft.com/office/drawing/2014/main" id="{40C5DED0-3665-42B0-B590-AA79D0D58961}"/>
-              </a:ext>
-            </a:extLst>
-          </p:cNvPr>
+          <p:cNvPr id="6" name="Slide Number Placeholder 5"/>
           <p:cNvSpPr>
             <a:spLocks noGrp="1"/>
           </p:cNvSpPr>
@@ -6780,7 +9011,7 @@
     </p:spTree>
     <p:extLst>
       <p:ext uri="{BB962C8B-B14F-4D97-AF65-F5344CB8AC3E}">
-        <p14:creationId xmlns:p14="http://schemas.microsoft.com/office/powerpoint/2010/main" val="163185788"/>
+        <p14:creationId xmlns:p14="http://schemas.microsoft.com/office/powerpoint/2010/main" val="623751351"/>
       </p:ext>
     </p:extLst>
   </p:cSld>
@@ -6809,13 +9040,7 @@
       </p:grpSpPr>
       <p:sp>
         <p:nvSpPr>
-          <p:cNvPr id="2" name="Title 1">
-            <a:extLst>
-              <a:ext uri="{FF2B5EF4-FFF2-40B4-BE49-F238E27FC236}">
-                <a16:creationId xmlns:a16="http://schemas.microsoft.com/office/drawing/2014/main" id="{80D50B31-D0B3-43E0-BF82-8DB466D09471}"/>
-              </a:ext>
-            </a:extLst>
-          </p:cNvPr>
+          <p:cNvPr id="2" name="Title 1"/>
           <p:cNvSpPr>
             <a:spLocks noGrp="1"/>
           </p:cNvSpPr>
@@ -6825,8 +9050,8 @@
         </p:nvSpPr>
         <p:spPr>
           <a:xfrm>
-            <a:off x="831850" y="1709738"/>
-            <a:ext cx="10515600" cy="2852737"/>
+            <a:off x="623888" y="1709739"/>
+            <a:ext cx="7886700" cy="2852737"/>
           </a:xfrm>
         </p:spPr>
         <p:txBody>
@@ -6841,18 +9066,13 @@
               <a:rPr lang="en-US"/>
               <a:t>Click to edit Master title style</a:t>
             </a:r>
+            <a:endParaRPr lang="en-US" dirty="0"/>
           </a:p>
         </p:txBody>
       </p:sp>
       <p:sp>
         <p:nvSpPr>
-          <p:cNvPr id="3" name="Text Placeholder 2">
-            <a:extLst>
-              <a:ext uri="{FF2B5EF4-FFF2-40B4-BE49-F238E27FC236}">
-                <a16:creationId xmlns:a16="http://schemas.microsoft.com/office/drawing/2014/main" id="{876E31F1-D35A-4E88-BE3A-D97E62A3E3A3}"/>
-              </a:ext>
-            </a:extLst>
-          </p:cNvPr>
+          <p:cNvPr id="3" name="Text Placeholder 2"/>
           <p:cNvSpPr>
             <a:spLocks noGrp="1"/>
           </p:cNvSpPr>
@@ -6862,8 +9082,8 @@
         </p:nvSpPr>
         <p:spPr>
           <a:xfrm>
-            <a:off x="831850" y="4589463"/>
-            <a:ext cx="10515600" cy="1500187"/>
+            <a:off x="623888" y="4589464"/>
+            <a:ext cx="7886700" cy="1500187"/>
           </a:xfrm>
         </p:spPr>
         <p:txBody>
@@ -6873,9 +9093,7 @@
               <a:buNone/>
               <a:defRPr sz="2400">
                 <a:solidFill>
-                  <a:schemeClr val="tx1">
-                    <a:tint val="75000"/>
-                  </a:schemeClr>
+                  <a:schemeClr val="tx1"/>
                 </a:solidFill>
               </a:defRPr>
             </a:lvl1pPr>
@@ -6971,13 +9189,7 @@
       </p:sp>
       <p:sp>
         <p:nvSpPr>
-          <p:cNvPr id="4" name="Date Placeholder 3">
-            <a:extLst>
-              <a:ext uri="{FF2B5EF4-FFF2-40B4-BE49-F238E27FC236}">
-                <a16:creationId xmlns:a16="http://schemas.microsoft.com/office/drawing/2014/main" id="{8B0E392A-80BD-4C05-85B3-D62432737803}"/>
-              </a:ext>
-            </a:extLst>
-          </p:cNvPr>
+          <p:cNvPr id="4" name="Date Placeholder 3"/>
           <p:cNvSpPr>
             <a:spLocks noGrp="1"/>
           </p:cNvSpPr>
@@ -6992,7 +9204,7 @@
           <a:p>
             <a:fld id="{E9BF1F2D-2AEF-4074-BE6D-430396F80950}" type="datetimeFigureOut">
               <a:rPr lang="en-US" smtClean="0"/>
-              <a:t>3/27/2020</a:t>
+              <a:t>3/28/2020</a:t>
             </a:fld>
             <a:endParaRPr lang="en-US"/>
           </a:p>
@@ -7000,13 +9212,7 @@
       </p:sp>
       <p:sp>
         <p:nvSpPr>
-          <p:cNvPr id="5" name="Footer Placeholder 4">
-            <a:extLst>
-              <a:ext uri="{FF2B5EF4-FFF2-40B4-BE49-F238E27FC236}">
-                <a16:creationId xmlns:a16="http://schemas.microsoft.com/office/drawing/2014/main" id="{0FF92DF7-D502-4579-A6F7-E307E35287AE}"/>
-              </a:ext>
-            </a:extLst>
-          </p:cNvPr>
+          <p:cNvPr id="5" name="Footer Placeholder 4"/>
           <p:cNvSpPr>
             <a:spLocks noGrp="1"/>
           </p:cNvSpPr>
@@ -7025,13 +9231,7 @@
       </p:sp>
       <p:sp>
         <p:nvSpPr>
-          <p:cNvPr id="6" name="Slide Number Placeholder 5">
-            <a:extLst>
-              <a:ext uri="{FF2B5EF4-FFF2-40B4-BE49-F238E27FC236}">
-                <a16:creationId xmlns:a16="http://schemas.microsoft.com/office/drawing/2014/main" id="{76173305-9EC4-40D8-984B-F92F6600C904}"/>
-              </a:ext>
-            </a:extLst>
-          </p:cNvPr>
+          <p:cNvPr id="6" name="Slide Number Placeholder 5"/>
           <p:cNvSpPr>
             <a:spLocks noGrp="1"/>
           </p:cNvSpPr>
@@ -7055,7 +9255,7 @@
     </p:spTree>
     <p:extLst>
       <p:ext uri="{BB962C8B-B14F-4D97-AF65-F5344CB8AC3E}">
-        <p14:creationId xmlns:p14="http://schemas.microsoft.com/office/powerpoint/2010/main" val="1372888317"/>
+        <p14:creationId xmlns:p14="http://schemas.microsoft.com/office/powerpoint/2010/main" val="1923488774"/>
       </p:ext>
     </p:extLst>
   </p:cSld>
@@ -7084,13 +9284,7 @@
       </p:grpSpPr>
       <p:sp>
         <p:nvSpPr>
-          <p:cNvPr id="2" name="Title 1">
-            <a:extLst>
-              <a:ext uri="{FF2B5EF4-FFF2-40B4-BE49-F238E27FC236}">
-                <a16:creationId xmlns:a16="http://schemas.microsoft.com/office/drawing/2014/main" id="{7123B181-0785-4E37-A5C0-5D1A8C8298BD}"/>
-              </a:ext>
-            </a:extLst>
-          </p:cNvPr>
+          <p:cNvPr id="2" name="Title 1"/>
           <p:cNvSpPr>
             <a:spLocks noGrp="1"/>
           </p:cNvSpPr>
@@ -7107,18 +9301,13 @@
               <a:rPr lang="en-US"/>
               <a:t>Click to edit Master title style</a:t>
             </a:r>
+            <a:endParaRPr lang="en-US" dirty="0"/>
           </a:p>
         </p:txBody>
       </p:sp>
       <p:sp>
         <p:nvSpPr>
-          <p:cNvPr id="3" name="Content Placeholder 2">
-            <a:extLst>
-              <a:ext uri="{FF2B5EF4-FFF2-40B4-BE49-F238E27FC236}">
-                <a16:creationId xmlns:a16="http://schemas.microsoft.com/office/drawing/2014/main" id="{53AF4B0D-1B88-4A6C-9D23-790F305A49C7}"/>
-              </a:ext>
-            </a:extLst>
-          </p:cNvPr>
+          <p:cNvPr id="3" name="Content Placeholder 2"/>
           <p:cNvSpPr>
             <a:spLocks noGrp="1"/>
           </p:cNvSpPr>
@@ -7128,8 +9317,8 @@
         </p:nvSpPr>
         <p:spPr>
           <a:xfrm>
-            <a:off x="838200" y="1825625"/>
-            <a:ext cx="5181600" cy="4351338"/>
+            <a:off x="628650" y="1825625"/>
+            <a:ext cx="3886200" cy="4351338"/>
           </a:xfrm>
         </p:spPr>
         <p:txBody>
@@ -7169,18 +9358,13 @@
               <a:rPr lang="en-US"/>
               <a:t>Fifth level</a:t>
             </a:r>
+            <a:endParaRPr lang="en-US" dirty="0"/>
           </a:p>
         </p:txBody>
       </p:sp>
       <p:sp>
         <p:nvSpPr>
-          <p:cNvPr id="4" name="Content Placeholder 3">
-            <a:extLst>
-              <a:ext uri="{FF2B5EF4-FFF2-40B4-BE49-F238E27FC236}">
-                <a16:creationId xmlns:a16="http://schemas.microsoft.com/office/drawing/2014/main" id="{A300A101-D852-4B23-98FF-9AD4099FB501}"/>
-              </a:ext>
-            </a:extLst>
-          </p:cNvPr>
+          <p:cNvPr id="4" name="Content Placeholder 3"/>
           <p:cNvSpPr>
             <a:spLocks noGrp="1"/>
           </p:cNvSpPr>
@@ -7190,8 +9374,8 @@
         </p:nvSpPr>
         <p:spPr>
           <a:xfrm>
-            <a:off x="6172200" y="1825625"/>
-            <a:ext cx="5181600" cy="4351338"/>
+            <a:off x="4629150" y="1825625"/>
+            <a:ext cx="3886200" cy="4351338"/>
           </a:xfrm>
         </p:spPr>
         <p:txBody>
@@ -7231,18 +9415,13 @@
               <a:rPr lang="en-US"/>
               <a:t>Fifth level</a:t>
             </a:r>
+            <a:endParaRPr lang="en-US" dirty="0"/>
           </a:p>
         </p:txBody>
       </p:sp>
       <p:sp>
         <p:nvSpPr>
-          <p:cNvPr id="5" name="Date Placeholder 4">
-            <a:extLst>
-              <a:ext uri="{FF2B5EF4-FFF2-40B4-BE49-F238E27FC236}">
-                <a16:creationId xmlns:a16="http://schemas.microsoft.com/office/drawing/2014/main" id="{8A4380AF-FA57-4CB1-A97B-18B52FCD112E}"/>
-              </a:ext>
-            </a:extLst>
-          </p:cNvPr>
+          <p:cNvPr id="5" name="Date Placeholder 4"/>
           <p:cNvSpPr>
             <a:spLocks noGrp="1"/>
           </p:cNvSpPr>
@@ -7257,7 +9436,7 @@
           <a:p>
             <a:fld id="{E9BF1F2D-2AEF-4074-BE6D-430396F80950}" type="datetimeFigureOut">
               <a:rPr lang="en-US" smtClean="0"/>
-              <a:t>3/27/2020</a:t>
+              <a:t>3/28/2020</a:t>
             </a:fld>
             <a:endParaRPr lang="en-US"/>
           </a:p>
@@ -7265,13 +9444,7 @@
       </p:sp>
       <p:sp>
         <p:nvSpPr>
-          <p:cNvPr id="6" name="Footer Placeholder 5">
-            <a:extLst>
-              <a:ext uri="{FF2B5EF4-FFF2-40B4-BE49-F238E27FC236}">
-                <a16:creationId xmlns:a16="http://schemas.microsoft.com/office/drawing/2014/main" id="{40EA18A2-67D8-4586-B309-B7D49DF1C307}"/>
-              </a:ext>
-            </a:extLst>
-          </p:cNvPr>
+          <p:cNvPr id="6" name="Footer Placeholder 5"/>
           <p:cNvSpPr>
             <a:spLocks noGrp="1"/>
           </p:cNvSpPr>
@@ -7290,13 +9463,7 @@
       </p:sp>
       <p:sp>
         <p:nvSpPr>
-          <p:cNvPr id="7" name="Slide Number Placeholder 6">
-            <a:extLst>
-              <a:ext uri="{FF2B5EF4-FFF2-40B4-BE49-F238E27FC236}">
-                <a16:creationId xmlns:a16="http://schemas.microsoft.com/office/drawing/2014/main" id="{C95B90DE-A41F-4F76-9BC0-CE2153F91142}"/>
-              </a:ext>
-            </a:extLst>
-          </p:cNvPr>
+          <p:cNvPr id="7" name="Slide Number Placeholder 6"/>
           <p:cNvSpPr>
             <a:spLocks noGrp="1"/>
           </p:cNvSpPr>
@@ -7320,7 +9487,7 @@
     </p:spTree>
     <p:extLst>
       <p:ext uri="{BB962C8B-B14F-4D97-AF65-F5344CB8AC3E}">
-        <p14:creationId xmlns:p14="http://schemas.microsoft.com/office/powerpoint/2010/main" val="91571846"/>
+        <p14:creationId xmlns:p14="http://schemas.microsoft.com/office/powerpoint/2010/main" val="582175393"/>
       </p:ext>
     </p:extLst>
   </p:cSld>
@@ -7349,13 +9516,7 @@
       </p:grpSpPr>
       <p:sp>
         <p:nvSpPr>
-          <p:cNvPr id="2" name="Title 1">
-            <a:extLst>
-              <a:ext uri="{FF2B5EF4-FFF2-40B4-BE49-F238E27FC236}">
-                <a16:creationId xmlns:a16="http://schemas.microsoft.com/office/drawing/2014/main" id="{AC9363B4-AF20-4FCC-9E5E-6076ECFB1F66}"/>
-              </a:ext>
-            </a:extLst>
-          </p:cNvPr>
+          <p:cNvPr id="2" name="Title 1"/>
           <p:cNvSpPr>
             <a:spLocks noGrp="1"/>
           </p:cNvSpPr>
@@ -7365,8 +9526,8 @@
         </p:nvSpPr>
         <p:spPr>
           <a:xfrm>
-            <a:off x="839788" y="365125"/>
-            <a:ext cx="10515600" cy="1325563"/>
+            <a:off x="629841" y="365126"/>
+            <a:ext cx="7886700" cy="1325563"/>
           </a:xfrm>
         </p:spPr>
         <p:txBody>
@@ -7377,18 +9538,13 @@
               <a:rPr lang="en-US"/>
               <a:t>Click to edit Master title style</a:t>
             </a:r>
+            <a:endParaRPr lang="en-US" dirty="0"/>
           </a:p>
         </p:txBody>
       </p:sp>
       <p:sp>
         <p:nvSpPr>
-          <p:cNvPr id="3" name="Text Placeholder 2">
-            <a:extLst>
-              <a:ext uri="{FF2B5EF4-FFF2-40B4-BE49-F238E27FC236}">
-                <a16:creationId xmlns:a16="http://schemas.microsoft.com/office/drawing/2014/main" id="{FBB38246-FD7F-4351-A14B-7B512BC2330A}"/>
-              </a:ext>
-            </a:extLst>
-          </p:cNvPr>
+          <p:cNvPr id="3" name="Text Placeholder 2"/>
           <p:cNvSpPr>
             <a:spLocks noGrp="1"/>
           </p:cNvSpPr>
@@ -7398,8 +9554,8 @@
         </p:nvSpPr>
         <p:spPr>
           <a:xfrm>
-            <a:off x="839788" y="1681163"/>
-            <a:ext cx="5157787" cy="823912"/>
+            <a:off x="629842" y="1681163"/>
+            <a:ext cx="3868340" cy="823912"/>
           </a:xfrm>
         </p:spPr>
         <p:txBody>
@@ -7453,13 +9609,7 @@
       </p:sp>
       <p:sp>
         <p:nvSpPr>
-          <p:cNvPr id="4" name="Content Placeholder 3">
-            <a:extLst>
-              <a:ext uri="{FF2B5EF4-FFF2-40B4-BE49-F238E27FC236}">
-                <a16:creationId xmlns:a16="http://schemas.microsoft.com/office/drawing/2014/main" id="{1037EF7B-D09B-42A8-A9A8-A08BDEBADDFA}"/>
-              </a:ext>
-            </a:extLst>
-          </p:cNvPr>
+          <p:cNvPr id="4" name="Content Placeholder 3"/>
           <p:cNvSpPr>
             <a:spLocks noGrp="1"/>
           </p:cNvSpPr>
@@ -7469,8 +9619,8 @@
         </p:nvSpPr>
         <p:spPr>
           <a:xfrm>
-            <a:off x="839788" y="2505075"/>
-            <a:ext cx="5157787" cy="3684588"/>
+            <a:off x="629842" y="2505075"/>
+            <a:ext cx="3868340" cy="3684588"/>
           </a:xfrm>
         </p:spPr>
         <p:txBody>
@@ -7510,18 +9660,13 @@
               <a:rPr lang="en-US"/>
               <a:t>Fifth level</a:t>
             </a:r>
+            <a:endParaRPr lang="en-US" dirty="0"/>
           </a:p>
         </p:txBody>
       </p:sp>
       <p:sp>
         <p:nvSpPr>
-          <p:cNvPr id="5" name="Text Placeholder 4">
-            <a:extLst>
-              <a:ext uri="{FF2B5EF4-FFF2-40B4-BE49-F238E27FC236}">
-                <a16:creationId xmlns:a16="http://schemas.microsoft.com/office/drawing/2014/main" id="{91B5922F-F72F-4E65-9CEE-D57704EDBA75}"/>
-              </a:ext>
-            </a:extLst>
-          </p:cNvPr>
+          <p:cNvPr id="5" name="Text Placeholder 4"/>
           <p:cNvSpPr>
             <a:spLocks noGrp="1"/>
           </p:cNvSpPr>
@@ -7531,8 +9676,8 @@
         </p:nvSpPr>
         <p:spPr>
           <a:xfrm>
-            <a:off x="6172200" y="1681163"/>
-            <a:ext cx="5183188" cy="823912"/>
+            <a:off x="4629150" y="1681163"/>
+            <a:ext cx="3887391" cy="823912"/>
           </a:xfrm>
         </p:spPr>
         <p:txBody>
@@ -7586,13 +9731,7 @@
       </p:sp>
       <p:sp>
         <p:nvSpPr>
-          <p:cNvPr id="6" name="Content Placeholder 5">
-            <a:extLst>
-              <a:ext uri="{FF2B5EF4-FFF2-40B4-BE49-F238E27FC236}">
-                <a16:creationId xmlns:a16="http://schemas.microsoft.com/office/drawing/2014/main" id="{C7FB48C6-871F-4AFA-BAB9-6C893E4FD344}"/>
-              </a:ext>
-            </a:extLst>
-          </p:cNvPr>
+          <p:cNvPr id="6" name="Content Placeholder 5"/>
           <p:cNvSpPr>
             <a:spLocks noGrp="1"/>
           </p:cNvSpPr>
@@ -7602,8 +9741,8 @@
         </p:nvSpPr>
         <p:spPr>
           <a:xfrm>
-            <a:off x="6172200" y="2505075"/>
-            <a:ext cx="5183188" cy="3684588"/>
+            <a:off x="4629150" y="2505075"/>
+            <a:ext cx="3887391" cy="3684588"/>
           </a:xfrm>
         </p:spPr>
         <p:txBody>
@@ -7643,18 +9782,13 @@
               <a:rPr lang="en-US"/>
               <a:t>Fifth level</a:t>
             </a:r>
+            <a:endParaRPr lang="en-US" dirty="0"/>
           </a:p>
         </p:txBody>
       </p:sp>
       <p:sp>
         <p:nvSpPr>
-          <p:cNvPr id="7" name="Date Placeholder 6">
-            <a:extLst>
-              <a:ext uri="{FF2B5EF4-FFF2-40B4-BE49-F238E27FC236}">
-                <a16:creationId xmlns:a16="http://schemas.microsoft.com/office/drawing/2014/main" id="{F2E4DF0B-0D05-4EEE-87DF-372731F59939}"/>
-              </a:ext>
-            </a:extLst>
-          </p:cNvPr>
+          <p:cNvPr id="7" name="Date Placeholder 6"/>
           <p:cNvSpPr>
             <a:spLocks noGrp="1"/>
           </p:cNvSpPr>
@@ -7669,7 +9803,7 @@
           <a:p>
             <a:fld id="{E9BF1F2D-2AEF-4074-BE6D-430396F80950}" type="datetimeFigureOut">
               <a:rPr lang="en-US" smtClean="0"/>
-              <a:t>3/27/2020</a:t>
+              <a:t>3/28/2020</a:t>
             </a:fld>
             <a:endParaRPr lang="en-US"/>
           </a:p>
@@ -7677,13 +9811,7 @@
       </p:sp>
       <p:sp>
         <p:nvSpPr>
-          <p:cNvPr id="8" name="Footer Placeholder 7">
-            <a:extLst>
-              <a:ext uri="{FF2B5EF4-FFF2-40B4-BE49-F238E27FC236}">
-                <a16:creationId xmlns:a16="http://schemas.microsoft.com/office/drawing/2014/main" id="{39D05DA7-522F-4950-BE0A-3249FA11FFC6}"/>
-              </a:ext>
-            </a:extLst>
-          </p:cNvPr>
+          <p:cNvPr id="8" name="Footer Placeholder 7"/>
           <p:cNvSpPr>
             <a:spLocks noGrp="1"/>
           </p:cNvSpPr>
@@ -7702,13 +9830,7 @@
       </p:sp>
       <p:sp>
         <p:nvSpPr>
-          <p:cNvPr id="9" name="Slide Number Placeholder 8">
-            <a:extLst>
-              <a:ext uri="{FF2B5EF4-FFF2-40B4-BE49-F238E27FC236}">
-                <a16:creationId xmlns:a16="http://schemas.microsoft.com/office/drawing/2014/main" id="{832111D9-3AD4-497B-B3CB-2552B61A0DBC}"/>
-              </a:ext>
-            </a:extLst>
-          </p:cNvPr>
+          <p:cNvPr id="9" name="Slide Number Placeholder 8"/>
           <p:cNvSpPr>
             <a:spLocks noGrp="1"/>
           </p:cNvSpPr>
@@ -7732,7 +9854,7 @@
     </p:spTree>
     <p:extLst>
       <p:ext uri="{BB962C8B-B14F-4D97-AF65-F5344CB8AC3E}">
-        <p14:creationId xmlns:p14="http://schemas.microsoft.com/office/powerpoint/2010/main" val="861411679"/>
+        <p14:creationId xmlns:p14="http://schemas.microsoft.com/office/powerpoint/2010/main" val="205870042"/>
       </p:ext>
     </p:extLst>
   </p:cSld>
@@ -7761,13 +9883,7 @@
       </p:grpSpPr>
       <p:sp>
         <p:nvSpPr>
-          <p:cNvPr id="2" name="Title 1">
-            <a:extLst>
-              <a:ext uri="{FF2B5EF4-FFF2-40B4-BE49-F238E27FC236}">
-                <a16:creationId xmlns:a16="http://schemas.microsoft.com/office/drawing/2014/main" id="{F9A9AD24-74ED-4120-9167-5BE71E5B3A6B}"/>
-              </a:ext>
-            </a:extLst>
-          </p:cNvPr>
+          <p:cNvPr id="2" name="Title 1"/>
           <p:cNvSpPr>
             <a:spLocks noGrp="1"/>
           </p:cNvSpPr>
@@ -7784,18 +9900,13 @@
               <a:rPr lang="en-US"/>
               <a:t>Click to edit Master title style</a:t>
             </a:r>
+            <a:endParaRPr lang="en-US" dirty="0"/>
           </a:p>
         </p:txBody>
       </p:sp>
       <p:sp>
         <p:nvSpPr>
-          <p:cNvPr id="3" name="Date Placeholder 2">
-            <a:extLst>
-              <a:ext uri="{FF2B5EF4-FFF2-40B4-BE49-F238E27FC236}">
-                <a16:creationId xmlns:a16="http://schemas.microsoft.com/office/drawing/2014/main" id="{B4443A6C-395A-425C-B025-F90406B9A126}"/>
-              </a:ext>
-            </a:extLst>
-          </p:cNvPr>
+          <p:cNvPr id="3" name="Date Placeholder 2"/>
           <p:cNvSpPr>
             <a:spLocks noGrp="1"/>
           </p:cNvSpPr>
@@ -7810,7 +9921,7 @@
           <a:p>
             <a:fld id="{E9BF1F2D-2AEF-4074-BE6D-430396F80950}" type="datetimeFigureOut">
               <a:rPr lang="en-US" smtClean="0"/>
-              <a:t>3/27/2020</a:t>
+              <a:t>3/28/2020</a:t>
             </a:fld>
             <a:endParaRPr lang="en-US"/>
           </a:p>
@@ -7818,13 +9929,7 @@
       </p:sp>
       <p:sp>
         <p:nvSpPr>
-          <p:cNvPr id="4" name="Footer Placeholder 3">
-            <a:extLst>
-              <a:ext uri="{FF2B5EF4-FFF2-40B4-BE49-F238E27FC236}">
-                <a16:creationId xmlns:a16="http://schemas.microsoft.com/office/drawing/2014/main" id="{7837B38F-DE06-48D1-B70C-04275319A62B}"/>
-              </a:ext>
-            </a:extLst>
-          </p:cNvPr>
+          <p:cNvPr id="4" name="Footer Placeholder 3"/>
           <p:cNvSpPr>
             <a:spLocks noGrp="1"/>
           </p:cNvSpPr>
@@ -7843,13 +9948,7 @@
       </p:sp>
       <p:sp>
         <p:nvSpPr>
-          <p:cNvPr id="5" name="Slide Number Placeholder 4">
-            <a:extLst>
-              <a:ext uri="{FF2B5EF4-FFF2-40B4-BE49-F238E27FC236}">
-                <a16:creationId xmlns:a16="http://schemas.microsoft.com/office/drawing/2014/main" id="{063B4018-FF40-4F2F-9797-DF3DDB078374}"/>
-              </a:ext>
-            </a:extLst>
-          </p:cNvPr>
+          <p:cNvPr id="5" name="Slide Number Placeholder 4"/>
           <p:cNvSpPr>
             <a:spLocks noGrp="1"/>
           </p:cNvSpPr>
@@ -7873,7 +9972,7 @@
     </p:spTree>
     <p:extLst>
       <p:ext uri="{BB962C8B-B14F-4D97-AF65-F5344CB8AC3E}">
-        <p14:creationId xmlns:p14="http://schemas.microsoft.com/office/powerpoint/2010/main" val="3707224038"/>
+        <p14:creationId xmlns:p14="http://schemas.microsoft.com/office/powerpoint/2010/main" val="3106726349"/>
       </p:ext>
     </p:extLst>
   </p:cSld>
@@ -7902,13 +10001,7 @@
       </p:grpSpPr>
       <p:sp>
         <p:nvSpPr>
-          <p:cNvPr id="2" name="Date Placeholder 1">
-            <a:extLst>
-              <a:ext uri="{FF2B5EF4-FFF2-40B4-BE49-F238E27FC236}">
-                <a16:creationId xmlns:a16="http://schemas.microsoft.com/office/drawing/2014/main" id="{63153860-B0B4-4253-9A57-EEE36FB6F1AC}"/>
-              </a:ext>
-            </a:extLst>
-          </p:cNvPr>
+          <p:cNvPr id="2" name="Date Placeholder 1"/>
           <p:cNvSpPr>
             <a:spLocks noGrp="1"/>
           </p:cNvSpPr>
@@ -7923,7 +10016,7 @@
           <a:p>
             <a:fld id="{E9BF1F2D-2AEF-4074-BE6D-430396F80950}" type="datetimeFigureOut">
               <a:rPr lang="en-US" smtClean="0"/>
-              <a:t>3/27/2020</a:t>
+              <a:t>3/28/2020</a:t>
             </a:fld>
             <a:endParaRPr lang="en-US"/>
           </a:p>
@@ -7931,13 +10024,7 @@
       </p:sp>
       <p:sp>
         <p:nvSpPr>
-          <p:cNvPr id="3" name="Footer Placeholder 2">
-            <a:extLst>
-              <a:ext uri="{FF2B5EF4-FFF2-40B4-BE49-F238E27FC236}">
-                <a16:creationId xmlns:a16="http://schemas.microsoft.com/office/drawing/2014/main" id="{3966FCE6-EC64-40C1-86F7-358B37D66978}"/>
-              </a:ext>
-            </a:extLst>
-          </p:cNvPr>
+          <p:cNvPr id="3" name="Footer Placeholder 2"/>
           <p:cNvSpPr>
             <a:spLocks noGrp="1"/>
           </p:cNvSpPr>
@@ -7956,13 +10043,7 @@
       </p:sp>
       <p:sp>
         <p:nvSpPr>
-          <p:cNvPr id="4" name="Slide Number Placeholder 3">
-            <a:extLst>
-              <a:ext uri="{FF2B5EF4-FFF2-40B4-BE49-F238E27FC236}">
-                <a16:creationId xmlns:a16="http://schemas.microsoft.com/office/drawing/2014/main" id="{0FDB37D8-1CAF-4913-AE29-109530DE8B86}"/>
-              </a:ext>
-            </a:extLst>
-          </p:cNvPr>
+          <p:cNvPr id="4" name="Slide Number Placeholder 3"/>
           <p:cNvSpPr>
             <a:spLocks noGrp="1"/>
           </p:cNvSpPr>
@@ -7986,7 +10067,7 @@
     </p:spTree>
     <p:extLst>
       <p:ext uri="{BB962C8B-B14F-4D97-AF65-F5344CB8AC3E}">
-        <p14:creationId xmlns:p14="http://schemas.microsoft.com/office/powerpoint/2010/main" val="2113210881"/>
+        <p14:creationId xmlns:p14="http://schemas.microsoft.com/office/powerpoint/2010/main" val="1074776167"/>
       </p:ext>
     </p:extLst>
   </p:cSld>
@@ -8015,13 +10096,7 @@
       </p:grpSpPr>
       <p:sp>
         <p:nvSpPr>
-          <p:cNvPr id="2" name="Title 1">
-            <a:extLst>
-              <a:ext uri="{FF2B5EF4-FFF2-40B4-BE49-F238E27FC236}">
-                <a16:creationId xmlns:a16="http://schemas.microsoft.com/office/drawing/2014/main" id="{3336FC19-6487-461E-B378-BCF60729AA31}"/>
-              </a:ext>
-            </a:extLst>
-          </p:cNvPr>
+          <p:cNvPr id="2" name="Title 1"/>
           <p:cNvSpPr>
             <a:spLocks noGrp="1"/>
           </p:cNvSpPr>
@@ -8031,8 +10106,8 @@
         </p:nvSpPr>
         <p:spPr>
           <a:xfrm>
-            <a:off x="839788" y="457200"/>
-            <a:ext cx="3932237" cy="1600200"/>
+            <a:off x="629841" y="457200"/>
+            <a:ext cx="2949178" cy="1600200"/>
           </a:xfrm>
         </p:spPr>
         <p:txBody>
@@ -8047,18 +10122,13 @@
               <a:rPr lang="en-US"/>
               <a:t>Click to edit Master title style</a:t>
             </a:r>
+            <a:endParaRPr lang="en-US" dirty="0"/>
           </a:p>
         </p:txBody>
       </p:sp>
       <p:sp>
         <p:nvSpPr>
-          <p:cNvPr id="3" name="Content Placeholder 2">
-            <a:extLst>
-              <a:ext uri="{FF2B5EF4-FFF2-40B4-BE49-F238E27FC236}">
-                <a16:creationId xmlns:a16="http://schemas.microsoft.com/office/drawing/2014/main" id="{3516CB05-87D8-46D2-8D8E-0AB98FE5389A}"/>
-              </a:ext>
-            </a:extLst>
-          </p:cNvPr>
+          <p:cNvPr id="3" name="Content Placeholder 2"/>
           <p:cNvSpPr>
             <a:spLocks noGrp="1"/>
           </p:cNvSpPr>
@@ -8068,8 +10138,8 @@
         </p:nvSpPr>
         <p:spPr>
           <a:xfrm>
-            <a:off x="5183188" y="987425"/>
-            <a:ext cx="6172200" cy="4873625"/>
+            <a:off x="3887391" y="987426"/>
+            <a:ext cx="4629150" cy="4873625"/>
           </a:xfrm>
         </p:spPr>
         <p:txBody>
@@ -8137,18 +10207,13 @@
               <a:rPr lang="en-US"/>
               <a:t>Fifth level</a:t>
             </a:r>
+            <a:endParaRPr lang="en-US" dirty="0"/>
           </a:p>
         </p:txBody>
       </p:sp>
       <p:sp>
         <p:nvSpPr>
-          <p:cNvPr id="4" name="Text Placeholder 3">
-            <a:extLst>
-              <a:ext uri="{FF2B5EF4-FFF2-40B4-BE49-F238E27FC236}">
-                <a16:creationId xmlns:a16="http://schemas.microsoft.com/office/drawing/2014/main" id="{DFD03F19-AA05-422A-9537-3C78B7AECC85}"/>
-              </a:ext>
-            </a:extLst>
-          </p:cNvPr>
+          <p:cNvPr id="4" name="Text Placeholder 3"/>
           <p:cNvSpPr>
             <a:spLocks noGrp="1"/>
           </p:cNvSpPr>
@@ -8158,8 +10223,8 @@
         </p:nvSpPr>
         <p:spPr>
           <a:xfrm>
-            <a:off x="839788" y="2057400"/>
-            <a:ext cx="3932237" cy="3811588"/>
+            <a:off x="629841" y="2057400"/>
+            <a:ext cx="2949178" cy="3811588"/>
           </a:xfrm>
         </p:spPr>
         <p:txBody>
@@ -8213,13 +10278,7 @@
       </p:sp>
       <p:sp>
         <p:nvSpPr>
-          <p:cNvPr id="5" name="Date Placeholder 4">
-            <a:extLst>
-              <a:ext uri="{FF2B5EF4-FFF2-40B4-BE49-F238E27FC236}">
-                <a16:creationId xmlns:a16="http://schemas.microsoft.com/office/drawing/2014/main" id="{A10BA842-A7B8-4A0A-ABE7-0E6369D26D35}"/>
-              </a:ext>
-            </a:extLst>
-          </p:cNvPr>
+          <p:cNvPr id="5" name="Date Placeholder 4"/>
           <p:cNvSpPr>
             <a:spLocks noGrp="1"/>
           </p:cNvSpPr>
@@ -8234,7 +10293,7 @@
           <a:p>
             <a:fld id="{E9BF1F2D-2AEF-4074-BE6D-430396F80950}" type="datetimeFigureOut">
               <a:rPr lang="en-US" smtClean="0"/>
-              <a:t>3/27/2020</a:t>
+              <a:t>3/28/2020</a:t>
             </a:fld>
             <a:endParaRPr lang="en-US"/>
           </a:p>
@@ -8242,13 +10301,7 @@
       </p:sp>
       <p:sp>
         <p:nvSpPr>
-          <p:cNvPr id="6" name="Footer Placeholder 5">
-            <a:extLst>
-              <a:ext uri="{FF2B5EF4-FFF2-40B4-BE49-F238E27FC236}">
-                <a16:creationId xmlns:a16="http://schemas.microsoft.com/office/drawing/2014/main" id="{32DB9CB7-2ABD-4A7E-A3CF-0946FC2936CF}"/>
-              </a:ext>
-            </a:extLst>
-          </p:cNvPr>
+          <p:cNvPr id="6" name="Footer Placeholder 5"/>
           <p:cNvSpPr>
             <a:spLocks noGrp="1"/>
           </p:cNvSpPr>
@@ -8267,13 +10320,7 @@
       </p:sp>
       <p:sp>
         <p:nvSpPr>
-          <p:cNvPr id="7" name="Slide Number Placeholder 6">
-            <a:extLst>
-              <a:ext uri="{FF2B5EF4-FFF2-40B4-BE49-F238E27FC236}">
-                <a16:creationId xmlns:a16="http://schemas.microsoft.com/office/drawing/2014/main" id="{2B6099EF-A8CF-4F7E-BECB-0494A96CA85D}"/>
-              </a:ext>
-            </a:extLst>
-          </p:cNvPr>
+          <p:cNvPr id="7" name="Slide Number Placeholder 6"/>
           <p:cNvSpPr>
             <a:spLocks noGrp="1"/>
           </p:cNvSpPr>
@@ -8297,7 +10344,7 @@
     </p:spTree>
     <p:extLst>
       <p:ext uri="{BB962C8B-B14F-4D97-AF65-F5344CB8AC3E}">
-        <p14:creationId xmlns:p14="http://schemas.microsoft.com/office/powerpoint/2010/main" val="2148875972"/>
+        <p14:creationId xmlns:p14="http://schemas.microsoft.com/office/powerpoint/2010/main" val="753181172"/>
       </p:ext>
     </p:extLst>
   </p:cSld>
@@ -8326,13 +10373,7 @@
       </p:grpSpPr>
       <p:sp>
         <p:nvSpPr>
-          <p:cNvPr id="2" name="Title 1">
-            <a:extLst>
-              <a:ext uri="{FF2B5EF4-FFF2-40B4-BE49-F238E27FC236}">
-                <a16:creationId xmlns:a16="http://schemas.microsoft.com/office/drawing/2014/main" id="{918EBD92-B0CE-4FF7-A297-E6B19D0AD56D}"/>
-              </a:ext>
-            </a:extLst>
-          </p:cNvPr>
+          <p:cNvPr id="2" name="Title 1"/>
           <p:cNvSpPr>
             <a:spLocks noGrp="1"/>
           </p:cNvSpPr>
@@ -8342,8 +10383,8 @@
         </p:nvSpPr>
         <p:spPr>
           <a:xfrm>
-            <a:off x="839788" y="457200"/>
-            <a:ext cx="3932237" cy="1600200"/>
+            <a:off x="629841" y="457200"/>
+            <a:ext cx="2949178" cy="1600200"/>
           </a:xfrm>
         </p:spPr>
         <p:txBody>
@@ -8358,20 +10399,15 @@
               <a:rPr lang="en-US"/>
               <a:t>Click to edit Master title style</a:t>
             </a:r>
+            <a:endParaRPr lang="en-US" dirty="0"/>
           </a:p>
         </p:txBody>
       </p:sp>
       <p:sp>
         <p:nvSpPr>
-          <p:cNvPr id="3" name="Picture Placeholder 2">
-            <a:extLst>
-              <a:ext uri="{FF2B5EF4-FFF2-40B4-BE49-F238E27FC236}">
-                <a16:creationId xmlns:a16="http://schemas.microsoft.com/office/drawing/2014/main" id="{6FCF9A62-40BB-4415-8E27-B96372DEAF47}"/>
-              </a:ext>
-            </a:extLst>
-          </p:cNvPr>
+          <p:cNvPr id="3" name="Picture Placeholder 2"/>
           <p:cNvSpPr>
-            <a:spLocks noGrp="1"/>
+            <a:spLocks noGrp="1" noChangeAspect="1"/>
           </p:cNvSpPr>
           <p:nvPr>
             <p:ph type="pic" idx="1"/>
@@ -8379,12 +10415,12 @@
         </p:nvSpPr>
         <p:spPr>
           <a:xfrm>
-            <a:off x="5183188" y="987425"/>
-            <a:ext cx="6172200" cy="4873625"/>
+            <a:off x="3887391" y="987426"/>
+            <a:ext cx="4629150" cy="4873625"/>
           </a:xfrm>
         </p:spPr>
         <p:txBody>
-          <a:bodyPr/>
+          <a:bodyPr anchor="t"/>
           <a:lstStyle>
             <a:lvl1pPr marL="0" indent="0">
               <a:buNone/>
@@ -8424,19 +10460,17 @@
             </a:lvl9pPr>
           </a:lstStyle>
           <a:p>
-            <a:endParaRPr lang="en-US"/>
+            <a:r>
+              <a:rPr lang="en-US"/>
+              <a:t>Click icon to add picture</a:t>
+            </a:r>
+            <a:endParaRPr lang="en-US" dirty="0"/>
           </a:p>
         </p:txBody>
       </p:sp>
       <p:sp>
         <p:nvSpPr>
-          <p:cNvPr id="4" name="Text Placeholder 3">
-            <a:extLst>
-              <a:ext uri="{FF2B5EF4-FFF2-40B4-BE49-F238E27FC236}">
-                <a16:creationId xmlns:a16="http://schemas.microsoft.com/office/drawing/2014/main" id="{B6F79592-C570-4E44-A64A-0AA84F56C353}"/>
-              </a:ext>
-            </a:extLst>
-          </p:cNvPr>
+          <p:cNvPr id="4" name="Text Placeholder 3"/>
           <p:cNvSpPr>
             <a:spLocks noGrp="1"/>
           </p:cNvSpPr>
@@ -8446,8 +10480,8 @@
         </p:nvSpPr>
         <p:spPr>
           <a:xfrm>
-            <a:off x="839788" y="2057400"/>
-            <a:ext cx="3932237" cy="3811588"/>
+            <a:off x="629841" y="2057400"/>
+            <a:ext cx="2949178" cy="3811588"/>
           </a:xfrm>
         </p:spPr>
         <p:txBody>
@@ -8501,13 +10535,7 @@
       </p:sp>
       <p:sp>
         <p:nvSpPr>
-          <p:cNvPr id="5" name="Date Placeholder 4">
-            <a:extLst>
-              <a:ext uri="{FF2B5EF4-FFF2-40B4-BE49-F238E27FC236}">
-                <a16:creationId xmlns:a16="http://schemas.microsoft.com/office/drawing/2014/main" id="{CA072368-9022-444C-8C8A-0B4792CFD595}"/>
-              </a:ext>
-            </a:extLst>
-          </p:cNvPr>
+          <p:cNvPr id="5" name="Date Placeholder 4"/>
           <p:cNvSpPr>
             <a:spLocks noGrp="1"/>
           </p:cNvSpPr>
@@ -8522,7 +10550,7 @@
           <a:p>
             <a:fld id="{E9BF1F2D-2AEF-4074-BE6D-430396F80950}" type="datetimeFigureOut">
               <a:rPr lang="en-US" smtClean="0"/>
-              <a:t>3/27/2020</a:t>
+              <a:t>3/28/2020</a:t>
             </a:fld>
             <a:endParaRPr lang="en-US"/>
           </a:p>
@@ -8530,13 +10558,7 @@
       </p:sp>
       <p:sp>
         <p:nvSpPr>
-          <p:cNvPr id="6" name="Footer Placeholder 5">
-            <a:extLst>
-              <a:ext uri="{FF2B5EF4-FFF2-40B4-BE49-F238E27FC236}">
-                <a16:creationId xmlns:a16="http://schemas.microsoft.com/office/drawing/2014/main" id="{BFA0E008-66D5-49A4-9040-6A967EA62443}"/>
-              </a:ext>
-            </a:extLst>
-          </p:cNvPr>
+          <p:cNvPr id="6" name="Footer Placeholder 5"/>
           <p:cNvSpPr>
             <a:spLocks noGrp="1"/>
           </p:cNvSpPr>
@@ -8555,13 +10577,7 @@
       </p:sp>
       <p:sp>
         <p:nvSpPr>
-          <p:cNvPr id="7" name="Slide Number Placeholder 6">
-            <a:extLst>
-              <a:ext uri="{FF2B5EF4-FFF2-40B4-BE49-F238E27FC236}">
-                <a16:creationId xmlns:a16="http://schemas.microsoft.com/office/drawing/2014/main" id="{03E869CC-100D-4F60-A71C-6D043355A6C5}"/>
-              </a:ext>
-            </a:extLst>
-          </p:cNvPr>
+          <p:cNvPr id="7" name="Slide Number Placeholder 6"/>
           <p:cNvSpPr>
             <a:spLocks noGrp="1"/>
           </p:cNvSpPr>
@@ -8585,7 +10601,7 @@
     </p:spTree>
     <p:extLst>
       <p:ext uri="{BB962C8B-B14F-4D97-AF65-F5344CB8AC3E}">
-        <p14:creationId xmlns:p14="http://schemas.microsoft.com/office/powerpoint/2010/main" val="1851947405"/>
+        <p14:creationId xmlns:p14="http://schemas.microsoft.com/office/powerpoint/2010/main" val="815510490"/>
       </p:ext>
     </p:extLst>
   </p:cSld>
@@ -8619,13 +10635,7 @@
       </p:grpSpPr>
       <p:sp>
         <p:nvSpPr>
-          <p:cNvPr id="2" name="Title Placeholder 1">
-            <a:extLst>
-              <a:ext uri="{FF2B5EF4-FFF2-40B4-BE49-F238E27FC236}">
-                <a16:creationId xmlns:a16="http://schemas.microsoft.com/office/drawing/2014/main" id="{F4265C77-BB82-4ADF-9E80-92C153066CD7}"/>
-              </a:ext>
-            </a:extLst>
-          </p:cNvPr>
+          <p:cNvPr id="2" name="Title Placeholder 1"/>
           <p:cNvSpPr>
             <a:spLocks noGrp="1"/>
           </p:cNvSpPr>
@@ -8635,8 +10645,8 @@
         </p:nvSpPr>
         <p:spPr>
           <a:xfrm>
-            <a:off x="838200" y="365125"/>
-            <a:ext cx="10515600" cy="1325563"/>
+            <a:off x="628650" y="365126"/>
+            <a:ext cx="7886700" cy="1325563"/>
           </a:xfrm>
           <a:prstGeom prst="rect">
             <a:avLst/>
@@ -8652,18 +10662,13 @@
               <a:rPr lang="en-US"/>
               <a:t>Click to edit Master title style</a:t>
             </a:r>
+            <a:endParaRPr lang="en-US" dirty="0"/>
           </a:p>
         </p:txBody>
       </p:sp>
       <p:sp>
         <p:nvSpPr>
-          <p:cNvPr id="3" name="Text Placeholder 2">
-            <a:extLst>
-              <a:ext uri="{FF2B5EF4-FFF2-40B4-BE49-F238E27FC236}">
-                <a16:creationId xmlns:a16="http://schemas.microsoft.com/office/drawing/2014/main" id="{AF546708-D588-4DF5-9FD9-9BEA6C6C1B81}"/>
-              </a:ext>
-            </a:extLst>
-          </p:cNvPr>
+          <p:cNvPr id="3" name="Text Placeholder 2"/>
           <p:cNvSpPr>
             <a:spLocks noGrp="1"/>
           </p:cNvSpPr>
@@ -8673,8 +10678,8 @@
         </p:nvSpPr>
         <p:spPr>
           <a:xfrm>
-            <a:off x="838200" y="1825625"/>
-            <a:ext cx="10515600" cy="4351338"/>
+            <a:off x="628650" y="1825625"/>
+            <a:ext cx="7886700" cy="4351338"/>
           </a:xfrm>
           <a:prstGeom prst="rect">
             <a:avLst/>
@@ -8719,18 +10724,13 @@
               <a:rPr lang="en-US"/>
               <a:t>Fifth level</a:t>
             </a:r>
+            <a:endParaRPr lang="en-US" dirty="0"/>
           </a:p>
         </p:txBody>
       </p:sp>
       <p:sp>
         <p:nvSpPr>
-          <p:cNvPr id="4" name="Date Placeholder 3">
-            <a:extLst>
-              <a:ext uri="{FF2B5EF4-FFF2-40B4-BE49-F238E27FC236}">
-                <a16:creationId xmlns:a16="http://schemas.microsoft.com/office/drawing/2014/main" id="{75E227F0-6C06-4849-9296-A54BD5211888}"/>
-              </a:ext>
-            </a:extLst>
-          </p:cNvPr>
+          <p:cNvPr id="4" name="Date Placeholder 3"/>
           <p:cNvSpPr>
             <a:spLocks noGrp="1"/>
           </p:cNvSpPr>
@@ -8740,8 +10740,8 @@
         </p:nvSpPr>
         <p:spPr>
           <a:xfrm>
-            <a:off x="838200" y="6356350"/>
-            <a:ext cx="2743200" cy="365125"/>
+            <a:off x="628650" y="6356351"/>
+            <a:ext cx="2057400" cy="365125"/>
           </a:xfrm>
           <a:prstGeom prst="rect">
             <a:avLst/>
@@ -8763,7 +10763,7 @@
           <a:p>
             <a:fld id="{E9BF1F2D-2AEF-4074-BE6D-430396F80950}" type="datetimeFigureOut">
               <a:rPr lang="en-US" smtClean="0"/>
-              <a:t>3/27/2020</a:t>
+              <a:t>3/28/2020</a:t>
             </a:fld>
             <a:endParaRPr lang="en-US"/>
           </a:p>
@@ -8771,13 +10771,7 @@
       </p:sp>
       <p:sp>
         <p:nvSpPr>
-          <p:cNvPr id="5" name="Footer Placeholder 4">
-            <a:extLst>
-              <a:ext uri="{FF2B5EF4-FFF2-40B4-BE49-F238E27FC236}">
-                <a16:creationId xmlns:a16="http://schemas.microsoft.com/office/drawing/2014/main" id="{D17FE162-22E3-434C-B2DF-F852878147D6}"/>
-              </a:ext>
-            </a:extLst>
-          </p:cNvPr>
+          <p:cNvPr id="5" name="Footer Placeholder 4"/>
           <p:cNvSpPr>
             <a:spLocks noGrp="1"/>
           </p:cNvSpPr>
@@ -8787,8 +10781,8 @@
         </p:nvSpPr>
         <p:spPr>
           <a:xfrm>
-            <a:off x="4038600" y="6356350"/>
-            <a:ext cx="4114800" cy="365125"/>
+            <a:off x="3028950" y="6356351"/>
+            <a:ext cx="3086100" cy="365125"/>
           </a:xfrm>
           <a:prstGeom prst="rect">
             <a:avLst/>
@@ -8814,13 +10808,7 @@
       </p:sp>
       <p:sp>
         <p:nvSpPr>
-          <p:cNvPr id="6" name="Slide Number Placeholder 5">
-            <a:extLst>
-              <a:ext uri="{FF2B5EF4-FFF2-40B4-BE49-F238E27FC236}">
-                <a16:creationId xmlns:a16="http://schemas.microsoft.com/office/drawing/2014/main" id="{B3962D20-A138-4EF4-91C0-337251BD5EB6}"/>
-              </a:ext>
-            </a:extLst>
-          </p:cNvPr>
+          <p:cNvPr id="6" name="Slide Number Placeholder 5"/>
           <p:cNvSpPr>
             <a:spLocks noGrp="1"/>
           </p:cNvSpPr>
@@ -8830,8 +10818,8 @@
         </p:nvSpPr>
         <p:spPr>
           <a:xfrm>
-            <a:off x="8610600" y="6356350"/>
-            <a:ext cx="2743200" cy="365125"/>
+            <a:off x="6457950" y="6356351"/>
+            <a:ext cx="2057400" cy="365125"/>
           </a:xfrm>
           <a:prstGeom prst="rect">
             <a:avLst/>
@@ -8862,23 +10850,23 @@
     </p:spTree>
     <p:extLst>
       <p:ext uri="{BB962C8B-B14F-4D97-AF65-F5344CB8AC3E}">
-        <p14:creationId xmlns:p14="http://schemas.microsoft.com/office/powerpoint/2010/main" val="1234172531"/>
+        <p14:creationId xmlns:p14="http://schemas.microsoft.com/office/powerpoint/2010/main" val="3722174950"/>
       </p:ext>
     </p:extLst>
   </p:cSld>
   <p:clrMap bg1="lt1" tx1="dk1" bg2="lt2" tx2="dk2" accent1="accent1" accent2="accent2" accent3="accent3" accent4="accent4" accent5="accent5" accent6="accent6" hlink="hlink" folHlink="folHlink"/>
   <p:sldLayoutIdLst>
-    <p:sldLayoutId id="2147483649" r:id="rId1"/>
-    <p:sldLayoutId id="2147483650" r:id="rId2"/>
-    <p:sldLayoutId id="2147483651" r:id="rId3"/>
-    <p:sldLayoutId id="2147483652" r:id="rId4"/>
-    <p:sldLayoutId id="2147483653" r:id="rId5"/>
-    <p:sldLayoutId id="2147483654" r:id="rId6"/>
-    <p:sldLayoutId id="2147483655" r:id="rId7"/>
-    <p:sldLayoutId id="2147483656" r:id="rId8"/>
-    <p:sldLayoutId id="2147483657" r:id="rId9"/>
-    <p:sldLayoutId id="2147483658" r:id="rId10"/>
-    <p:sldLayoutId id="2147483659" r:id="rId11"/>
+    <p:sldLayoutId id="2147483661" r:id="rId1"/>
+    <p:sldLayoutId id="2147483662" r:id="rId2"/>
+    <p:sldLayoutId id="2147483663" r:id="rId3"/>
+    <p:sldLayoutId id="2147483664" r:id="rId4"/>
+    <p:sldLayoutId id="2147483665" r:id="rId5"/>
+    <p:sldLayoutId id="2147483666" r:id="rId6"/>
+    <p:sldLayoutId id="2147483667" r:id="rId7"/>
+    <p:sldLayoutId id="2147483668" r:id="rId8"/>
+    <p:sldLayoutId id="2147483669" r:id="rId9"/>
+    <p:sldLayoutId id="2147483670" r:id="rId10"/>
+    <p:sldLayoutId id="2147483671" r:id="rId11"/>
   </p:sldLayoutIdLst>
   <p:txStyles>
     <p:titleStyle>
@@ -9194,7 +11182,7 @@
         </p:nvGrpSpPr>
         <p:grpSpPr>
           <a:xfrm>
-            <a:off x="3089564" y="0"/>
+            <a:off x="1565565" y="0"/>
             <a:ext cx="6012873" cy="6858000"/>
             <a:chOff x="3519903" y="93307"/>
             <a:chExt cx="6012873" cy="6858000"/>
@@ -9293,7 +11281,7 @@
         </p:nvSpPr>
         <p:spPr>
           <a:xfrm>
-            <a:off x="4495799" y="176169"/>
+            <a:off x="2971799" y="176170"/>
             <a:ext cx="3200400" cy="505993"/>
           </a:xfrm>
           <a:prstGeom prst="rect">
@@ -9397,7 +11385,7 @@
         </p:nvGrpSpPr>
         <p:grpSpPr>
           <a:xfrm>
-            <a:off x="3089564" y="0"/>
+            <a:off x="1565565" y="0"/>
             <a:ext cx="6012873" cy="6858000"/>
             <a:chOff x="3519903" y="93307"/>
             <a:chExt cx="6012873" cy="6858000"/>
@@ -9496,7 +11484,7 @@
         </p:nvSpPr>
         <p:spPr>
           <a:xfrm>
-            <a:off x="4495799" y="176169"/>
+            <a:off x="2971799" y="176170"/>
             <a:ext cx="3200400" cy="505993"/>
           </a:xfrm>
           <a:prstGeom prst="rect">
@@ -9600,7 +11588,7 @@
         </p:nvGrpSpPr>
         <p:grpSpPr>
           <a:xfrm>
-            <a:off x="3089564" y="0"/>
+            <a:off x="1565565" y="0"/>
             <a:ext cx="6012873" cy="6858000"/>
             <a:chOff x="3519903" y="93307"/>
             <a:chExt cx="6012873" cy="6858000"/>
@@ -9699,7 +11687,7 @@
         </p:nvSpPr>
         <p:spPr>
           <a:xfrm>
-            <a:off x="4495799" y="176169"/>
+            <a:off x="2971799" y="176170"/>
             <a:ext cx="3200400" cy="505993"/>
           </a:xfrm>
           <a:prstGeom prst="rect">
@@ -9803,7 +11791,7 @@
         </p:nvGrpSpPr>
         <p:grpSpPr>
           <a:xfrm>
-            <a:off x="3089564" y="0"/>
+            <a:off x="1565565" y="0"/>
             <a:ext cx="6012873" cy="6858000"/>
             <a:chOff x="3519903" y="93307"/>
             <a:chExt cx="6012873" cy="6858000"/>
@@ -9902,7 +11890,7 @@
         </p:nvSpPr>
         <p:spPr>
           <a:xfrm>
-            <a:off x="4495799" y="176169"/>
+            <a:off x="2971799" y="176170"/>
             <a:ext cx="3200400" cy="505993"/>
           </a:xfrm>
           <a:prstGeom prst="rect">
@@ -10006,7 +11994,7 @@
         </p:nvGrpSpPr>
         <p:grpSpPr>
           <a:xfrm>
-            <a:off x="3089564" y="0"/>
+            <a:off x="1565565" y="0"/>
             <a:ext cx="6012873" cy="6858000"/>
             <a:chOff x="3519903" y="93307"/>
             <a:chExt cx="6012873" cy="6858000"/>
@@ -10105,7 +12093,7 @@
         </p:nvSpPr>
         <p:spPr>
           <a:xfrm>
-            <a:off x="4495799" y="176169"/>
+            <a:off x="2971799" y="176170"/>
             <a:ext cx="3200400" cy="505993"/>
           </a:xfrm>
           <a:prstGeom prst="rect">
@@ -10178,10 +12166,416 @@
 </p:sld>
 </file>
 
+<file path=ppt/slides/slide6.xml><?xml version="1.0" encoding="utf-8"?>
+<p:sld xmlns:a="http://schemas.openxmlformats.org/drawingml/2006/main" xmlns:r="http://schemas.openxmlformats.org/officeDocument/2006/relationships" xmlns:p="http://schemas.openxmlformats.org/presentationml/2006/main">
+  <p:cSld>
+    <p:spTree>
+      <p:nvGrpSpPr>
+        <p:cNvPr id="1" name=""/>
+        <p:cNvGrpSpPr/>
+        <p:nvPr/>
+      </p:nvGrpSpPr>
+      <p:grpSpPr>
+        <a:xfrm>
+          <a:off x="0" y="0"/>
+          <a:ext cx="0" cy="0"/>
+          <a:chOff x="0" y="0"/>
+          <a:chExt cx="0" cy="0"/>
+        </a:xfrm>
+      </p:grpSpPr>
+      <p:grpSp>
+        <p:nvGrpSpPr>
+          <p:cNvPr id="6" name="Group 5">
+            <a:extLst>
+              <a:ext uri="{FF2B5EF4-FFF2-40B4-BE49-F238E27FC236}">
+                <a16:creationId xmlns:a16="http://schemas.microsoft.com/office/drawing/2014/main" id="{023E4BA8-DE0B-4691-BE1E-D4FA73C69ED3}"/>
+              </a:ext>
+            </a:extLst>
+          </p:cNvPr>
+          <p:cNvGrpSpPr/>
+          <p:nvPr/>
+        </p:nvGrpSpPr>
+        <p:grpSpPr>
+          <a:xfrm>
+            <a:off x="1565565" y="0"/>
+            <a:ext cx="6012873" cy="6858000"/>
+            <a:chOff x="3519903" y="93307"/>
+            <a:chExt cx="6012873" cy="6858000"/>
+          </a:xfrm>
+        </p:grpSpPr>
+        <p:graphicFrame>
+          <p:nvGraphicFramePr>
+            <p:cNvPr id="4" name="Chart 3">
+              <a:extLst>
+                <a:ext uri="{FF2B5EF4-FFF2-40B4-BE49-F238E27FC236}">
+                  <a16:creationId xmlns:a16="http://schemas.microsoft.com/office/drawing/2014/main" id="{EA46B399-32B5-46D0-B8EA-73094A3A130E}"/>
+                </a:ext>
+              </a:extLst>
+            </p:cNvPr>
+            <p:cNvGraphicFramePr/>
+            <p:nvPr>
+              <p:extLst>
+                <p:ext uri="{D42A27DB-BD31-4B8C-83A1-F6EECF244321}">
+                  <p14:modId xmlns:p14="http://schemas.microsoft.com/office/powerpoint/2010/main" val="1389269556"/>
+                </p:ext>
+              </p:extLst>
+            </p:nvPr>
+          </p:nvGraphicFramePr>
+          <p:xfrm>
+            <a:off x="3519903" y="93307"/>
+            <a:ext cx="6012873" cy="6858000"/>
+          </p:xfrm>
+          <a:graphic>
+            <a:graphicData uri="http://schemas.openxmlformats.org/drawingml/2006/chart">
+              <c:chart xmlns:c="http://schemas.openxmlformats.org/drawingml/2006/chart" xmlns:r="http://schemas.openxmlformats.org/officeDocument/2006/relationships" r:id="rId2"/>
+            </a:graphicData>
+          </a:graphic>
+        </p:graphicFrame>
+        <p:sp>
+          <p:nvSpPr>
+            <p:cNvPr id="5" name="TextBox 4">
+              <a:extLst>
+                <a:ext uri="{FF2B5EF4-FFF2-40B4-BE49-F238E27FC236}">
+                  <a16:creationId xmlns:a16="http://schemas.microsoft.com/office/drawing/2014/main" id="{825A1C29-15B2-45E7-89BD-1DE97BEDC691}"/>
+                </a:ext>
+              </a:extLst>
+            </p:cNvPr>
+            <p:cNvSpPr txBox="1"/>
+            <p:nvPr/>
+          </p:nvSpPr>
+          <p:spPr>
+            <a:xfrm>
+              <a:off x="6009210" y="3168364"/>
+              <a:ext cx="1034257" cy="707886"/>
+            </a:xfrm>
+            <a:prstGeom prst="rect">
+              <a:avLst/>
+            </a:prstGeom>
+            <a:noFill/>
+          </p:spPr>
+          <p:txBody>
+            <a:bodyPr wrap="none" rtlCol="0">
+              <a:spAutoFit/>
+            </a:bodyPr>
+            <a:lstStyle/>
+            <a:p>
+              <a:pPr algn="ctr"/>
+              <a:r>
+                <a:rPr lang="en-US" sz="2400" dirty="0">
+                  <a:latin typeface="Peace Sans" panose="02000505040000020004" pitchFamily="50" charset="0"/>
+                </a:rPr>
+                <a:t>90</a:t>
+              </a:r>
+              <a:endParaRPr lang="en-US" sz="1600" dirty="0">
+                <a:latin typeface="Peace Sans" panose="02000505040000020004" pitchFamily="50" charset="0"/>
+              </a:endParaRPr>
+            </a:p>
+            <a:p>
+              <a:pPr algn="ctr"/>
+              <a:r>
+                <a:rPr lang="en-US" sz="1600" dirty="0">
+                  <a:latin typeface="Peace Sans" panose="02000505040000020004" pitchFamily="50" charset="0"/>
+                </a:rPr>
+                <a:t>calories</a:t>
+              </a:r>
+            </a:p>
+          </p:txBody>
+        </p:sp>
+      </p:grpSp>
+      <p:sp>
+        <p:nvSpPr>
+          <p:cNvPr id="7" name="Rectangle 6">
+            <a:extLst>
+              <a:ext uri="{FF2B5EF4-FFF2-40B4-BE49-F238E27FC236}">
+                <a16:creationId xmlns:a16="http://schemas.microsoft.com/office/drawing/2014/main" id="{0655FC73-8DF0-4674-9C86-F6B0EEDE90DE}"/>
+              </a:ext>
+            </a:extLst>
+          </p:cNvPr>
+          <p:cNvSpPr/>
+          <p:nvPr/>
+        </p:nvSpPr>
+        <p:spPr>
+          <a:xfrm>
+            <a:off x="2971799" y="176170"/>
+            <a:ext cx="3200400" cy="505993"/>
+          </a:xfrm>
+          <a:prstGeom prst="rect">
+            <a:avLst/>
+          </a:prstGeom>
+          <a:solidFill>
+            <a:schemeClr val="bg1"/>
+          </a:solidFill>
+          <a:ln>
+            <a:solidFill>
+              <a:schemeClr val="bg1"/>
+            </a:solidFill>
+          </a:ln>
+        </p:spPr>
+        <p:style>
+          <a:lnRef idx="2">
+            <a:schemeClr val="accent1">
+              <a:shade val="50000"/>
+            </a:schemeClr>
+          </a:lnRef>
+          <a:fillRef idx="1">
+            <a:schemeClr val="accent1"/>
+          </a:fillRef>
+          <a:effectRef idx="0">
+            <a:schemeClr val="accent1"/>
+          </a:effectRef>
+          <a:fontRef idx="minor">
+            <a:schemeClr val="lt1"/>
+          </a:fontRef>
+        </p:style>
+        <p:txBody>
+          <a:bodyPr rtlCol="0" anchor="ctr"/>
+          <a:lstStyle/>
+          <a:p>
+            <a:pPr algn="ctr"/>
+            <a:r>
+              <a:rPr lang="en-US" dirty="0">
+                <a:solidFill>
+                  <a:schemeClr val="tx1"/>
+                </a:solidFill>
+                <a:latin typeface="Peace Sans" panose="02000505040000020004" pitchFamily="50" charset="0"/>
+              </a:rPr>
+              <a:t>Shrimp</a:t>
+            </a:r>
+          </a:p>
+          <a:p>
+            <a:pPr algn="ctr"/>
+            <a:r>
+              <a:rPr lang="en-US" dirty="0">
+                <a:solidFill>
+                  <a:schemeClr val="tx1"/>
+                </a:solidFill>
+                <a:latin typeface="Peace Sans" panose="02000505040000020004" pitchFamily="50" charset="0"/>
+              </a:rPr>
+              <a:t>4 oz.</a:t>
+            </a:r>
+          </a:p>
+        </p:txBody>
+      </p:sp>
+    </p:spTree>
+    <p:extLst>
+      <p:ext uri="{BB962C8B-B14F-4D97-AF65-F5344CB8AC3E}">
+        <p14:creationId xmlns:p14="http://schemas.microsoft.com/office/powerpoint/2010/main" val="4029301395"/>
+      </p:ext>
+    </p:extLst>
+  </p:cSld>
+  <p:clrMapOvr>
+    <a:masterClrMapping/>
+  </p:clrMapOvr>
+</p:sld>
+</file>
+
+<file path=ppt/slides/slide7.xml><?xml version="1.0" encoding="utf-8"?>
+<p:sld xmlns:a="http://schemas.openxmlformats.org/drawingml/2006/main" xmlns:r="http://schemas.openxmlformats.org/officeDocument/2006/relationships" xmlns:p="http://schemas.openxmlformats.org/presentationml/2006/main">
+  <p:cSld>
+    <p:spTree>
+      <p:nvGrpSpPr>
+        <p:cNvPr id="1" name=""/>
+        <p:cNvGrpSpPr/>
+        <p:nvPr/>
+      </p:nvGrpSpPr>
+      <p:grpSpPr>
+        <a:xfrm>
+          <a:off x="0" y="0"/>
+          <a:ext cx="0" cy="0"/>
+          <a:chOff x="0" y="0"/>
+          <a:chExt cx="0" cy="0"/>
+        </a:xfrm>
+      </p:grpSpPr>
+      <p:grpSp>
+        <p:nvGrpSpPr>
+          <p:cNvPr id="6" name="Group 5">
+            <a:extLst>
+              <a:ext uri="{FF2B5EF4-FFF2-40B4-BE49-F238E27FC236}">
+                <a16:creationId xmlns:a16="http://schemas.microsoft.com/office/drawing/2014/main" id="{023E4BA8-DE0B-4691-BE1E-D4FA73C69ED3}"/>
+              </a:ext>
+            </a:extLst>
+          </p:cNvPr>
+          <p:cNvGrpSpPr/>
+          <p:nvPr/>
+        </p:nvGrpSpPr>
+        <p:grpSpPr>
+          <a:xfrm>
+            <a:off x="1565565" y="0"/>
+            <a:ext cx="6012873" cy="6858000"/>
+            <a:chOff x="3519903" y="93307"/>
+            <a:chExt cx="6012873" cy="6858000"/>
+          </a:xfrm>
+        </p:grpSpPr>
+        <p:graphicFrame>
+          <p:nvGraphicFramePr>
+            <p:cNvPr id="4" name="Chart 3">
+              <a:extLst>
+                <a:ext uri="{FF2B5EF4-FFF2-40B4-BE49-F238E27FC236}">
+                  <a16:creationId xmlns:a16="http://schemas.microsoft.com/office/drawing/2014/main" id="{EA46B399-32B5-46D0-B8EA-73094A3A130E}"/>
+                </a:ext>
+              </a:extLst>
+            </p:cNvPr>
+            <p:cNvGraphicFramePr/>
+            <p:nvPr>
+              <p:extLst>
+                <p:ext uri="{D42A27DB-BD31-4B8C-83A1-F6EECF244321}">
+                  <p14:modId xmlns:p14="http://schemas.microsoft.com/office/powerpoint/2010/main" val="36333895"/>
+                </p:ext>
+              </p:extLst>
+            </p:nvPr>
+          </p:nvGraphicFramePr>
+          <p:xfrm>
+            <a:off x="3519903" y="93307"/>
+            <a:ext cx="6012873" cy="6858000"/>
+          </p:xfrm>
+          <a:graphic>
+            <a:graphicData uri="http://schemas.openxmlformats.org/drawingml/2006/chart">
+              <c:chart xmlns:c="http://schemas.openxmlformats.org/drawingml/2006/chart" xmlns:r="http://schemas.openxmlformats.org/officeDocument/2006/relationships" r:id="rId2"/>
+            </a:graphicData>
+          </a:graphic>
+        </p:graphicFrame>
+        <p:sp>
+          <p:nvSpPr>
+            <p:cNvPr id="5" name="TextBox 4">
+              <a:extLst>
+                <a:ext uri="{FF2B5EF4-FFF2-40B4-BE49-F238E27FC236}">
+                  <a16:creationId xmlns:a16="http://schemas.microsoft.com/office/drawing/2014/main" id="{825A1C29-15B2-45E7-89BD-1DE97BEDC691}"/>
+                </a:ext>
+              </a:extLst>
+            </p:cNvPr>
+            <p:cNvSpPr txBox="1"/>
+            <p:nvPr/>
+          </p:nvSpPr>
+          <p:spPr>
+            <a:xfrm>
+              <a:off x="6009210" y="3168364"/>
+              <a:ext cx="1034257" cy="707886"/>
+            </a:xfrm>
+            <a:prstGeom prst="rect">
+              <a:avLst/>
+            </a:prstGeom>
+            <a:noFill/>
+          </p:spPr>
+          <p:txBody>
+            <a:bodyPr wrap="none" rtlCol="0">
+              <a:spAutoFit/>
+            </a:bodyPr>
+            <a:lstStyle/>
+            <a:p>
+              <a:pPr algn="ctr"/>
+              <a:r>
+                <a:rPr lang="en-US" sz="2400" dirty="0">
+                  <a:latin typeface="Peace Sans" panose="02000505040000020004" pitchFamily="50" charset="0"/>
+                </a:rPr>
+                <a:t>200</a:t>
+              </a:r>
+              <a:endParaRPr lang="en-US" sz="1600" dirty="0">
+                <a:latin typeface="Peace Sans" panose="02000505040000020004" pitchFamily="50" charset="0"/>
+              </a:endParaRPr>
+            </a:p>
+            <a:p>
+              <a:pPr algn="ctr"/>
+              <a:r>
+                <a:rPr lang="en-US" sz="1600" dirty="0">
+                  <a:latin typeface="Peace Sans" panose="02000505040000020004" pitchFamily="50" charset="0"/>
+                </a:rPr>
+                <a:t>calories</a:t>
+              </a:r>
+            </a:p>
+          </p:txBody>
+        </p:sp>
+      </p:grpSp>
+      <p:sp>
+        <p:nvSpPr>
+          <p:cNvPr id="7" name="Rectangle 6">
+            <a:extLst>
+              <a:ext uri="{FF2B5EF4-FFF2-40B4-BE49-F238E27FC236}">
+                <a16:creationId xmlns:a16="http://schemas.microsoft.com/office/drawing/2014/main" id="{0655FC73-8DF0-4674-9C86-F6B0EEDE90DE}"/>
+              </a:ext>
+            </a:extLst>
+          </p:cNvPr>
+          <p:cNvSpPr/>
+          <p:nvPr/>
+        </p:nvSpPr>
+        <p:spPr>
+          <a:xfrm>
+            <a:off x="2971799" y="176170"/>
+            <a:ext cx="3200400" cy="505993"/>
+          </a:xfrm>
+          <a:prstGeom prst="rect">
+            <a:avLst/>
+          </a:prstGeom>
+          <a:solidFill>
+            <a:schemeClr val="bg1"/>
+          </a:solidFill>
+          <a:ln>
+            <a:solidFill>
+              <a:schemeClr val="bg1"/>
+            </a:solidFill>
+          </a:ln>
+        </p:spPr>
+        <p:style>
+          <a:lnRef idx="2">
+            <a:schemeClr val="accent1">
+              <a:shade val="50000"/>
+            </a:schemeClr>
+          </a:lnRef>
+          <a:fillRef idx="1">
+            <a:schemeClr val="accent1"/>
+          </a:fillRef>
+          <a:effectRef idx="0">
+            <a:schemeClr val="accent1"/>
+          </a:effectRef>
+          <a:fontRef idx="minor">
+            <a:schemeClr val="lt1"/>
+          </a:fontRef>
+        </p:style>
+        <p:txBody>
+          <a:bodyPr rtlCol="0" anchor="ctr"/>
+          <a:lstStyle/>
+          <a:p>
+            <a:pPr algn="ctr"/>
+            <a:r>
+              <a:rPr lang="en-US" dirty="0">
+                <a:solidFill>
+                  <a:schemeClr val="tx1"/>
+                </a:solidFill>
+                <a:latin typeface="Peace Sans" panose="02000505040000020004" pitchFamily="50" charset="0"/>
+              </a:rPr>
+              <a:t>Protein shake</a:t>
+            </a:r>
+          </a:p>
+          <a:p>
+            <a:pPr algn="ctr"/>
+            <a:r>
+              <a:rPr lang="en-US" dirty="0">
+                <a:solidFill>
+                  <a:schemeClr val="tx1"/>
+                </a:solidFill>
+                <a:latin typeface="Peace Sans" panose="02000505040000020004" pitchFamily="50" charset="0"/>
+              </a:rPr>
+              <a:t>8 oz.</a:t>
+            </a:r>
+          </a:p>
+        </p:txBody>
+      </p:sp>
+    </p:spTree>
+    <p:extLst>
+      <p:ext uri="{BB962C8B-B14F-4D97-AF65-F5344CB8AC3E}">
+        <p14:creationId xmlns:p14="http://schemas.microsoft.com/office/powerpoint/2010/main" val="1801791457"/>
+      </p:ext>
+    </p:extLst>
+  </p:cSld>
+  <p:clrMapOvr>
+    <a:masterClrMapping/>
+  </p:clrMapOvr>
+</p:sld>
+</file>
+
 <file path=ppt/theme/theme1.xml><?xml version="1.0" encoding="utf-8"?>
 <a:theme xmlns:a="http://schemas.openxmlformats.org/drawingml/2006/main" name="Office Theme">
   <a:themeElements>
-    <a:clrScheme name="Office">
+    <a:clrScheme name="Office Theme">
       <a:dk1>
         <a:sysClr val="windowText" lastClr="000000"/>
       </a:dk1>
@@ -10219,7 +12613,7 @@
         <a:srgbClr val="954F72"/>
       </a:folHlink>
     </a:clrScheme>
-    <a:fontScheme name="Office">
+    <a:fontScheme name="Office Theme">
       <a:majorFont>
         <a:latin typeface="Calibri Light" panose="020F0302020204030204"/>
         <a:ea typeface=""/>
@@ -10254,23 +12648,6 @@
         <a:font script="Viet" typeface="Times New Roman"/>
         <a:font script="Uigh" typeface="Microsoft Uighur"/>
         <a:font script="Geor" typeface="Sylfaen"/>
-        <a:font script="Armn" typeface="Arial"/>
-        <a:font script="Bugi" typeface="Leelawadee UI"/>
-        <a:font script="Bopo" typeface="Microsoft JhengHei"/>
-        <a:font script="Java" typeface="Javanese Text"/>
-        <a:font script="Lisu" typeface="Segoe UI"/>
-        <a:font script="Mymr" typeface="Myanmar Text"/>
-        <a:font script="Nkoo" typeface="Ebrima"/>
-        <a:font script="Olck" typeface="Nirmala UI"/>
-        <a:font script="Osma" typeface="Ebrima"/>
-        <a:font script="Phag" typeface="Phagspa"/>
-        <a:font script="Syrn" typeface="Estrangelo Edessa"/>
-        <a:font script="Syrj" typeface="Estrangelo Edessa"/>
-        <a:font script="Syre" typeface="Estrangelo Edessa"/>
-        <a:font script="Sora" typeface="Nirmala UI"/>
-        <a:font script="Tale" typeface="Microsoft Tai Le"/>
-        <a:font script="Talu" typeface="Microsoft New Tai Lue"/>
-        <a:font script="Tfng" typeface="Ebrima"/>
       </a:majorFont>
       <a:minorFont>
         <a:latin typeface="Calibri" panose="020F0502020204030204"/>
@@ -10306,26 +12683,9 @@
         <a:font script="Viet" typeface="Arial"/>
         <a:font script="Uigh" typeface="Microsoft Uighur"/>
         <a:font script="Geor" typeface="Sylfaen"/>
-        <a:font script="Armn" typeface="Arial"/>
-        <a:font script="Bugi" typeface="Leelawadee UI"/>
-        <a:font script="Bopo" typeface="Microsoft JhengHei"/>
-        <a:font script="Java" typeface="Javanese Text"/>
-        <a:font script="Lisu" typeface="Segoe UI"/>
-        <a:font script="Mymr" typeface="Myanmar Text"/>
-        <a:font script="Nkoo" typeface="Ebrima"/>
-        <a:font script="Olck" typeface="Nirmala UI"/>
-        <a:font script="Osma" typeface="Ebrima"/>
-        <a:font script="Phag" typeface="Phagspa"/>
-        <a:font script="Syrn" typeface="Estrangelo Edessa"/>
-        <a:font script="Syrj" typeface="Estrangelo Edessa"/>
-        <a:font script="Syre" typeface="Estrangelo Edessa"/>
-        <a:font script="Sora" typeface="Nirmala UI"/>
-        <a:font script="Tale" typeface="Microsoft Tai Le"/>
-        <a:font script="Talu" typeface="Microsoft New Tai Lue"/>
-        <a:font script="Tfng" typeface="Ebrima"/>
       </a:minorFont>
     </a:fontScheme>
-    <a:fmtScheme name="Office">
+    <a:fmtScheme name="Office Theme">
       <a:fillStyleLst>
         <a:solidFill>
           <a:schemeClr val="phClr"/>

</xml_diff>